<commit_message>
more changes feb 10 pm
</commit_message>
<xml_diff>
--- a/Presentation.pptx
+++ b/Presentation.pptx
@@ -4,14 +4,19 @@
   <p:sldMasterIdLst>
     <p:sldMasterId id="2147483648" r:id="rId1"/>
   </p:sldMasterIdLst>
+  <p:notesMasterIdLst>
+    <p:notesMasterId r:id="rId11"/>
+  </p:notesMasterIdLst>
   <p:sldIdLst>
     <p:sldId id="256" r:id="rId2"/>
     <p:sldId id="257" r:id="rId3"/>
-    <p:sldId id="258" r:id="rId4"/>
-    <p:sldId id="259" r:id="rId5"/>
-    <p:sldId id="260" r:id="rId6"/>
-    <p:sldId id="261" r:id="rId7"/>
-    <p:sldId id="262" r:id="rId8"/>
+    <p:sldId id="263" r:id="rId4"/>
+    <p:sldId id="267" r:id="rId5"/>
+    <p:sldId id="264" r:id="rId6"/>
+    <p:sldId id="265" r:id="rId7"/>
+    <p:sldId id="266" r:id="rId8"/>
+    <p:sldId id="259" r:id="rId9"/>
+    <p:sldId id="262" r:id="rId10"/>
   </p:sldIdLst>
   <p:sldSz cx="12192000" cy="6858000"/>
   <p:notesSz cx="6858000" cy="9144000"/>
@@ -118,33 +123,1180 @@
 </p:presentation>
 </file>
 
+<file path=ppt/revisionInfo.xml><?xml version="1.0" encoding="utf-8"?>
+<p1510:revInfo xmlns:a="http://schemas.openxmlformats.org/drawingml/2006/main" xmlns:r="http://schemas.openxmlformats.org/officeDocument/2006/relationships" xmlns:p1510="http://schemas.microsoft.com/office/powerpoint/2015/10/main">
+  <p1510:revLst>
+    <p1510:client id="{2039BAF4-23A1-4312-9CE0-DBE1F5B3E171}" v="24" dt="2021-02-11T00:48:04.665"/>
+  </p1510:revLst>
+</p1510:revInfo>
+</file>
+
 <file path=ppt/changesInfos/changesInfo1.xml><?xml version="1.0" encoding="utf-8"?>
 <pc:chgInfo xmlns:a="http://schemas.openxmlformats.org/drawingml/2006/main" xmlns:r="http://schemas.openxmlformats.org/officeDocument/2006/relationships" xmlns:ac="http://schemas.microsoft.com/office/drawing/2013/main/command" xmlns:pc="http://schemas.microsoft.com/office/powerpoint/2013/main/command">
   <pc:docChgLst>
     <pc:chgData name="pamela hinostroza" userId="c80913c5e854edc0" providerId="LiveId" clId="{2039BAF4-23A1-4312-9CE0-DBE1F5B3E171}"/>
-    <pc:docChg chg="modSld">
-      <pc:chgData name="pamela hinostroza" userId="c80913c5e854edc0" providerId="LiveId" clId="{2039BAF4-23A1-4312-9CE0-DBE1F5B3E171}" dt="2021-02-08T23:34:51.125" v="2" actId="1076"/>
+    <pc:docChg chg="custSel addSld delSld modSld sldOrd">
+      <pc:chgData name="pamela hinostroza" userId="c80913c5e854edc0" providerId="LiveId" clId="{2039BAF4-23A1-4312-9CE0-DBE1F5B3E171}" dt="2021-02-11T00:49:49.802" v="454" actId="1076"/>
       <pc:docMkLst>
         <pc:docMk/>
       </pc:docMkLst>
-      <pc:sldChg chg="modSp mod">
-        <pc:chgData name="pamela hinostroza" userId="c80913c5e854edc0" providerId="LiveId" clId="{2039BAF4-23A1-4312-9CE0-DBE1F5B3E171}" dt="2021-02-08T23:34:51.125" v="2" actId="1076"/>
+      <pc:sldChg chg="addSp delSp modSp mod delAnim modNotesTx">
+        <pc:chgData name="pamela hinostroza" userId="c80913c5e854edc0" providerId="LiveId" clId="{2039BAF4-23A1-4312-9CE0-DBE1F5B3E171}" dt="2021-02-11T00:35:41.879" v="360" actId="1076"/>
         <pc:sldMkLst>
           <pc:docMk/>
           <pc:sldMk cId="3141419273" sldId="257"/>
         </pc:sldMkLst>
-        <pc:picChg chg="mod">
-          <ac:chgData name="pamela hinostroza" userId="c80913c5e854edc0" providerId="LiveId" clId="{2039BAF4-23A1-4312-9CE0-DBE1F5B3E171}" dt="2021-02-08T23:34:51.125" v="2" actId="1076"/>
+        <pc:spChg chg="del">
+          <ac:chgData name="pamela hinostroza" userId="c80913c5e854edc0" providerId="LiveId" clId="{2039BAF4-23A1-4312-9CE0-DBE1F5B3E171}" dt="2021-02-11T00:19:03.267" v="70" actId="478"/>
+          <ac:spMkLst>
+            <pc:docMk/>
+            <pc:sldMk cId="3141419273" sldId="257"/>
+            <ac:spMk id="2" creationId="{C7F475B5-6199-44ED-A2EF-6239DFE8A788}"/>
+          </ac:spMkLst>
+        </pc:spChg>
+        <pc:spChg chg="add del mod">
+          <ac:chgData name="pamela hinostroza" userId="c80913c5e854edc0" providerId="LiveId" clId="{2039BAF4-23A1-4312-9CE0-DBE1F5B3E171}" dt="2021-02-11T00:16:09.826" v="60" actId="931"/>
+          <ac:spMkLst>
+            <pc:docMk/>
+            <pc:sldMk cId="3141419273" sldId="257"/>
+            <ac:spMk id="4" creationId="{2517E90A-3308-497A-9422-6E5C04833761}"/>
+          </ac:spMkLst>
+        </pc:spChg>
+        <pc:spChg chg="add del mod">
+          <ac:chgData name="pamela hinostroza" userId="c80913c5e854edc0" providerId="LiveId" clId="{2039BAF4-23A1-4312-9CE0-DBE1F5B3E171}" dt="2021-02-11T00:18:51.343" v="65" actId="931"/>
+          <ac:spMkLst>
+            <pc:docMk/>
+            <pc:sldMk cId="3141419273" sldId="257"/>
+            <ac:spMk id="11" creationId="{16F43247-0A73-48B6-A4E5-54C0927F7AB1}"/>
+          </ac:spMkLst>
+        </pc:spChg>
+        <pc:spChg chg="add del mod">
+          <ac:chgData name="pamela hinostroza" userId="c80913c5e854edc0" providerId="LiveId" clId="{2039BAF4-23A1-4312-9CE0-DBE1F5B3E171}" dt="2021-02-11T00:20:32.543" v="152" actId="478"/>
+          <ac:spMkLst>
+            <pc:docMk/>
+            <pc:sldMk cId="3141419273" sldId="257"/>
+            <ac:spMk id="14" creationId="{8B2CD8E8-9847-4A2F-A33E-932AA2B76F4E}"/>
+          </ac:spMkLst>
+        </pc:spChg>
+        <pc:picChg chg="del mod">
+          <ac:chgData name="pamela hinostroza" userId="c80913c5e854edc0" providerId="LiveId" clId="{2039BAF4-23A1-4312-9CE0-DBE1F5B3E171}" dt="2021-02-11T00:15:17.236" v="59" actId="478"/>
+          <ac:picMkLst>
+            <pc:docMk/>
+            <pc:sldMk cId="3141419273" sldId="257"/>
+            <ac:picMk id="5" creationId="{AAD6F2D5-39B0-4AD5-A594-B4E232F8A60D}"/>
+          </ac:picMkLst>
+        </pc:picChg>
+        <pc:picChg chg="del mod">
+          <ac:chgData name="pamela hinostroza" userId="c80913c5e854edc0" providerId="LiveId" clId="{2039BAF4-23A1-4312-9CE0-DBE1F5B3E171}" dt="2021-02-11T00:15:15.039" v="57" actId="478"/>
+          <ac:picMkLst>
+            <pc:docMk/>
+            <pc:sldMk cId="3141419273" sldId="257"/>
+            <ac:picMk id="7" creationId="{74A9C84D-CEA5-4730-8F11-EAF2B085D5CE}"/>
+          </ac:picMkLst>
+        </pc:picChg>
+        <pc:picChg chg="add del mod">
+          <ac:chgData name="pamela hinostroza" userId="c80913c5e854edc0" providerId="LiveId" clId="{2039BAF4-23A1-4312-9CE0-DBE1F5B3E171}" dt="2021-02-11T00:18:45.685" v="64" actId="478"/>
+          <ac:picMkLst>
+            <pc:docMk/>
+            <pc:sldMk cId="3141419273" sldId="257"/>
+            <ac:picMk id="8" creationId="{FBBC9300-23FF-4967-955B-3FFAE5D00456}"/>
+          </ac:picMkLst>
+        </pc:picChg>
+        <pc:picChg chg="del mod">
+          <ac:chgData name="pamela hinostroza" userId="c80913c5e854edc0" providerId="LiveId" clId="{2039BAF4-23A1-4312-9CE0-DBE1F5B3E171}" dt="2021-02-11T00:15:11.687" v="55" actId="478"/>
           <ac:picMkLst>
             <pc:docMk/>
             <pc:sldMk cId="3141419273" sldId="257"/>
             <ac:picMk id="9" creationId="{E834428E-66E7-493F-99DF-5073F72F352C}"/>
           </ac:picMkLst>
         </pc:picChg>
+        <pc:picChg chg="add mod">
+          <ac:chgData name="pamela hinostroza" userId="c80913c5e854edc0" providerId="LiveId" clId="{2039BAF4-23A1-4312-9CE0-DBE1F5B3E171}" dt="2021-02-11T00:35:41.879" v="360" actId="1076"/>
+          <ac:picMkLst>
+            <pc:docMk/>
+            <pc:sldMk cId="3141419273" sldId="257"/>
+            <ac:picMk id="13" creationId="{35342913-8083-4A2A-9CB1-F64057EDD19C}"/>
+          </ac:picMkLst>
+        </pc:picChg>
+      </pc:sldChg>
+      <pc:sldChg chg="addSp delSp modSp del mod delAnim">
+        <pc:chgData name="pamela hinostroza" userId="c80913c5e854edc0" providerId="LiveId" clId="{2039BAF4-23A1-4312-9CE0-DBE1F5B3E171}" dt="2021-02-11T00:24:03.980" v="173" actId="2696"/>
+        <pc:sldMkLst>
+          <pc:docMk/>
+          <pc:sldMk cId="1089195357" sldId="258"/>
+        </pc:sldMkLst>
+        <pc:spChg chg="del">
+          <ac:chgData name="pamela hinostroza" userId="c80913c5e854edc0" providerId="LiveId" clId="{2039BAF4-23A1-4312-9CE0-DBE1F5B3E171}" dt="2021-02-11T00:02:15.245" v="36" actId="478"/>
+          <ac:spMkLst>
+            <pc:docMk/>
+            <pc:sldMk cId="1089195357" sldId="258"/>
+            <ac:spMk id="2" creationId="{7F079A88-C9C7-4D16-88B9-5D13691C278E}"/>
+          </ac:spMkLst>
+        </pc:spChg>
+        <pc:spChg chg="add del mod">
+          <ac:chgData name="pamela hinostroza" userId="c80913c5e854edc0" providerId="LiveId" clId="{2039BAF4-23A1-4312-9CE0-DBE1F5B3E171}" dt="2021-02-11T00:02:13.598" v="35" actId="478"/>
+          <ac:spMkLst>
+            <pc:docMk/>
+            <pc:sldMk cId="1089195357" sldId="258"/>
+            <ac:spMk id="4" creationId="{795A7C78-7042-4AD4-BC8E-B1A21240F43E}"/>
+          </ac:spMkLst>
+        </pc:spChg>
+        <pc:spChg chg="del">
+          <ac:chgData name="pamela hinostroza" userId="c80913c5e854edc0" providerId="LiveId" clId="{2039BAF4-23A1-4312-9CE0-DBE1F5B3E171}" dt="2021-02-11T00:02:09.010" v="31" actId="478"/>
+          <ac:spMkLst>
+            <pc:docMk/>
+            <pc:sldMk cId="1089195357" sldId="258"/>
+            <ac:spMk id="8" creationId="{EE4D4882-F8D5-4D21-A88D-50B7E1C707A4}"/>
+          </ac:spMkLst>
+        </pc:spChg>
+        <pc:picChg chg="del">
+          <ac:chgData name="pamela hinostroza" userId="c80913c5e854edc0" providerId="LiveId" clId="{2039BAF4-23A1-4312-9CE0-DBE1F5B3E171}" dt="2021-02-11T00:02:11.184" v="33" actId="478"/>
+          <ac:picMkLst>
+            <pc:docMk/>
+            <pc:sldMk cId="1089195357" sldId="258"/>
+            <ac:picMk id="5" creationId="{080B441D-2B13-4B79-A9EE-C5E249C6F445}"/>
+          </ac:picMkLst>
+        </pc:picChg>
+        <pc:picChg chg="del">
+          <ac:chgData name="pamela hinostroza" userId="c80913c5e854edc0" providerId="LiveId" clId="{2039BAF4-23A1-4312-9CE0-DBE1F5B3E171}" dt="2021-02-11T00:02:09.978" v="32" actId="478"/>
+          <ac:picMkLst>
+            <pc:docMk/>
+            <pc:sldMk cId="1089195357" sldId="258"/>
+            <ac:picMk id="7" creationId="{83F549DC-BE1F-4C14-99A3-EC4D9AE88410}"/>
+          </ac:picMkLst>
+        </pc:picChg>
+      </pc:sldChg>
+      <pc:sldChg chg="addSp delSp modSp mod">
+        <pc:chgData name="pamela hinostroza" userId="c80913c5e854edc0" providerId="LiveId" clId="{2039BAF4-23A1-4312-9CE0-DBE1F5B3E171}" dt="2021-02-10T23:59:22.402" v="9" actId="1076"/>
+        <pc:sldMkLst>
+          <pc:docMk/>
+          <pc:sldMk cId="799382434" sldId="259"/>
+        </pc:sldMkLst>
+        <pc:spChg chg="del">
+          <ac:chgData name="pamela hinostroza" userId="c80913c5e854edc0" providerId="LiveId" clId="{2039BAF4-23A1-4312-9CE0-DBE1F5B3E171}" dt="2021-02-10T23:59:09.517" v="4" actId="478"/>
+          <ac:spMkLst>
+            <pc:docMk/>
+            <pc:sldMk cId="799382434" sldId="259"/>
+            <ac:spMk id="2" creationId="{6E421596-6AE3-4F52-8257-34CA3F092DA4}"/>
+          </ac:spMkLst>
+        </pc:spChg>
+        <pc:spChg chg="del">
+          <ac:chgData name="pamela hinostroza" userId="c80913c5e854edc0" providerId="LiveId" clId="{2039BAF4-23A1-4312-9CE0-DBE1F5B3E171}" dt="2021-02-10T23:59:07.802" v="3" actId="478"/>
+          <ac:spMkLst>
+            <pc:docMk/>
+            <pc:sldMk cId="799382434" sldId="259"/>
+            <ac:spMk id="3" creationId="{DF3156B4-5107-42D7-B44E-7F508231269B}"/>
+          </ac:spMkLst>
+        </pc:spChg>
+        <pc:picChg chg="add mod">
+          <ac:chgData name="pamela hinostroza" userId="c80913c5e854edc0" providerId="LiveId" clId="{2039BAF4-23A1-4312-9CE0-DBE1F5B3E171}" dt="2021-02-10T23:59:22.402" v="9" actId="1076"/>
+          <ac:picMkLst>
+            <pc:docMk/>
+            <pc:sldMk cId="799382434" sldId="259"/>
+            <ac:picMk id="5" creationId="{6CD091C0-B157-45FA-B0D6-C5DD256C1CE3}"/>
+          </ac:picMkLst>
+        </pc:picChg>
+      </pc:sldChg>
+      <pc:sldChg chg="addSp delSp modSp del mod ord">
+        <pc:chgData name="pamela hinostroza" userId="c80913c5e854edc0" providerId="LiveId" clId="{2039BAF4-23A1-4312-9CE0-DBE1F5B3E171}" dt="2021-02-11T00:02:02.606" v="30" actId="2696"/>
+        <pc:sldMkLst>
+          <pc:docMk/>
+          <pc:sldMk cId="2390422846" sldId="260"/>
+        </pc:sldMkLst>
+        <pc:spChg chg="del mod">
+          <ac:chgData name="pamela hinostroza" userId="c80913c5e854edc0" providerId="LiveId" clId="{2039BAF4-23A1-4312-9CE0-DBE1F5B3E171}" dt="2021-02-11T00:00:18.927" v="14" actId="478"/>
+          <ac:spMkLst>
+            <pc:docMk/>
+            <pc:sldMk cId="2390422846" sldId="260"/>
+            <ac:spMk id="2" creationId="{EA5DD981-C4B1-42F3-B7CB-8145C8002433}"/>
+          </ac:spMkLst>
+        </pc:spChg>
+        <pc:spChg chg="del">
+          <ac:chgData name="pamela hinostroza" userId="c80913c5e854edc0" providerId="LiveId" clId="{2039BAF4-23A1-4312-9CE0-DBE1F5B3E171}" dt="2021-02-11T00:00:13.223" v="10" actId="931"/>
+          <ac:spMkLst>
+            <pc:docMk/>
+            <pc:sldMk cId="2390422846" sldId="260"/>
+            <ac:spMk id="3" creationId="{3716879F-E660-4263-8C11-680BCC4C958C}"/>
+          </ac:spMkLst>
+        </pc:spChg>
+        <pc:picChg chg="add mod">
+          <ac:chgData name="pamela hinostroza" userId="c80913c5e854edc0" providerId="LiveId" clId="{2039BAF4-23A1-4312-9CE0-DBE1F5B3E171}" dt="2021-02-11T00:01:33.399" v="28" actId="14100"/>
+          <ac:picMkLst>
+            <pc:docMk/>
+            <pc:sldMk cId="2390422846" sldId="260"/>
+            <ac:picMk id="5" creationId="{74296349-48BA-49DF-A9BA-1A35131E2961}"/>
+          </ac:picMkLst>
+        </pc:picChg>
+        <pc:picChg chg="add mod">
+          <ac:chgData name="pamela hinostroza" userId="c80913c5e854edc0" providerId="LiveId" clId="{2039BAF4-23A1-4312-9CE0-DBE1F5B3E171}" dt="2021-02-11T00:01:37.624" v="29" actId="14100"/>
+          <ac:picMkLst>
+            <pc:docMk/>
+            <pc:sldMk cId="2390422846" sldId="260"/>
+            <ac:picMk id="7" creationId="{D59DDE7F-C0D7-4F59-97EF-E9D3BCA568F6}"/>
+          </ac:picMkLst>
+        </pc:picChg>
+      </pc:sldChg>
+      <pc:sldChg chg="addSp delSp modSp del mod ord modNotesTx">
+        <pc:chgData name="pamela hinostroza" userId="c80913c5e854edc0" providerId="LiveId" clId="{2039BAF4-23A1-4312-9CE0-DBE1F5B3E171}" dt="2021-02-11T00:47:58.459" v="436" actId="2696"/>
+        <pc:sldMkLst>
+          <pc:docMk/>
+          <pc:sldMk cId="4130249221" sldId="261"/>
+        </pc:sldMkLst>
+        <pc:spChg chg="del">
+          <ac:chgData name="pamela hinostroza" userId="c80913c5e854edc0" providerId="LiveId" clId="{2039BAF4-23A1-4312-9CE0-DBE1F5B3E171}" dt="2021-02-11T00:25:36.237" v="197" actId="478"/>
+          <ac:spMkLst>
+            <pc:docMk/>
+            <pc:sldMk cId="4130249221" sldId="261"/>
+            <ac:spMk id="2" creationId="{95C6CBF0-85C8-4052-95A2-398A89F20AC3}"/>
+          </ac:spMkLst>
+        </pc:spChg>
+        <pc:spChg chg="del">
+          <ac:chgData name="pamela hinostroza" userId="c80913c5e854edc0" providerId="LiveId" clId="{2039BAF4-23A1-4312-9CE0-DBE1F5B3E171}" dt="2021-02-11T00:24:12.802" v="176" actId="931"/>
+          <ac:spMkLst>
+            <pc:docMk/>
+            <pc:sldMk cId="4130249221" sldId="261"/>
+            <ac:spMk id="3" creationId="{5C8355C9-46E4-4639-AC41-389E3B5EE70B}"/>
+          </ac:spMkLst>
+        </pc:spChg>
+        <pc:spChg chg="add del mod">
+          <ac:chgData name="pamela hinostroza" userId="c80913c5e854edc0" providerId="LiveId" clId="{2039BAF4-23A1-4312-9CE0-DBE1F5B3E171}" dt="2021-02-11T00:26:18.019" v="205" actId="478"/>
+          <ac:spMkLst>
+            <pc:docMk/>
+            <pc:sldMk cId="4130249221" sldId="261"/>
+            <ac:spMk id="10" creationId="{E4D76AD7-B5C6-4BF6-9204-78B4137A08F0}"/>
+          </ac:spMkLst>
+        </pc:spChg>
+        <pc:picChg chg="add del mod">
+          <ac:chgData name="pamela hinostroza" userId="c80913c5e854edc0" providerId="LiveId" clId="{2039BAF4-23A1-4312-9CE0-DBE1F5B3E171}" dt="2021-02-11T00:26:13.739" v="204" actId="478"/>
+          <ac:picMkLst>
+            <pc:docMk/>
+            <pc:sldMk cId="4130249221" sldId="261"/>
+            <ac:picMk id="5" creationId="{E44ADF58-0887-4D4A-855C-EEE02B04A70E}"/>
+          </ac:picMkLst>
+        </pc:picChg>
+        <pc:picChg chg="add del mod">
+          <ac:chgData name="pamela hinostroza" userId="c80913c5e854edc0" providerId="LiveId" clId="{2039BAF4-23A1-4312-9CE0-DBE1F5B3E171}" dt="2021-02-11T00:24:47.474" v="187" actId="478"/>
+          <ac:picMkLst>
+            <pc:docMk/>
+            <pc:sldMk cId="4130249221" sldId="261"/>
+            <ac:picMk id="7" creationId="{3E550AC6-A76F-4C7A-9B78-318E56BEF94F}"/>
+          </ac:picMkLst>
+        </pc:picChg>
+        <pc:picChg chg="add del mod">
+          <ac:chgData name="pamela hinostroza" userId="c80913c5e854edc0" providerId="LiveId" clId="{2039BAF4-23A1-4312-9CE0-DBE1F5B3E171}" dt="2021-02-11T00:28:45.860" v="229" actId="478"/>
+          <ac:picMkLst>
+            <pc:docMk/>
+            <pc:sldMk cId="4130249221" sldId="261"/>
+            <ac:picMk id="8" creationId="{30F08E92-E5C5-4DB3-864B-52370EC9A0D0}"/>
+          </ac:picMkLst>
+        </pc:picChg>
+        <pc:picChg chg="add del mod">
+          <ac:chgData name="pamela hinostroza" userId="c80913c5e854edc0" providerId="LiveId" clId="{2039BAF4-23A1-4312-9CE0-DBE1F5B3E171}" dt="2021-02-11T00:47:03.851" v="420" actId="478"/>
+          <ac:picMkLst>
+            <pc:docMk/>
+            <pc:sldMk cId="4130249221" sldId="261"/>
+            <ac:picMk id="12" creationId="{472F517C-2BDC-4A43-A2E8-5C7116422A8E}"/>
+          </ac:picMkLst>
+        </pc:picChg>
+        <pc:picChg chg="add del mod">
+          <ac:chgData name="pamela hinostroza" userId="c80913c5e854edc0" providerId="LiveId" clId="{2039BAF4-23A1-4312-9CE0-DBE1F5B3E171}" dt="2021-02-11T00:47:53.084" v="435" actId="478"/>
+          <ac:picMkLst>
+            <pc:docMk/>
+            <pc:sldMk cId="4130249221" sldId="261"/>
+            <ac:picMk id="14" creationId="{D708E765-4601-46DE-ADA8-1F36C2C6F5E5}"/>
+          </ac:picMkLst>
+        </pc:picChg>
+      </pc:sldChg>
+      <pc:sldChg chg="modSp mod">
+        <pc:chgData name="pamela hinostroza" userId="c80913c5e854edc0" providerId="LiveId" clId="{2039BAF4-23A1-4312-9CE0-DBE1F5B3E171}" dt="2021-02-11T00:13:16.166" v="54" actId="15"/>
+        <pc:sldMkLst>
+          <pc:docMk/>
+          <pc:sldMk cId="3523656184" sldId="262"/>
+        </pc:sldMkLst>
+        <pc:spChg chg="mod">
+          <ac:chgData name="pamela hinostroza" userId="c80913c5e854edc0" providerId="LiveId" clId="{2039BAF4-23A1-4312-9CE0-DBE1F5B3E171}" dt="2021-02-11T00:12:13.514" v="46" actId="20577"/>
+          <ac:spMkLst>
+            <pc:docMk/>
+            <pc:sldMk cId="3523656184" sldId="262"/>
+            <ac:spMk id="2" creationId="{A6BE369A-4269-4A2C-95A9-5DC57CB6362C}"/>
+          </ac:spMkLst>
+        </pc:spChg>
+        <pc:spChg chg="mod">
+          <ac:chgData name="pamela hinostroza" userId="c80913c5e854edc0" providerId="LiveId" clId="{2039BAF4-23A1-4312-9CE0-DBE1F5B3E171}" dt="2021-02-11T00:13:16.166" v="54" actId="15"/>
+          <ac:spMkLst>
+            <pc:docMk/>
+            <pc:sldMk cId="3523656184" sldId="262"/>
+            <ac:spMk id="3" creationId="{CC0B831E-731A-412B-BAE2-376D6674DE30}"/>
+          </ac:spMkLst>
+        </pc:spChg>
+      </pc:sldChg>
+      <pc:sldChg chg="addSp delSp modSp new mod ord delAnim modAnim modNotesTx">
+        <pc:chgData name="pamela hinostroza" userId="c80913c5e854edc0" providerId="LiveId" clId="{2039BAF4-23A1-4312-9CE0-DBE1F5B3E171}" dt="2021-02-11T00:35:34.613" v="358"/>
+        <pc:sldMkLst>
+          <pc:docMk/>
+          <pc:sldMk cId="3775528676" sldId="263"/>
+        </pc:sldMkLst>
+        <pc:spChg chg="del">
+          <ac:chgData name="pamela hinostroza" userId="c80913c5e854edc0" providerId="LiveId" clId="{2039BAF4-23A1-4312-9CE0-DBE1F5B3E171}" dt="2021-02-11T00:26:46.334" v="211" actId="478"/>
+          <ac:spMkLst>
+            <pc:docMk/>
+            <pc:sldMk cId="3775528676" sldId="263"/>
+            <ac:spMk id="2" creationId="{4E708A9E-DC60-47B9-AE56-9E689ACE8D3C}"/>
+          </ac:spMkLst>
+        </pc:spChg>
+        <pc:spChg chg="del">
+          <ac:chgData name="pamela hinostroza" userId="c80913c5e854edc0" providerId="LiveId" clId="{2039BAF4-23A1-4312-9CE0-DBE1F5B3E171}" dt="2021-02-11T00:25:05.127" v="190" actId="931"/>
+          <ac:spMkLst>
+            <pc:docMk/>
+            <pc:sldMk cId="3775528676" sldId="263"/>
+            <ac:spMk id="3" creationId="{823DF45E-BF52-4EEC-BB24-1878E68DFB5F}"/>
+          </ac:spMkLst>
+        </pc:spChg>
+        <pc:spChg chg="add del mod">
+          <ac:chgData name="pamela hinostroza" userId="c80913c5e854edc0" providerId="LiveId" clId="{2039BAF4-23A1-4312-9CE0-DBE1F5B3E171}" dt="2021-02-11T00:28:58.878" v="233" actId="931"/>
+          <ac:spMkLst>
+            <pc:docMk/>
+            <pc:sldMk cId="3775528676" sldId="263"/>
+            <ac:spMk id="8" creationId="{842F4AF2-31D1-4C09-8496-C50516096294}"/>
+          </ac:spMkLst>
+        </pc:spChg>
+        <pc:picChg chg="add del mod">
+          <ac:chgData name="pamela hinostroza" userId="c80913c5e854edc0" providerId="LiveId" clId="{2039BAF4-23A1-4312-9CE0-DBE1F5B3E171}" dt="2021-02-11T00:28:51.094" v="232" actId="478"/>
+          <ac:picMkLst>
+            <pc:docMk/>
+            <pc:sldMk cId="3775528676" sldId="263"/>
+            <ac:picMk id="5" creationId="{12EEA9DD-A3EA-4207-9AD4-153390359D96}"/>
+          </ac:picMkLst>
+        </pc:picChg>
+        <pc:picChg chg="add del mod">
+          <ac:chgData name="pamela hinostroza" userId="c80913c5e854edc0" providerId="LiveId" clId="{2039BAF4-23A1-4312-9CE0-DBE1F5B3E171}" dt="2021-02-11T00:28:48.540" v="230" actId="478"/>
+          <ac:picMkLst>
+            <pc:docMk/>
+            <pc:sldMk cId="3775528676" sldId="263"/>
+            <ac:picMk id="6" creationId="{00E69F37-EB2C-4AC9-A5A3-DFB3A58F8F00}"/>
+          </ac:picMkLst>
+        </pc:picChg>
+        <pc:picChg chg="add mod">
+          <ac:chgData name="pamela hinostroza" userId="c80913c5e854edc0" providerId="LiveId" clId="{2039BAF4-23A1-4312-9CE0-DBE1F5B3E171}" dt="2021-02-11T00:30:16.124" v="251" actId="1076"/>
+          <ac:picMkLst>
+            <pc:docMk/>
+            <pc:sldMk cId="3775528676" sldId="263"/>
+            <ac:picMk id="10" creationId="{EE545CF6-106F-4588-854B-54D87087D129}"/>
+          </ac:picMkLst>
+        </pc:picChg>
+        <pc:picChg chg="add mod">
+          <ac:chgData name="pamela hinostroza" userId="c80913c5e854edc0" providerId="LiveId" clId="{2039BAF4-23A1-4312-9CE0-DBE1F5B3E171}" dt="2021-02-11T00:30:38.302" v="253" actId="14100"/>
+          <ac:picMkLst>
+            <pc:docMk/>
+            <pc:sldMk cId="3775528676" sldId="263"/>
+            <ac:picMk id="12" creationId="{E69D1734-062D-4D06-AE52-E30AACF5151B}"/>
+          </ac:picMkLst>
+        </pc:picChg>
+      </pc:sldChg>
+      <pc:sldChg chg="addSp delSp modSp new mod">
+        <pc:chgData name="pamela hinostroza" userId="c80913c5e854edc0" providerId="LiveId" clId="{2039BAF4-23A1-4312-9CE0-DBE1F5B3E171}" dt="2021-02-11T00:49:17.170" v="450" actId="1076"/>
+        <pc:sldMkLst>
+          <pc:docMk/>
+          <pc:sldMk cId="3599362359" sldId="264"/>
+        </pc:sldMkLst>
+        <pc:spChg chg="del">
+          <ac:chgData name="pamela hinostroza" userId="c80913c5e854edc0" providerId="LiveId" clId="{2039BAF4-23A1-4312-9CE0-DBE1F5B3E171}" dt="2021-02-11T00:39:18.563" v="373" actId="478"/>
+          <ac:spMkLst>
+            <pc:docMk/>
+            <pc:sldMk cId="3599362359" sldId="264"/>
+            <ac:spMk id="2" creationId="{03B4855B-3D96-4227-9BAB-84FFF510CC78}"/>
+          </ac:spMkLst>
+        </pc:spChg>
+        <pc:spChg chg="del">
+          <ac:chgData name="pamela hinostroza" userId="c80913c5e854edc0" providerId="LiveId" clId="{2039BAF4-23A1-4312-9CE0-DBE1F5B3E171}" dt="2021-02-11T00:39:15.861" v="370" actId="931"/>
+          <ac:spMkLst>
+            <pc:docMk/>
+            <pc:sldMk cId="3599362359" sldId="264"/>
+            <ac:spMk id="3" creationId="{D0C507BC-722C-4205-8E20-7F098B917154}"/>
+          </ac:spMkLst>
+        </pc:spChg>
+        <pc:spChg chg="add del mod">
+          <ac:chgData name="pamela hinostroza" userId="c80913c5e854edc0" providerId="LiveId" clId="{2039BAF4-23A1-4312-9CE0-DBE1F5B3E171}" dt="2021-02-11T00:47:27.511" v="427" actId="931"/>
+          <ac:spMkLst>
+            <pc:docMk/>
+            <pc:sldMk cId="3599362359" sldId="264"/>
+            <ac:spMk id="7" creationId="{B6754F2D-4DCB-4BFC-BECA-A33BB88EF10F}"/>
+          </ac:spMkLst>
+        </pc:spChg>
+        <pc:picChg chg="add del mod">
+          <ac:chgData name="pamela hinostroza" userId="c80913c5e854edc0" providerId="LiveId" clId="{2039BAF4-23A1-4312-9CE0-DBE1F5B3E171}" dt="2021-02-11T00:47:05.267" v="421" actId="478"/>
+          <ac:picMkLst>
+            <pc:docMk/>
+            <pc:sldMk cId="3599362359" sldId="264"/>
+            <ac:picMk id="5" creationId="{A7211135-73B9-4B64-AC34-0CA0005B0FCD}"/>
+          </ac:picMkLst>
+        </pc:picChg>
+        <pc:picChg chg="add mod">
+          <ac:chgData name="pamela hinostroza" userId="c80913c5e854edc0" providerId="LiveId" clId="{2039BAF4-23A1-4312-9CE0-DBE1F5B3E171}" dt="2021-02-11T00:49:17.170" v="450" actId="1076"/>
+          <ac:picMkLst>
+            <pc:docMk/>
+            <pc:sldMk cId="3599362359" sldId="264"/>
+            <ac:picMk id="9" creationId="{8C68F206-ECDF-42E9-84F6-B5AAC51B738F}"/>
+          </ac:picMkLst>
+        </pc:picChg>
+      </pc:sldChg>
+      <pc:sldChg chg="addSp delSp modSp new mod">
+        <pc:chgData name="pamela hinostroza" userId="c80913c5e854edc0" providerId="LiveId" clId="{2039BAF4-23A1-4312-9CE0-DBE1F5B3E171}" dt="2021-02-11T00:49:38.138" v="452" actId="1076"/>
+        <pc:sldMkLst>
+          <pc:docMk/>
+          <pc:sldMk cId="2838335333" sldId="265"/>
+        </pc:sldMkLst>
+        <pc:spChg chg="del">
+          <ac:chgData name="pamela hinostroza" userId="c80913c5e854edc0" providerId="LiveId" clId="{2039BAF4-23A1-4312-9CE0-DBE1F5B3E171}" dt="2021-02-11T00:39:52.794" v="381" actId="478"/>
+          <ac:spMkLst>
+            <pc:docMk/>
+            <pc:sldMk cId="2838335333" sldId="265"/>
+            <ac:spMk id="2" creationId="{CFBED4A4-CCC9-4C2B-A1D4-F1AB516DF5B6}"/>
+          </ac:spMkLst>
+        </pc:spChg>
+        <pc:spChg chg="del">
+          <ac:chgData name="pamela hinostroza" userId="c80913c5e854edc0" providerId="LiveId" clId="{2039BAF4-23A1-4312-9CE0-DBE1F5B3E171}" dt="2021-02-11T00:39:49.803" v="378" actId="931"/>
+          <ac:spMkLst>
+            <pc:docMk/>
+            <pc:sldMk cId="2838335333" sldId="265"/>
+            <ac:spMk id="3" creationId="{75B54654-9526-4FF7-B930-FCCB62282CC2}"/>
+          </ac:spMkLst>
+        </pc:spChg>
+        <pc:spChg chg="add del mod">
+          <ac:chgData name="pamela hinostroza" userId="c80913c5e854edc0" providerId="LiveId" clId="{2039BAF4-23A1-4312-9CE0-DBE1F5B3E171}" dt="2021-02-11T00:47:32.726" v="429" actId="931"/>
+          <ac:spMkLst>
+            <pc:docMk/>
+            <pc:sldMk cId="2838335333" sldId="265"/>
+            <ac:spMk id="7" creationId="{0765573D-B096-411D-ADD3-1B48FFC31E26}"/>
+          </ac:spMkLst>
+        </pc:spChg>
+        <pc:picChg chg="add del mod">
+          <ac:chgData name="pamela hinostroza" userId="c80913c5e854edc0" providerId="LiveId" clId="{2039BAF4-23A1-4312-9CE0-DBE1F5B3E171}" dt="2021-02-11T00:47:06.677" v="422" actId="478"/>
+          <ac:picMkLst>
+            <pc:docMk/>
+            <pc:sldMk cId="2838335333" sldId="265"/>
+            <ac:picMk id="5" creationId="{39394AEC-C6AE-4020-A86C-E8605213B3B0}"/>
+          </ac:picMkLst>
+        </pc:picChg>
+        <pc:picChg chg="add mod">
+          <ac:chgData name="pamela hinostroza" userId="c80913c5e854edc0" providerId="LiveId" clId="{2039BAF4-23A1-4312-9CE0-DBE1F5B3E171}" dt="2021-02-11T00:49:38.138" v="452" actId="1076"/>
+          <ac:picMkLst>
+            <pc:docMk/>
+            <pc:sldMk cId="2838335333" sldId="265"/>
+            <ac:picMk id="9" creationId="{E0B5B8AB-EF5A-4CE3-AA3C-409A8D5AACB3}"/>
+          </ac:picMkLst>
+        </pc:picChg>
+      </pc:sldChg>
+      <pc:sldChg chg="addSp delSp modSp new mod">
+        <pc:chgData name="pamela hinostroza" userId="c80913c5e854edc0" providerId="LiveId" clId="{2039BAF4-23A1-4312-9CE0-DBE1F5B3E171}" dt="2021-02-11T00:49:49.802" v="454" actId="1076"/>
+        <pc:sldMkLst>
+          <pc:docMk/>
+          <pc:sldMk cId="165532906" sldId="266"/>
+        </pc:sldMkLst>
+        <pc:spChg chg="del">
+          <ac:chgData name="pamela hinostroza" userId="c80913c5e854edc0" providerId="LiveId" clId="{2039BAF4-23A1-4312-9CE0-DBE1F5B3E171}" dt="2021-02-11T00:40:26.477" v="389" actId="478"/>
+          <ac:spMkLst>
+            <pc:docMk/>
+            <pc:sldMk cId="165532906" sldId="266"/>
+            <ac:spMk id="2" creationId="{BC81688B-F1F7-412B-BAC1-B3877E2ECB8C}"/>
+          </ac:spMkLst>
+        </pc:spChg>
+        <pc:spChg chg="del">
+          <ac:chgData name="pamela hinostroza" userId="c80913c5e854edc0" providerId="LiveId" clId="{2039BAF4-23A1-4312-9CE0-DBE1F5B3E171}" dt="2021-02-11T00:40:23.345" v="386" actId="931"/>
+          <ac:spMkLst>
+            <pc:docMk/>
+            <pc:sldMk cId="165532906" sldId="266"/>
+            <ac:spMk id="3" creationId="{9CA10756-01B3-4FEF-924F-3FCAAC576FA7}"/>
+          </ac:spMkLst>
+        </pc:spChg>
+        <pc:spChg chg="add del mod">
+          <ac:chgData name="pamela hinostroza" userId="c80913c5e854edc0" providerId="LiveId" clId="{2039BAF4-23A1-4312-9CE0-DBE1F5B3E171}" dt="2021-02-11T00:47:43.240" v="432" actId="931"/>
+          <ac:spMkLst>
+            <pc:docMk/>
+            <pc:sldMk cId="165532906" sldId="266"/>
+            <ac:spMk id="7" creationId="{8B9434AD-5654-4819-88DF-402B6E79FD1B}"/>
+          </ac:spMkLst>
+        </pc:spChg>
+        <pc:picChg chg="add del mod">
+          <ac:chgData name="pamela hinostroza" userId="c80913c5e854edc0" providerId="LiveId" clId="{2039BAF4-23A1-4312-9CE0-DBE1F5B3E171}" dt="2021-02-11T00:47:07.900" v="423" actId="478"/>
+          <ac:picMkLst>
+            <pc:docMk/>
+            <pc:sldMk cId="165532906" sldId="266"/>
+            <ac:picMk id="5" creationId="{AFF4EAAC-E825-4AEF-A197-366D03EA0C76}"/>
+          </ac:picMkLst>
+        </pc:picChg>
+        <pc:picChg chg="add mod">
+          <ac:chgData name="pamela hinostroza" userId="c80913c5e854edc0" providerId="LiveId" clId="{2039BAF4-23A1-4312-9CE0-DBE1F5B3E171}" dt="2021-02-11T00:49:49.802" v="454" actId="1076"/>
+          <ac:picMkLst>
+            <pc:docMk/>
+            <pc:sldMk cId="165532906" sldId="266"/>
+            <ac:picMk id="9" creationId="{779FFF67-3C96-4A87-B153-12A4CC6A5B17}"/>
+          </ac:picMkLst>
+        </pc:picChg>
+      </pc:sldChg>
+      <pc:sldChg chg="addSp delSp modSp new mod">
+        <pc:chgData name="pamela hinostroza" userId="c80913c5e854edc0" providerId="LiveId" clId="{2039BAF4-23A1-4312-9CE0-DBE1F5B3E171}" dt="2021-02-11T00:48:55.657" v="447" actId="1076"/>
+        <pc:sldMkLst>
+          <pc:docMk/>
+          <pc:sldMk cId="1908298373" sldId="267"/>
+        </pc:sldMkLst>
+        <pc:spChg chg="del">
+          <ac:chgData name="pamela hinostroza" userId="c80913c5e854edc0" providerId="LiveId" clId="{2039BAF4-23A1-4312-9CE0-DBE1F5B3E171}" dt="2021-02-11T00:48:17.800" v="441" actId="478"/>
+          <ac:spMkLst>
+            <pc:docMk/>
+            <pc:sldMk cId="1908298373" sldId="267"/>
+            <ac:spMk id="2" creationId="{D9B9BEA8-4297-4B9F-95D0-91C4CE53A540}"/>
+          </ac:spMkLst>
+        </pc:spChg>
+        <pc:spChg chg="del">
+          <ac:chgData name="pamela hinostroza" userId="c80913c5e854edc0" providerId="LiveId" clId="{2039BAF4-23A1-4312-9CE0-DBE1F5B3E171}" dt="2021-02-11T00:48:04.664" v="438" actId="931"/>
+          <ac:spMkLst>
+            <pc:docMk/>
+            <pc:sldMk cId="1908298373" sldId="267"/>
+            <ac:spMk id="3" creationId="{56411E89-9FA7-493C-9D01-8C80D503C1F9}"/>
+          </ac:spMkLst>
+        </pc:spChg>
+        <pc:picChg chg="add mod">
+          <ac:chgData name="pamela hinostroza" userId="c80913c5e854edc0" providerId="LiveId" clId="{2039BAF4-23A1-4312-9CE0-DBE1F5B3E171}" dt="2021-02-11T00:48:55.657" v="447" actId="1076"/>
+          <ac:picMkLst>
+            <pc:docMk/>
+            <pc:sldMk cId="1908298373" sldId="267"/>
+            <ac:picMk id="5" creationId="{68C93067-61B8-4FFE-A129-EC0B0D3B0AFF}"/>
+          </ac:picMkLst>
+        </pc:picChg>
       </pc:sldChg>
     </pc:docChg>
   </pc:docChgLst>
 </pc:chgInfo>
+</file>
+
+<file path=ppt/notesMasters/notesMaster1.xml><?xml version="1.0" encoding="utf-8"?>
+<p:notesMaster xmlns:a="http://schemas.openxmlformats.org/drawingml/2006/main" xmlns:r="http://schemas.openxmlformats.org/officeDocument/2006/relationships" xmlns:p="http://schemas.openxmlformats.org/presentationml/2006/main">
+  <p:cSld>
+    <p:bg>
+      <p:bgRef idx="1001">
+        <a:schemeClr val="bg1"/>
+      </p:bgRef>
+    </p:bg>
+    <p:spTree>
+      <p:nvGrpSpPr>
+        <p:cNvPr id="1" name=""/>
+        <p:cNvGrpSpPr/>
+        <p:nvPr/>
+      </p:nvGrpSpPr>
+      <p:grpSpPr>
+        <a:xfrm>
+          <a:off x="0" y="0"/>
+          <a:ext cx="0" cy="0"/>
+          <a:chOff x="0" y="0"/>
+          <a:chExt cx="0" cy="0"/>
+        </a:xfrm>
+      </p:grpSpPr>
+      <p:sp>
+        <p:nvSpPr>
+          <p:cNvPr id="2" name="Header Placeholder 1"/>
+          <p:cNvSpPr>
+            <a:spLocks noGrp="1"/>
+          </p:cNvSpPr>
+          <p:nvPr>
+            <p:ph type="hdr" sz="quarter"/>
+          </p:nvPr>
+        </p:nvSpPr>
+        <p:spPr>
+          <a:xfrm>
+            <a:off x="0" y="0"/>
+            <a:ext cx="2971800" cy="458788"/>
+          </a:xfrm>
+          <a:prstGeom prst="rect">
+            <a:avLst/>
+          </a:prstGeom>
+        </p:spPr>
+        <p:txBody>
+          <a:bodyPr vert="horz" lIns="91440" tIns="45720" rIns="91440" bIns="45720" rtlCol="0"/>
+          <a:lstStyle>
+            <a:lvl1pPr algn="l">
+              <a:defRPr sz="1200"/>
+            </a:lvl1pPr>
+          </a:lstStyle>
+          <a:p>
+            <a:endParaRPr lang="en-US"/>
+          </a:p>
+        </p:txBody>
+      </p:sp>
+      <p:sp>
+        <p:nvSpPr>
+          <p:cNvPr id="3" name="Date Placeholder 2"/>
+          <p:cNvSpPr>
+            <a:spLocks noGrp="1"/>
+          </p:cNvSpPr>
+          <p:nvPr>
+            <p:ph type="dt" idx="1"/>
+          </p:nvPr>
+        </p:nvSpPr>
+        <p:spPr>
+          <a:xfrm>
+            <a:off x="3884613" y="0"/>
+            <a:ext cx="2971800" cy="458788"/>
+          </a:xfrm>
+          <a:prstGeom prst="rect">
+            <a:avLst/>
+          </a:prstGeom>
+        </p:spPr>
+        <p:txBody>
+          <a:bodyPr vert="horz" lIns="91440" tIns="45720" rIns="91440" bIns="45720" rtlCol="0"/>
+          <a:lstStyle>
+            <a:lvl1pPr algn="r">
+              <a:defRPr sz="1200"/>
+            </a:lvl1pPr>
+          </a:lstStyle>
+          <a:p>
+            <a:fld id="{EB65C839-BA40-4260-96D8-FFABE23A00FE}" type="datetimeFigureOut">
+              <a:rPr lang="en-US" smtClean="0"/>
+              <a:t>2/10/2021</a:t>
+            </a:fld>
+            <a:endParaRPr lang="en-US"/>
+          </a:p>
+        </p:txBody>
+      </p:sp>
+      <p:sp>
+        <p:nvSpPr>
+          <p:cNvPr id="4" name="Slide Image Placeholder 3"/>
+          <p:cNvSpPr>
+            <a:spLocks noGrp="1" noRot="1" noChangeAspect="1"/>
+          </p:cNvSpPr>
+          <p:nvPr>
+            <p:ph type="sldImg" idx="2"/>
+          </p:nvPr>
+        </p:nvSpPr>
+        <p:spPr>
+          <a:xfrm>
+            <a:off x="685800" y="1143000"/>
+            <a:ext cx="5486400" cy="3086100"/>
+          </a:xfrm>
+          <a:prstGeom prst="rect">
+            <a:avLst/>
+          </a:prstGeom>
+          <a:noFill/>
+          <a:ln w="12700">
+            <a:solidFill>
+              <a:prstClr val="black"/>
+            </a:solidFill>
+          </a:ln>
+        </p:spPr>
+        <p:txBody>
+          <a:bodyPr vert="horz" lIns="91440" tIns="45720" rIns="91440" bIns="45720" rtlCol="0" anchor="ctr"/>
+          <a:lstStyle/>
+          <a:p>
+            <a:endParaRPr lang="en-US"/>
+          </a:p>
+        </p:txBody>
+      </p:sp>
+      <p:sp>
+        <p:nvSpPr>
+          <p:cNvPr id="5" name="Notes Placeholder 4"/>
+          <p:cNvSpPr>
+            <a:spLocks noGrp="1"/>
+          </p:cNvSpPr>
+          <p:nvPr>
+            <p:ph type="body" sz="quarter" idx="3"/>
+          </p:nvPr>
+        </p:nvSpPr>
+        <p:spPr>
+          <a:xfrm>
+            <a:off x="685800" y="4400550"/>
+            <a:ext cx="5486400" cy="3600450"/>
+          </a:xfrm>
+          <a:prstGeom prst="rect">
+            <a:avLst/>
+          </a:prstGeom>
+        </p:spPr>
+        <p:txBody>
+          <a:bodyPr vert="horz" lIns="91440" tIns="45720" rIns="91440" bIns="45720" rtlCol="0"/>
+          <a:lstStyle/>
+          <a:p>
+            <a:pPr lvl="0"/>
+            <a:r>
+              <a:rPr lang="en-US"/>
+              <a:t>Click to edit Master text styles</a:t>
+            </a:r>
+          </a:p>
+          <a:p>
+            <a:pPr lvl="1"/>
+            <a:r>
+              <a:rPr lang="en-US"/>
+              <a:t>Second level</a:t>
+            </a:r>
+          </a:p>
+          <a:p>
+            <a:pPr lvl="2"/>
+            <a:r>
+              <a:rPr lang="en-US"/>
+              <a:t>Third level</a:t>
+            </a:r>
+          </a:p>
+          <a:p>
+            <a:pPr lvl="3"/>
+            <a:r>
+              <a:rPr lang="en-US"/>
+              <a:t>Fourth level</a:t>
+            </a:r>
+          </a:p>
+          <a:p>
+            <a:pPr lvl="4"/>
+            <a:r>
+              <a:rPr lang="en-US"/>
+              <a:t>Fifth level</a:t>
+            </a:r>
+          </a:p>
+        </p:txBody>
+      </p:sp>
+      <p:sp>
+        <p:nvSpPr>
+          <p:cNvPr id="6" name="Footer Placeholder 5"/>
+          <p:cNvSpPr>
+            <a:spLocks noGrp="1"/>
+          </p:cNvSpPr>
+          <p:nvPr>
+            <p:ph type="ftr" sz="quarter" idx="4"/>
+          </p:nvPr>
+        </p:nvSpPr>
+        <p:spPr>
+          <a:xfrm>
+            <a:off x="0" y="8685213"/>
+            <a:ext cx="2971800" cy="458787"/>
+          </a:xfrm>
+          <a:prstGeom prst="rect">
+            <a:avLst/>
+          </a:prstGeom>
+        </p:spPr>
+        <p:txBody>
+          <a:bodyPr vert="horz" lIns="91440" tIns="45720" rIns="91440" bIns="45720" rtlCol="0" anchor="b"/>
+          <a:lstStyle>
+            <a:lvl1pPr algn="l">
+              <a:defRPr sz="1200"/>
+            </a:lvl1pPr>
+          </a:lstStyle>
+          <a:p>
+            <a:endParaRPr lang="en-US"/>
+          </a:p>
+        </p:txBody>
+      </p:sp>
+      <p:sp>
+        <p:nvSpPr>
+          <p:cNvPr id="7" name="Slide Number Placeholder 6"/>
+          <p:cNvSpPr>
+            <a:spLocks noGrp="1"/>
+          </p:cNvSpPr>
+          <p:nvPr>
+            <p:ph type="sldNum" sz="quarter" idx="5"/>
+          </p:nvPr>
+        </p:nvSpPr>
+        <p:spPr>
+          <a:xfrm>
+            <a:off x="3884613" y="8685213"/>
+            <a:ext cx="2971800" cy="458787"/>
+          </a:xfrm>
+          <a:prstGeom prst="rect">
+            <a:avLst/>
+          </a:prstGeom>
+        </p:spPr>
+        <p:txBody>
+          <a:bodyPr vert="horz" lIns="91440" tIns="45720" rIns="91440" bIns="45720" rtlCol="0" anchor="b"/>
+          <a:lstStyle>
+            <a:lvl1pPr algn="r">
+              <a:defRPr sz="1200"/>
+            </a:lvl1pPr>
+          </a:lstStyle>
+          <a:p>
+            <a:fld id="{B9122BD1-4087-48A7-BD72-C1CFA9C767DC}" type="slidenum">
+              <a:rPr lang="en-US" smtClean="0"/>
+              <a:t>‹#›</a:t>
+            </a:fld>
+            <a:endParaRPr lang="en-US"/>
+          </a:p>
+        </p:txBody>
+      </p:sp>
+    </p:spTree>
+    <p:extLst>
+      <p:ext uri="{BB962C8B-B14F-4D97-AF65-F5344CB8AC3E}">
+        <p14:creationId xmlns:p14="http://schemas.microsoft.com/office/powerpoint/2010/main" val="2486576132"/>
+      </p:ext>
+    </p:extLst>
+  </p:cSld>
+  <p:clrMap bg1="lt1" tx1="dk1" bg2="lt2" tx2="dk2" accent1="accent1" accent2="accent2" accent3="accent3" accent4="accent4" accent5="accent5" accent6="accent6" hlink="hlink" folHlink="folHlink"/>
+  <p:notesStyle>
+    <a:lvl1pPr marL="0" algn="l" defTabSz="914400" rtl="0" eaLnBrk="1" latinLnBrk="0" hangingPunct="1">
+      <a:defRPr sz="1200" kern="1200">
+        <a:solidFill>
+          <a:schemeClr val="tx1"/>
+        </a:solidFill>
+        <a:latin typeface="+mn-lt"/>
+        <a:ea typeface="+mn-ea"/>
+        <a:cs typeface="+mn-cs"/>
+      </a:defRPr>
+    </a:lvl1pPr>
+    <a:lvl2pPr marL="457200" algn="l" defTabSz="914400" rtl="0" eaLnBrk="1" latinLnBrk="0" hangingPunct="1">
+      <a:defRPr sz="1200" kern="1200">
+        <a:solidFill>
+          <a:schemeClr val="tx1"/>
+        </a:solidFill>
+        <a:latin typeface="+mn-lt"/>
+        <a:ea typeface="+mn-ea"/>
+        <a:cs typeface="+mn-cs"/>
+      </a:defRPr>
+    </a:lvl2pPr>
+    <a:lvl3pPr marL="914400" algn="l" defTabSz="914400" rtl="0" eaLnBrk="1" latinLnBrk="0" hangingPunct="1">
+      <a:defRPr sz="1200" kern="1200">
+        <a:solidFill>
+          <a:schemeClr val="tx1"/>
+        </a:solidFill>
+        <a:latin typeface="+mn-lt"/>
+        <a:ea typeface="+mn-ea"/>
+        <a:cs typeface="+mn-cs"/>
+      </a:defRPr>
+    </a:lvl3pPr>
+    <a:lvl4pPr marL="1371600" algn="l" defTabSz="914400" rtl="0" eaLnBrk="1" latinLnBrk="0" hangingPunct="1">
+      <a:defRPr sz="1200" kern="1200">
+        <a:solidFill>
+          <a:schemeClr val="tx1"/>
+        </a:solidFill>
+        <a:latin typeface="+mn-lt"/>
+        <a:ea typeface="+mn-ea"/>
+        <a:cs typeface="+mn-cs"/>
+      </a:defRPr>
+    </a:lvl4pPr>
+    <a:lvl5pPr marL="1828800" algn="l" defTabSz="914400" rtl="0" eaLnBrk="1" latinLnBrk="0" hangingPunct="1">
+      <a:defRPr sz="1200" kern="1200">
+        <a:solidFill>
+          <a:schemeClr val="tx1"/>
+        </a:solidFill>
+        <a:latin typeface="+mn-lt"/>
+        <a:ea typeface="+mn-ea"/>
+        <a:cs typeface="+mn-cs"/>
+      </a:defRPr>
+    </a:lvl5pPr>
+    <a:lvl6pPr marL="2286000" algn="l" defTabSz="914400" rtl="0" eaLnBrk="1" latinLnBrk="0" hangingPunct="1">
+      <a:defRPr sz="1200" kern="1200">
+        <a:solidFill>
+          <a:schemeClr val="tx1"/>
+        </a:solidFill>
+        <a:latin typeface="+mn-lt"/>
+        <a:ea typeface="+mn-ea"/>
+        <a:cs typeface="+mn-cs"/>
+      </a:defRPr>
+    </a:lvl6pPr>
+    <a:lvl7pPr marL="2743200" algn="l" defTabSz="914400" rtl="0" eaLnBrk="1" latinLnBrk="0" hangingPunct="1">
+      <a:defRPr sz="1200" kern="1200">
+        <a:solidFill>
+          <a:schemeClr val="tx1"/>
+        </a:solidFill>
+        <a:latin typeface="+mn-lt"/>
+        <a:ea typeface="+mn-ea"/>
+        <a:cs typeface="+mn-cs"/>
+      </a:defRPr>
+    </a:lvl7pPr>
+    <a:lvl8pPr marL="3200400" algn="l" defTabSz="914400" rtl="0" eaLnBrk="1" latinLnBrk="0" hangingPunct="1">
+      <a:defRPr sz="1200" kern="1200">
+        <a:solidFill>
+          <a:schemeClr val="tx1"/>
+        </a:solidFill>
+        <a:latin typeface="+mn-lt"/>
+        <a:ea typeface="+mn-ea"/>
+        <a:cs typeface="+mn-cs"/>
+      </a:defRPr>
+    </a:lvl8pPr>
+    <a:lvl9pPr marL="3657600" algn="l" defTabSz="914400" rtl="0" eaLnBrk="1" latinLnBrk="0" hangingPunct="1">
+      <a:defRPr sz="1200" kern="1200">
+        <a:solidFill>
+          <a:schemeClr val="tx1"/>
+        </a:solidFill>
+        <a:latin typeface="+mn-lt"/>
+        <a:ea typeface="+mn-ea"/>
+        <a:cs typeface="+mn-cs"/>
+      </a:defRPr>
+    </a:lvl9pPr>
+  </p:notesStyle>
+</p:notesMaster>
+</file>
+
+<file path=ppt/notesSlides/notesSlide1.xml><?xml version="1.0" encoding="utf-8"?>
+<p:notes xmlns:a="http://schemas.openxmlformats.org/drawingml/2006/main" xmlns:r="http://schemas.openxmlformats.org/officeDocument/2006/relationships" xmlns:p="http://schemas.openxmlformats.org/presentationml/2006/main">
+  <p:cSld>
+    <p:spTree>
+      <p:nvGrpSpPr>
+        <p:cNvPr id="1" name=""/>
+        <p:cNvGrpSpPr/>
+        <p:nvPr/>
+      </p:nvGrpSpPr>
+      <p:grpSpPr>
+        <a:xfrm>
+          <a:off x="0" y="0"/>
+          <a:ext cx="0" cy="0"/>
+          <a:chOff x="0" y="0"/>
+          <a:chExt cx="0" cy="0"/>
+        </a:xfrm>
+      </p:grpSpPr>
+      <p:sp>
+        <p:nvSpPr>
+          <p:cNvPr id="2" name="Slide Image Placeholder 1"/>
+          <p:cNvSpPr>
+            <a:spLocks noGrp="1" noRot="1" noChangeAspect="1"/>
+          </p:cNvSpPr>
+          <p:nvPr>
+            <p:ph type="sldImg"/>
+          </p:nvPr>
+        </p:nvSpPr>
+        <p:spPr/>
+      </p:sp>
+      <p:sp>
+        <p:nvSpPr>
+          <p:cNvPr id="3" name="Notes Placeholder 2"/>
+          <p:cNvSpPr>
+            <a:spLocks noGrp="1"/>
+          </p:cNvSpPr>
+          <p:nvPr>
+            <p:ph type="body" idx="1"/>
+          </p:nvPr>
+        </p:nvSpPr>
+        <p:spPr/>
+        <p:txBody>
+          <a:bodyPr/>
+          <a:lstStyle/>
+          <a:p>
+            <a:pPr marL="0" marR="0" lvl="0" indent="0" algn="l" defTabSz="914400" rtl="0" eaLnBrk="1" fontAlgn="auto" latinLnBrk="0" hangingPunct="1">
+              <a:lnSpc>
+                <a:spcPct val="100000"/>
+              </a:lnSpc>
+              <a:spcBef>
+                <a:spcPts val="0"/>
+              </a:spcBef>
+              <a:spcAft>
+                <a:spcPts val="0"/>
+              </a:spcAft>
+              <a:buClrTx/>
+              <a:buSzTx/>
+              <a:buFontTx/>
+              <a:buNone/>
+              <a:tabLst/>
+              <a:defRPr/>
+            </a:pPr>
+            <a:r>
+              <a:rPr lang="en-US" sz="1800" dirty="0">
+                <a:effectLst/>
+                <a:latin typeface="Calibri" panose="020F0502020204030204" pitchFamily="34" charset="0"/>
+                <a:ea typeface="Calibri" panose="020F0502020204030204" pitchFamily="34" charset="0"/>
+                <a:cs typeface="Times New Roman" panose="02020603050405020304" pitchFamily="18" charset="0"/>
+              </a:rPr>
+              <a:t>Most countries in our sample spend between 2%-7% of their budget on education.</a:t>
+            </a:r>
+          </a:p>
+        </p:txBody>
+      </p:sp>
+      <p:sp>
+        <p:nvSpPr>
+          <p:cNvPr id="4" name="Slide Number Placeholder 3"/>
+          <p:cNvSpPr>
+            <a:spLocks noGrp="1"/>
+          </p:cNvSpPr>
+          <p:nvPr>
+            <p:ph type="sldNum" sz="quarter" idx="5"/>
+          </p:nvPr>
+        </p:nvSpPr>
+        <p:spPr/>
+        <p:txBody>
+          <a:bodyPr/>
+          <a:lstStyle/>
+          <a:p>
+            <a:fld id="{B9122BD1-4087-48A7-BD72-C1CFA9C767DC}" type="slidenum">
+              <a:rPr lang="en-US" smtClean="0"/>
+              <a:t>2</a:t>
+            </a:fld>
+            <a:endParaRPr lang="en-US"/>
+          </a:p>
+        </p:txBody>
+      </p:sp>
+    </p:spTree>
+    <p:extLst>
+      <p:ext uri="{BB962C8B-B14F-4D97-AF65-F5344CB8AC3E}">
+        <p14:creationId xmlns:p14="http://schemas.microsoft.com/office/powerpoint/2010/main" val="2015839983"/>
+      </p:ext>
+    </p:extLst>
+  </p:cSld>
+  <p:clrMapOvr>
+    <a:masterClrMapping/>
+  </p:clrMapOvr>
+</p:notes>
+</file>
+
+<file path=ppt/notesSlides/notesSlide2.xml><?xml version="1.0" encoding="utf-8"?>
+<p:notes xmlns:a="http://schemas.openxmlformats.org/drawingml/2006/main" xmlns:r="http://schemas.openxmlformats.org/officeDocument/2006/relationships" xmlns:p="http://schemas.openxmlformats.org/presentationml/2006/main">
+  <p:cSld>
+    <p:spTree>
+      <p:nvGrpSpPr>
+        <p:cNvPr id="1" name=""/>
+        <p:cNvGrpSpPr/>
+        <p:nvPr/>
+      </p:nvGrpSpPr>
+      <p:grpSpPr>
+        <a:xfrm>
+          <a:off x="0" y="0"/>
+          <a:ext cx="0" cy="0"/>
+          <a:chOff x="0" y="0"/>
+          <a:chExt cx="0" cy="0"/>
+        </a:xfrm>
+      </p:grpSpPr>
+      <p:sp>
+        <p:nvSpPr>
+          <p:cNvPr id="2" name="Slide Image Placeholder 1"/>
+          <p:cNvSpPr>
+            <a:spLocks noGrp="1" noRot="1" noChangeAspect="1"/>
+          </p:cNvSpPr>
+          <p:nvPr>
+            <p:ph type="sldImg"/>
+          </p:nvPr>
+        </p:nvSpPr>
+        <p:spPr/>
+      </p:sp>
+      <p:sp>
+        <p:nvSpPr>
+          <p:cNvPr id="3" name="Notes Placeholder 2"/>
+          <p:cNvSpPr>
+            <a:spLocks noGrp="1"/>
+          </p:cNvSpPr>
+          <p:nvPr>
+            <p:ph type="body" idx="1"/>
+          </p:nvPr>
+        </p:nvSpPr>
+        <p:spPr/>
+        <p:txBody>
+          <a:bodyPr/>
+          <a:lstStyle/>
+          <a:p>
+            <a:r>
+              <a:rPr lang="en-US" dirty="0"/>
+              <a:t>Majority of top spending are developed countries, majority of bottom spending are developing countries</a:t>
+            </a:r>
+          </a:p>
+        </p:txBody>
+      </p:sp>
+      <p:sp>
+        <p:nvSpPr>
+          <p:cNvPr id="4" name="Slide Number Placeholder 3"/>
+          <p:cNvSpPr>
+            <a:spLocks noGrp="1"/>
+          </p:cNvSpPr>
+          <p:nvPr>
+            <p:ph type="sldNum" sz="quarter" idx="5"/>
+          </p:nvPr>
+        </p:nvSpPr>
+        <p:spPr/>
+        <p:txBody>
+          <a:bodyPr/>
+          <a:lstStyle/>
+          <a:p>
+            <a:fld id="{B9122BD1-4087-48A7-BD72-C1CFA9C767DC}" type="slidenum">
+              <a:rPr lang="en-US" smtClean="0"/>
+              <a:t>3</a:t>
+            </a:fld>
+            <a:endParaRPr lang="en-US"/>
+          </a:p>
+        </p:txBody>
+      </p:sp>
+    </p:spTree>
+    <p:extLst>
+      <p:ext uri="{BB962C8B-B14F-4D97-AF65-F5344CB8AC3E}">
+        <p14:creationId xmlns:p14="http://schemas.microsoft.com/office/powerpoint/2010/main" val="1133119254"/>
+      </p:ext>
+    </p:extLst>
+  </p:cSld>
+  <p:clrMapOvr>
+    <a:masterClrMapping/>
+  </p:clrMapOvr>
+</p:notes>
+</file>
+
+<file path=ppt/notesSlides/notesSlide3.xml><?xml version="1.0" encoding="utf-8"?>
+<p:notes xmlns:a="http://schemas.openxmlformats.org/drawingml/2006/main" xmlns:r="http://schemas.openxmlformats.org/officeDocument/2006/relationships" xmlns:p="http://schemas.openxmlformats.org/presentationml/2006/main">
+  <p:cSld>
+    <p:spTree>
+      <p:nvGrpSpPr>
+        <p:cNvPr id="1" name=""/>
+        <p:cNvGrpSpPr/>
+        <p:nvPr/>
+      </p:nvGrpSpPr>
+      <p:grpSpPr>
+        <a:xfrm>
+          <a:off x="0" y="0"/>
+          <a:ext cx="0" cy="0"/>
+          <a:chOff x="0" y="0"/>
+          <a:chExt cx="0" cy="0"/>
+        </a:xfrm>
+      </p:grpSpPr>
+      <p:sp>
+        <p:nvSpPr>
+          <p:cNvPr id="2" name="Slide Image Placeholder 1"/>
+          <p:cNvSpPr>
+            <a:spLocks noGrp="1" noRot="1" noChangeAspect="1"/>
+          </p:cNvSpPr>
+          <p:nvPr>
+            <p:ph type="sldImg"/>
+          </p:nvPr>
+        </p:nvSpPr>
+        <p:spPr/>
+      </p:sp>
+      <p:sp>
+        <p:nvSpPr>
+          <p:cNvPr id="3" name="Notes Placeholder 2"/>
+          <p:cNvSpPr>
+            <a:spLocks noGrp="1"/>
+          </p:cNvSpPr>
+          <p:nvPr>
+            <p:ph type="body" idx="1"/>
+          </p:nvPr>
+        </p:nvSpPr>
+        <p:spPr/>
+        <p:txBody>
+          <a:bodyPr/>
+          <a:lstStyle/>
+          <a:p>
+            <a:endParaRPr lang="en-US" dirty="0"/>
+          </a:p>
+        </p:txBody>
+      </p:sp>
+      <p:sp>
+        <p:nvSpPr>
+          <p:cNvPr id="4" name="Slide Number Placeholder 3"/>
+          <p:cNvSpPr>
+            <a:spLocks noGrp="1"/>
+          </p:cNvSpPr>
+          <p:nvPr>
+            <p:ph type="sldNum" sz="quarter" idx="5"/>
+          </p:nvPr>
+        </p:nvSpPr>
+        <p:spPr/>
+        <p:txBody>
+          <a:bodyPr/>
+          <a:lstStyle/>
+          <a:p>
+            <a:fld id="{B9122BD1-4087-48A7-BD72-C1CFA9C767DC}" type="slidenum">
+              <a:rPr lang="en-US" smtClean="0"/>
+              <a:t>4</a:t>
+            </a:fld>
+            <a:endParaRPr lang="en-US"/>
+          </a:p>
+        </p:txBody>
+      </p:sp>
+    </p:spTree>
+    <p:extLst>
+      <p:ext uri="{BB962C8B-B14F-4D97-AF65-F5344CB8AC3E}">
+        <p14:creationId xmlns:p14="http://schemas.microsoft.com/office/powerpoint/2010/main" val="1689305134"/>
+      </p:ext>
+    </p:extLst>
+  </p:cSld>
+  <p:clrMapOvr>
+    <a:masterClrMapping/>
+  </p:clrMapOvr>
+</p:notes>
 </file>
 
 <file path=ppt/slideLayouts/slideLayout1.xml><?xml version="1.0" encoding="utf-8"?>
@@ -294,7 +1446,7 @@
           <a:p>
             <a:fld id="{A2DFFAD6-D340-4393-B034-6B57DCEA9FCE}" type="datetimeFigureOut">
               <a:rPr lang="en-US" smtClean="0"/>
-              <a:t>2/8/2021</a:t>
+              <a:t>2/10/2021</a:t>
             </a:fld>
             <a:endParaRPr lang="en-US"/>
           </a:p>
@@ -492,7 +1644,7 @@
           <a:p>
             <a:fld id="{A2DFFAD6-D340-4393-B034-6B57DCEA9FCE}" type="datetimeFigureOut">
               <a:rPr lang="en-US" smtClean="0"/>
-              <a:t>2/8/2021</a:t>
+              <a:t>2/10/2021</a:t>
             </a:fld>
             <a:endParaRPr lang="en-US"/>
           </a:p>
@@ -700,7 +1852,7 @@
           <a:p>
             <a:fld id="{A2DFFAD6-D340-4393-B034-6B57DCEA9FCE}" type="datetimeFigureOut">
               <a:rPr lang="en-US" smtClean="0"/>
-              <a:t>2/8/2021</a:t>
+              <a:t>2/10/2021</a:t>
             </a:fld>
             <a:endParaRPr lang="en-US"/>
           </a:p>
@@ -898,7 +2050,7 @@
           <a:p>
             <a:fld id="{A2DFFAD6-D340-4393-B034-6B57DCEA9FCE}" type="datetimeFigureOut">
               <a:rPr lang="en-US" smtClean="0"/>
-              <a:t>2/8/2021</a:t>
+              <a:t>2/10/2021</a:t>
             </a:fld>
             <a:endParaRPr lang="en-US"/>
           </a:p>
@@ -1173,7 +2325,7 @@
           <a:p>
             <a:fld id="{A2DFFAD6-D340-4393-B034-6B57DCEA9FCE}" type="datetimeFigureOut">
               <a:rPr lang="en-US" smtClean="0"/>
-              <a:t>2/8/2021</a:t>
+              <a:t>2/10/2021</a:t>
             </a:fld>
             <a:endParaRPr lang="en-US"/>
           </a:p>
@@ -1438,7 +2590,7 @@
           <a:p>
             <a:fld id="{A2DFFAD6-D340-4393-B034-6B57DCEA9FCE}" type="datetimeFigureOut">
               <a:rPr lang="en-US" smtClean="0"/>
-              <a:t>2/8/2021</a:t>
+              <a:t>2/10/2021</a:t>
             </a:fld>
             <a:endParaRPr lang="en-US"/>
           </a:p>
@@ -1850,7 +3002,7 @@
           <a:p>
             <a:fld id="{A2DFFAD6-D340-4393-B034-6B57DCEA9FCE}" type="datetimeFigureOut">
               <a:rPr lang="en-US" smtClean="0"/>
-              <a:t>2/8/2021</a:t>
+              <a:t>2/10/2021</a:t>
             </a:fld>
             <a:endParaRPr lang="en-US"/>
           </a:p>
@@ -1991,7 +3143,7 @@
           <a:p>
             <a:fld id="{A2DFFAD6-D340-4393-B034-6B57DCEA9FCE}" type="datetimeFigureOut">
               <a:rPr lang="en-US" smtClean="0"/>
-              <a:t>2/8/2021</a:t>
+              <a:t>2/10/2021</a:t>
             </a:fld>
             <a:endParaRPr lang="en-US"/>
           </a:p>
@@ -2104,7 +3256,7 @@
           <a:p>
             <a:fld id="{A2DFFAD6-D340-4393-B034-6B57DCEA9FCE}" type="datetimeFigureOut">
               <a:rPr lang="en-US" smtClean="0"/>
-              <a:t>2/8/2021</a:t>
+              <a:t>2/10/2021</a:t>
             </a:fld>
             <a:endParaRPr lang="en-US"/>
           </a:p>
@@ -2415,7 +3567,7 @@
           <a:p>
             <a:fld id="{A2DFFAD6-D340-4393-B034-6B57DCEA9FCE}" type="datetimeFigureOut">
               <a:rPr lang="en-US" smtClean="0"/>
-              <a:t>2/8/2021</a:t>
+              <a:t>2/10/2021</a:t>
             </a:fld>
             <a:endParaRPr lang="en-US"/>
           </a:p>
@@ -2703,7 +3855,7 @@
           <a:p>
             <a:fld id="{A2DFFAD6-D340-4393-B034-6B57DCEA9FCE}" type="datetimeFigureOut">
               <a:rPr lang="en-US" smtClean="0"/>
-              <a:t>2/8/2021</a:t>
+              <a:t>2/10/2021</a:t>
             </a:fld>
             <a:endParaRPr lang="en-US"/>
           </a:p>
@@ -2944,7 +4096,7 @@
           <a:p>
             <a:fld id="{A2DFFAD6-D340-4393-B034-6B57DCEA9FCE}" type="datetimeFigureOut">
               <a:rPr lang="en-US" smtClean="0"/>
-              <a:t>2/8/2021</a:t>
+              <a:t>2/10/2021</a:t>
             </a:fld>
             <a:endParaRPr lang="en-US"/>
           </a:p>
@@ -3444,37 +4596,12 @@
           <a:chExt cx="0" cy="0"/>
         </a:xfrm>
       </p:grpSpPr>
-      <p:sp>
-        <p:nvSpPr>
-          <p:cNvPr id="2" name="Title 1">
-            <a:extLst>
-              <a:ext uri="{FF2B5EF4-FFF2-40B4-BE49-F238E27FC236}">
-                <a16:creationId xmlns:a16="http://schemas.microsoft.com/office/drawing/2014/main" id="{C7F475B5-6199-44ED-A2EF-6239DFE8A788}"/>
-              </a:ext>
-            </a:extLst>
-          </p:cNvPr>
-          <p:cNvSpPr>
-            <a:spLocks noGrp="1"/>
-          </p:cNvSpPr>
-          <p:nvPr>
-            <p:ph type="title"/>
-          </p:nvPr>
-        </p:nvSpPr>
-        <p:spPr/>
-        <p:txBody>
-          <a:bodyPr/>
-          <a:lstStyle/>
-          <a:p>
-            <a:endParaRPr lang="en-US"/>
-          </a:p>
-        </p:txBody>
-      </p:sp>
       <p:pic>
         <p:nvPicPr>
-          <p:cNvPr id="5" name="Content Placeholder 4" descr="Chart&#10;&#10;Description automatically generated with low confidence">
-            <a:extLst>
-              <a:ext uri="{FF2B5EF4-FFF2-40B4-BE49-F238E27FC236}">
-                <a16:creationId xmlns:a16="http://schemas.microsoft.com/office/drawing/2014/main" id="{AAD6F2D5-39B0-4AD5-A594-B4E232F8A60D}"/>
+          <p:cNvPr id="13" name="Content Placeholder 12" descr="Chart, histogram&#10;&#10;Description automatically generated">
+            <a:extLst>
+              <a:ext uri="{FF2B5EF4-FFF2-40B4-BE49-F238E27FC236}">
+                <a16:creationId xmlns:a16="http://schemas.microsoft.com/office/drawing/2014/main" id="{35342913-8083-4A2A-9CB1-F64057EDD19C}"/>
               </a:ext>
             </a:extLst>
           </p:cNvPr>
@@ -3486,7 +4613,7 @@
           </p:nvPr>
         </p:nvPicPr>
         <p:blipFill>
-          <a:blip r:embed="rId2">
+          <a:blip r:embed="rId3">
             <a:extLst>
               <a:ext uri="{28A0092B-C50C-407E-A947-70E740481C1C}">
                 <a14:useLocalDpi xmlns:a14="http://schemas.microsoft.com/office/drawing/2010/main" val="0"/>
@@ -3499,24 +4626,56 @@
         </p:blipFill>
         <p:spPr>
           <a:xfrm>
-            <a:off x="3352175" y="2172077"/>
-            <a:ext cx="5487650" cy="3658433"/>
+            <a:off x="1289957" y="224971"/>
+            <a:ext cx="9612086" cy="6408057"/>
           </a:xfrm>
         </p:spPr>
       </p:pic>
+    </p:spTree>
+    <p:extLst>
+      <p:ext uri="{BB962C8B-B14F-4D97-AF65-F5344CB8AC3E}">
+        <p14:creationId xmlns:p14="http://schemas.microsoft.com/office/powerpoint/2010/main" val="3141419273"/>
+      </p:ext>
+    </p:extLst>
+  </p:cSld>
+  <p:clrMapOvr>
+    <a:masterClrMapping/>
+  </p:clrMapOvr>
+</p:sld>
+</file>
+
+<file path=ppt/slides/slide3.xml><?xml version="1.0" encoding="utf-8"?>
+<p:sld xmlns:a="http://schemas.openxmlformats.org/drawingml/2006/main" xmlns:r="http://schemas.openxmlformats.org/officeDocument/2006/relationships" xmlns:p="http://schemas.openxmlformats.org/presentationml/2006/main">
+  <p:cSld>
+    <p:spTree>
+      <p:nvGrpSpPr>
+        <p:cNvPr id="1" name=""/>
+        <p:cNvGrpSpPr/>
+        <p:nvPr/>
+      </p:nvGrpSpPr>
+      <p:grpSpPr>
+        <a:xfrm>
+          <a:off x="0" y="0"/>
+          <a:ext cx="0" cy="0"/>
+          <a:chOff x="0" y="0"/>
+          <a:chExt cx="0" cy="0"/>
+        </a:xfrm>
+      </p:grpSpPr>
       <p:pic>
         <p:nvPicPr>
-          <p:cNvPr id="7" name="Picture 6" descr="Chart&#10;&#10;Description automatically generated">
-            <a:extLst>
-              <a:ext uri="{FF2B5EF4-FFF2-40B4-BE49-F238E27FC236}">
-                <a16:creationId xmlns:a16="http://schemas.microsoft.com/office/drawing/2014/main" id="{74A9C84D-CEA5-4730-8F11-EAF2B085D5CE}"/>
+          <p:cNvPr id="10" name="Content Placeholder 9" descr="Chart, bar chart&#10;&#10;Description automatically generated">
+            <a:extLst>
+              <a:ext uri="{FF2B5EF4-FFF2-40B4-BE49-F238E27FC236}">
+                <a16:creationId xmlns:a16="http://schemas.microsoft.com/office/drawing/2014/main" id="{EE545CF6-106F-4588-854B-54D87087D129}"/>
               </a:ext>
             </a:extLst>
           </p:cNvPr>
           <p:cNvPicPr>
-            <a:picLocks noChangeAspect="1"/>
+            <a:picLocks noGrp="1" noChangeAspect="1"/>
           </p:cNvPicPr>
-          <p:nvPr/>
+          <p:nvPr>
+            <p:ph idx="1"/>
+          </p:nvPr>
         </p:nvPicPr>
         <p:blipFill>
           <a:blip r:embed="rId3">
@@ -3532,20 +4691,17 @@
         </p:blipFill>
         <p:spPr>
           <a:xfrm>
-            <a:off x="3352175" y="2172076"/>
-            <a:ext cx="5487650" cy="3658433"/>
+            <a:off x="1451115" y="332410"/>
+            <a:ext cx="9289769" cy="6193179"/>
           </a:xfrm>
-          <a:prstGeom prst="rect">
-            <a:avLst/>
-          </a:prstGeom>
         </p:spPr>
       </p:pic>
       <p:pic>
         <p:nvPicPr>
-          <p:cNvPr id="9" name="Picture 8" descr="A picture containing text&#10;&#10;Description automatically generated">
-            <a:extLst>
-              <a:ext uri="{FF2B5EF4-FFF2-40B4-BE49-F238E27FC236}">
-                <a16:creationId xmlns:a16="http://schemas.microsoft.com/office/drawing/2014/main" id="{E834428E-66E7-493F-99DF-5073F72F352C}"/>
+          <p:cNvPr id="12" name="Picture 11" descr="Chart, bar chart&#10;&#10;Description automatically generated">
+            <a:extLst>
+              <a:ext uri="{FF2B5EF4-FFF2-40B4-BE49-F238E27FC236}">
+                <a16:creationId xmlns:a16="http://schemas.microsoft.com/office/drawing/2014/main" id="{E69D1734-062D-4D06-AE52-E30AACF5151B}"/>
               </a:ext>
             </a:extLst>
           </p:cNvPr>
@@ -3568,8 +4724,8 @@
         </p:blipFill>
         <p:spPr>
           <a:xfrm>
-            <a:off x="1749286" y="0"/>
-            <a:ext cx="10243930" cy="6829286"/>
+            <a:off x="1451115" y="332410"/>
+            <a:ext cx="9559786" cy="6373190"/>
           </a:xfrm>
           <a:prstGeom prst="rect">
             <a:avLst/>
@@ -3579,7 +4735,7 @@
     </p:spTree>
     <p:extLst>
       <p:ext uri="{BB962C8B-B14F-4D97-AF65-F5344CB8AC3E}">
-        <p14:creationId xmlns:p14="http://schemas.microsoft.com/office/powerpoint/2010/main" val="3141419273"/>
+        <p14:creationId xmlns:p14="http://schemas.microsoft.com/office/powerpoint/2010/main" val="3775528676"/>
       </p:ext>
     </p:extLst>
   </p:cSld>
@@ -3607,7 +4763,7 @@
                             </p:stCondLst>
                             <p:childTnLst>
                               <p:par>
-                                <p:cTn id="5" presetID="10" presetClass="entr" presetSubtype="0" fill="hold" nodeType="clickEffect">
+                                <p:cTn id="5" presetID="1" presetClass="entr" presetSubtype="0" fill="hold" nodeType="clickEffect">
                                   <p:stCondLst>
                                     <p:cond delay="0"/>
                                   </p:stCondLst>
@@ -3620,7 +4776,7 @@
                                           </p:stCondLst>
                                         </p:cTn>
                                         <p:tgtEl>
-                                          <p:spTgt spid="7"/>
+                                          <p:spTgt spid="10"/>
                                         </p:tgtEl>
                                         <p:attrNameLst>
                                           <p:attrName>style.visibility</p:attrName>
@@ -3630,14 +4786,6 @@
                                         <p:strVal val="visible"/>
                                       </p:to>
                                     </p:set>
-                                    <p:animEffect transition="in" filter="fade">
-                                      <p:cBhvr>
-                                        <p:cTn id="7" dur="500"/>
-                                        <p:tgtEl>
-                                          <p:spTgt spid="7"/>
-                                        </p:tgtEl>
-                                      </p:cBhvr>
-                                    </p:animEffect>
                                   </p:childTnLst>
                                 </p:cTn>
                               </p:par>
@@ -3648,32 +4796,32 @@
                     </p:cTn>
                   </p:par>
                   <p:par>
-                    <p:cTn id="8" fill="hold">
+                    <p:cTn id="7" fill="hold">
                       <p:stCondLst>
                         <p:cond delay="indefinite"/>
                       </p:stCondLst>
                       <p:childTnLst>
                         <p:par>
-                          <p:cTn id="9" fill="hold">
+                          <p:cTn id="8" fill="hold">
                             <p:stCondLst>
                               <p:cond delay="0"/>
                             </p:stCondLst>
                             <p:childTnLst>
                               <p:par>
-                                <p:cTn id="10" presetID="10" presetClass="entr" presetSubtype="0" fill="hold" nodeType="clickEffect">
+                                <p:cTn id="9" presetID="1" presetClass="entr" presetSubtype="0" fill="hold" nodeType="clickEffect">
                                   <p:stCondLst>
                                     <p:cond delay="0"/>
                                   </p:stCondLst>
                                   <p:childTnLst>
                                     <p:set>
                                       <p:cBhvr>
-                                        <p:cTn id="11" dur="1" fill="hold">
+                                        <p:cTn id="10" dur="1" fill="hold">
                                           <p:stCondLst>
                                             <p:cond delay="0"/>
                                           </p:stCondLst>
                                         </p:cTn>
                                         <p:tgtEl>
-                                          <p:spTgt spid="9"/>
+                                          <p:spTgt spid="12"/>
                                         </p:tgtEl>
                                         <p:attrNameLst>
                                           <p:attrName>style.visibility</p:attrName>
@@ -3683,262 +4831,6 @@
                                         <p:strVal val="visible"/>
                                       </p:to>
                                     </p:set>
-                                    <p:animEffect transition="in" filter="fade">
-                                      <p:cBhvr>
-                                        <p:cTn id="12" dur="500"/>
-                                        <p:tgtEl>
-                                          <p:spTgt spid="9"/>
-                                        </p:tgtEl>
-                                      </p:cBhvr>
-                                    </p:animEffect>
-                                  </p:childTnLst>
-                                </p:cTn>
-                              </p:par>
-                            </p:childTnLst>
-                          </p:cTn>
-                        </p:par>
-                      </p:childTnLst>
-                    </p:cTn>
-                  </p:par>
-                </p:childTnLst>
-              </p:cTn>
-              <p:prevCondLst>
-                <p:cond evt="onPrev" delay="0">
-                  <p:tgtEl>
-                    <p:sldTgt/>
-                  </p:tgtEl>
-                </p:cond>
-              </p:prevCondLst>
-              <p:nextCondLst>
-                <p:cond evt="onNext" delay="0">
-                  <p:tgtEl>
-                    <p:sldTgt/>
-                  </p:tgtEl>
-                </p:cond>
-              </p:nextCondLst>
-            </p:seq>
-          </p:childTnLst>
-        </p:cTn>
-      </p:par>
-    </p:tnLst>
-  </p:timing>
-</p:sld>
-</file>
-
-<file path=ppt/slides/slide3.xml><?xml version="1.0" encoding="utf-8"?>
-<p:sld xmlns:a="http://schemas.openxmlformats.org/drawingml/2006/main" xmlns:r="http://schemas.openxmlformats.org/officeDocument/2006/relationships" xmlns:p="http://schemas.openxmlformats.org/presentationml/2006/main">
-  <p:cSld>
-    <p:spTree>
-      <p:nvGrpSpPr>
-        <p:cNvPr id="1" name=""/>
-        <p:cNvGrpSpPr/>
-        <p:nvPr/>
-      </p:nvGrpSpPr>
-      <p:grpSpPr>
-        <a:xfrm>
-          <a:off x="0" y="0"/>
-          <a:ext cx="0" cy="0"/>
-          <a:chOff x="0" y="0"/>
-          <a:chExt cx="0" cy="0"/>
-        </a:xfrm>
-      </p:grpSpPr>
-      <p:sp>
-        <p:nvSpPr>
-          <p:cNvPr id="2" name="Title 1">
-            <a:extLst>
-              <a:ext uri="{FF2B5EF4-FFF2-40B4-BE49-F238E27FC236}">
-                <a16:creationId xmlns:a16="http://schemas.microsoft.com/office/drawing/2014/main" id="{7F079A88-C9C7-4D16-88B9-5D13691C278E}"/>
-              </a:ext>
-            </a:extLst>
-          </p:cNvPr>
-          <p:cNvSpPr>
-            <a:spLocks noGrp="1"/>
-          </p:cNvSpPr>
-          <p:nvPr>
-            <p:ph type="title"/>
-          </p:nvPr>
-        </p:nvSpPr>
-        <p:spPr/>
-        <p:txBody>
-          <a:bodyPr/>
-          <a:lstStyle/>
-          <a:p>
-            <a:endParaRPr lang="en-US"/>
-          </a:p>
-        </p:txBody>
-      </p:sp>
-      <p:pic>
-        <p:nvPicPr>
-          <p:cNvPr id="5" name="Content Placeholder 4" descr="Chart, bar chart&#10;&#10;Description automatically generated">
-            <a:extLst>
-              <a:ext uri="{FF2B5EF4-FFF2-40B4-BE49-F238E27FC236}">
-                <a16:creationId xmlns:a16="http://schemas.microsoft.com/office/drawing/2014/main" id="{080B441D-2B13-4B79-A9EE-C5E249C6F445}"/>
-              </a:ext>
-            </a:extLst>
-          </p:cNvPr>
-          <p:cNvPicPr>
-            <a:picLocks noGrp="1" noChangeAspect="1"/>
-          </p:cNvPicPr>
-          <p:nvPr>
-            <p:ph idx="1"/>
-          </p:nvPr>
-        </p:nvPicPr>
-        <p:blipFill>
-          <a:blip r:embed="rId2">
-            <a:extLst>
-              <a:ext uri="{28A0092B-C50C-407E-A947-70E740481C1C}">
-                <a14:useLocalDpi xmlns:a14="http://schemas.microsoft.com/office/drawing/2010/main" val="0"/>
-              </a:ext>
-            </a:extLst>
-          </a:blip>
-          <a:stretch>
-            <a:fillRect/>
-          </a:stretch>
-        </p:blipFill>
-        <p:spPr>
-          <a:xfrm>
-            <a:off x="3352175" y="2172077"/>
-            <a:ext cx="5487650" cy="3658433"/>
-          </a:xfrm>
-        </p:spPr>
-      </p:pic>
-      <p:pic>
-        <p:nvPicPr>
-          <p:cNvPr id="7" name="Picture 6" descr="Chart, bar chart&#10;&#10;Description automatically generated">
-            <a:extLst>
-              <a:ext uri="{FF2B5EF4-FFF2-40B4-BE49-F238E27FC236}">
-                <a16:creationId xmlns:a16="http://schemas.microsoft.com/office/drawing/2014/main" id="{83F549DC-BE1F-4C14-99A3-EC4D9AE88410}"/>
-              </a:ext>
-            </a:extLst>
-          </p:cNvPr>
-          <p:cNvPicPr>
-            <a:picLocks noChangeAspect="1"/>
-          </p:cNvPicPr>
-          <p:nvPr/>
-        </p:nvPicPr>
-        <p:blipFill>
-          <a:blip r:embed="rId3">
-            <a:extLst>
-              <a:ext uri="{28A0092B-C50C-407E-A947-70E740481C1C}">
-                <a14:useLocalDpi xmlns:a14="http://schemas.microsoft.com/office/drawing/2010/main" val="0"/>
-              </a:ext>
-            </a:extLst>
-          </a:blip>
-          <a:stretch>
-            <a:fillRect/>
-          </a:stretch>
-        </p:blipFill>
-        <p:spPr>
-          <a:xfrm>
-            <a:off x="3352175" y="2172077"/>
-            <a:ext cx="5487650" cy="3658433"/>
-          </a:xfrm>
-          <a:prstGeom prst="rect">
-            <a:avLst/>
-          </a:prstGeom>
-        </p:spPr>
-      </p:pic>
-      <p:sp>
-        <p:nvSpPr>
-          <p:cNvPr id="8" name="TextBox 7">
-            <a:extLst>
-              <a:ext uri="{FF2B5EF4-FFF2-40B4-BE49-F238E27FC236}">
-                <a16:creationId xmlns:a16="http://schemas.microsoft.com/office/drawing/2014/main" id="{EE4D4882-F8D5-4D21-A88D-50B7E1C707A4}"/>
-              </a:ext>
-            </a:extLst>
-          </p:cNvPr>
-          <p:cNvSpPr txBox="1"/>
-          <p:nvPr/>
-        </p:nvSpPr>
-        <p:spPr>
-          <a:xfrm rot="1174716">
-            <a:off x="1535798" y="3363931"/>
-            <a:ext cx="9120402" cy="584775"/>
-          </a:xfrm>
-          <a:prstGeom prst="rect">
-            <a:avLst/>
-          </a:prstGeom>
-          <a:noFill/>
-        </p:spPr>
-        <p:txBody>
-          <a:bodyPr wrap="square" rtlCol="0">
-            <a:spAutoFit/>
-          </a:bodyPr>
-          <a:lstStyle/>
-          <a:p>
-            <a:r>
-              <a:rPr lang="en-US" sz="3200" dirty="0">
-                <a:solidFill>
-                  <a:srgbClr val="FF0000"/>
-                </a:solidFill>
-              </a:rPr>
-              <a:t>We need to fix the top and bottom 20 fit (tight layout)</a:t>
-            </a:r>
-          </a:p>
-        </p:txBody>
-      </p:sp>
-    </p:spTree>
-    <p:extLst>
-      <p:ext uri="{BB962C8B-B14F-4D97-AF65-F5344CB8AC3E}">
-        <p14:creationId xmlns:p14="http://schemas.microsoft.com/office/powerpoint/2010/main" val="1089195357"/>
-      </p:ext>
-    </p:extLst>
-  </p:cSld>
-  <p:clrMapOvr>
-    <a:masterClrMapping/>
-  </p:clrMapOvr>
-  <p:timing>
-    <p:tnLst>
-      <p:par>
-        <p:cTn id="1" dur="indefinite" restart="never" nodeType="tmRoot">
-          <p:childTnLst>
-            <p:seq concurrent="1" nextAc="seek">
-              <p:cTn id="2" dur="indefinite" nodeType="mainSeq">
-                <p:childTnLst>
-                  <p:par>
-                    <p:cTn id="3" fill="hold">
-                      <p:stCondLst>
-                        <p:cond delay="indefinite"/>
-                      </p:stCondLst>
-                      <p:childTnLst>
-                        <p:par>
-                          <p:cTn id="4" fill="hold">
-                            <p:stCondLst>
-                              <p:cond delay="0"/>
-                            </p:stCondLst>
-                            <p:childTnLst>
-                              <p:par>
-                                <p:cTn id="5" presetID="10" presetClass="entr" presetSubtype="0" fill="hold" nodeType="clickEffect">
-                                  <p:stCondLst>
-                                    <p:cond delay="0"/>
-                                  </p:stCondLst>
-                                  <p:childTnLst>
-                                    <p:set>
-                                      <p:cBhvr>
-                                        <p:cTn id="6" dur="1" fill="hold">
-                                          <p:stCondLst>
-                                            <p:cond delay="0"/>
-                                          </p:stCondLst>
-                                        </p:cTn>
-                                        <p:tgtEl>
-                                          <p:spTgt spid="7"/>
-                                        </p:tgtEl>
-                                        <p:attrNameLst>
-                                          <p:attrName>style.visibility</p:attrName>
-                                        </p:attrNameLst>
-                                      </p:cBhvr>
-                                      <p:to>
-                                        <p:strVal val="visible"/>
-                                      </p:to>
-                                    </p:set>
-                                    <p:animEffect transition="in" filter="fade">
-                                      <p:cBhvr>
-                                        <p:cTn id="7" dur="500"/>
-                                        <p:tgtEl>
-                                          <p:spTgt spid="7"/>
-                                        </p:tgtEl>
-                                      </p:cBhvr>
-                                    </p:animEffect>
                                   </p:childTnLst>
                                 </p:cTn>
                               </p:par>
@@ -3990,60 +4882,45 @@
           <a:chExt cx="0" cy="0"/>
         </a:xfrm>
       </p:grpSpPr>
-      <p:sp>
-        <p:nvSpPr>
-          <p:cNvPr id="2" name="Title 1">
-            <a:extLst>
-              <a:ext uri="{FF2B5EF4-FFF2-40B4-BE49-F238E27FC236}">
-                <a16:creationId xmlns:a16="http://schemas.microsoft.com/office/drawing/2014/main" id="{6E421596-6AE3-4F52-8257-34CA3F092DA4}"/>
-              </a:ext>
-            </a:extLst>
-          </p:cNvPr>
-          <p:cNvSpPr>
-            <a:spLocks noGrp="1"/>
-          </p:cNvSpPr>
-          <p:nvPr>
-            <p:ph type="title"/>
-          </p:nvPr>
-        </p:nvSpPr>
-        <p:spPr/>
-        <p:txBody>
-          <a:bodyPr/>
-          <a:lstStyle/>
-          <a:p>
-            <a:endParaRPr lang="en-US"/>
-          </a:p>
-        </p:txBody>
-      </p:sp>
-      <p:sp>
-        <p:nvSpPr>
-          <p:cNvPr id="3" name="Content Placeholder 2">
-            <a:extLst>
-              <a:ext uri="{FF2B5EF4-FFF2-40B4-BE49-F238E27FC236}">
-                <a16:creationId xmlns:a16="http://schemas.microsoft.com/office/drawing/2014/main" id="{DF3156B4-5107-42D7-B44E-7F508231269B}"/>
-              </a:ext>
-            </a:extLst>
-          </p:cNvPr>
-          <p:cNvSpPr>
-            <a:spLocks noGrp="1"/>
-          </p:cNvSpPr>
+      <p:pic>
+        <p:nvPicPr>
+          <p:cNvPr id="5" name="Content Placeholder 4" descr="Chart, bar chart&#10;&#10;Description automatically generated">
+            <a:extLst>
+              <a:ext uri="{FF2B5EF4-FFF2-40B4-BE49-F238E27FC236}">
+                <a16:creationId xmlns:a16="http://schemas.microsoft.com/office/drawing/2014/main" id="{68C93067-61B8-4FFE-A129-EC0B0D3B0AFF}"/>
+              </a:ext>
+            </a:extLst>
+          </p:cNvPr>
+          <p:cNvPicPr>
+            <a:picLocks noGrp="1" noChangeAspect="1"/>
+          </p:cNvPicPr>
           <p:nvPr>
             <p:ph idx="1"/>
           </p:nvPr>
-        </p:nvSpPr>
-        <p:spPr/>
-        <p:txBody>
-          <a:bodyPr/>
-          <a:lstStyle/>
-          <a:p>
-            <a:endParaRPr lang="en-US"/>
-          </a:p>
-        </p:txBody>
-      </p:sp>
+        </p:nvPicPr>
+        <p:blipFill>
+          <a:blip r:embed="rId3">
+            <a:extLst>
+              <a:ext uri="{28A0092B-C50C-407E-A947-70E740481C1C}">
+                <a14:useLocalDpi xmlns:a14="http://schemas.microsoft.com/office/drawing/2010/main" val="0"/>
+              </a:ext>
+            </a:extLst>
+          </a:blip>
+          <a:stretch>
+            <a:fillRect/>
+          </a:stretch>
+        </p:blipFill>
+        <p:spPr>
+          <a:xfrm>
+            <a:off x="1524000" y="381000"/>
+            <a:ext cx="9144000" cy="6095999"/>
+          </a:xfrm>
+        </p:spPr>
+      </p:pic>
     </p:spTree>
     <p:extLst>
       <p:ext uri="{BB962C8B-B14F-4D97-AF65-F5344CB8AC3E}">
-        <p14:creationId xmlns:p14="http://schemas.microsoft.com/office/powerpoint/2010/main" val="799382434"/>
+        <p14:creationId xmlns:p14="http://schemas.microsoft.com/office/powerpoint/2010/main" val="1908298373"/>
       </p:ext>
     </p:extLst>
   </p:cSld>
@@ -4070,60 +4947,45 @@
           <a:chExt cx="0" cy="0"/>
         </a:xfrm>
       </p:grpSpPr>
-      <p:sp>
-        <p:nvSpPr>
-          <p:cNvPr id="2" name="Title 1">
-            <a:extLst>
-              <a:ext uri="{FF2B5EF4-FFF2-40B4-BE49-F238E27FC236}">
-                <a16:creationId xmlns:a16="http://schemas.microsoft.com/office/drawing/2014/main" id="{EA5DD981-C4B1-42F3-B7CB-8145C8002433}"/>
-              </a:ext>
-            </a:extLst>
-          </p:cNvPr>
-          <p:cNvSpPr>
-            <a:spLocks noGrp="1"/>
-          </p:cNvSpPr>
-          <p:nvPr>
-            <p:ph type="title"/>
-          </p:nvPr>
-        </p:nvSpPr>
-        <p:spPr/>
-        <p:txBody>
-          <a:bodyPr/>
-          <a:lstStyle/>
-          <a:p>
-            <a:endParaRPr lang="en-US"/>
-          </a:p>
-        </p:txBody>
-      </p:sp>
-      <p:sp>
-        <p:nvSpPr>
-          <p:cNvPr id="3" name="Content Placeholder 2">
-            <a:extLst>
-              <a:ext uri="{FF2B5EF4-FFF2-40B4-BE49-F238E27FC236}">
-                <a16:creationId xmlns:a16="http://schemas.microsoft.com/office/drawing/2014/main" id="{3716879F-E660-4263-8C11-680BCC4C958C}"/>
-              </a:ext>
-            </a:extLst>
-          </p:cNvPr>
-          <p:cNvSpPr>
-            <a:spLocks noGrp="1"/>
-          </p:cNvSpPr>
+      <p:pic>
+        <p:nvPicPr>
+          <p:cNvPr id="9" name="Content Placeholder 8" descr="A picture containing text, stationary, screenshot&#10;&#10;Description automatically generated">
+            <a:extLst>
+              <a:ext uri="{FF2B5EF4-FFF2-40B4-BE49-F238E27FC236}">
+                <a16:creationId xmlns:a16="http://schemas.microsoft.com/office/drawing/2014/main" id="{8C68F206-ECDF-42E9-84F6-B5AAC51B738F}"/>
+              </a:ext>
+            </a:extLst>
+          </p:cNvPr>
+          <p:cNvPicPr>
+            <a:picLocks noGrp="1" noChangeAspect="1"/>
+          </p:cNvPicPr>
           <p:nvPr>
             <p:ph idx="1"/>
           </p:nvPr>
-        </p:nvSpPr>
-        <p:spPr/>
-        <p:txBody>
-          <a:bodyPr/>
-          <a:lstStyle/>
-          <a:p>
-            <a:endParaRPr lang="en-US"/>
-          </a:p>
-        </p:txBody>
-      </p:sp>
+        </p:nvPicPr>
+        <p:blipFill>
+          <a:blip r:embed="rId2">
+            <a:extLst>
+              <a:ext uri="{28A0092B-C50C-407E-A947-70E740481C1C}">
+                <a14:useLocalDpi xmlns:a14="http://schemas.microsoft.com/office/drawing/2010/main" val="0"/>
+              </a:ext>
+            </a:extLst>
+          </a:blip>
+          <a:stretch>
+            <a:fillRect/>
+          </a:stretch>
+        </p:blipFill>
+        <p:spPr>
+          <a:xfrm>
+            <a:off x="1524000" y="381000"/>
+            <a:ext cx="9144000" cy="6095999"/>
+          </a:xfrm>
+        </p:spPr>
+      </p:pic>
     </p:spTree>
     <p:extLst>
       <p:ext uri="{BB962C8B-B14F-4D97-AF65-F5344CB8AC3E}">
-        <p14:creationId xmlns:p14="http://schemas.microsoft.com/office/powerpoint/2010/main" val="2390422846"/>
+        <p14:creationId xmlns:p14="http://schemas.microsoft.com/office/powerpoint/2010/main" val="3599362359"/>
       </p:ext>
     </p:extLst>
   </p:cSld>
@@ -4150,60 +5012,45 @@
           <a:chExt cx="0" cy="0"/>
         </a:xfrm>
       </p:grpSpPr>
-      <p:sp>
-        <p:nvSpPr>
-          <p:cNvPr id="2" name="Title 1">
-            <a:extLst>
-              <a:ext uri="{FF2B5EF4-FFF2-40B4-BE49-F238E27FC236}">
-                <a16:creationId xmlns:a16="http://schemas.microsoft.com/office/drawing/2014/main" id="{95C6CBF0-85C8-4052-95A2-398A89F20AC3}"/>
-              </a:ext>
-            </a:extLst>
-          </p:cNvPr>
-          <p:cNvSpPr>
-            <a:spLocks noGrp="1"/>
-          </p:cNvSpPr>
-          <p:nvPr>
-            <p:ph type="title"/>
-          </p:nvPr>
-        </p:nvSpPr>
-        <p:spPr/>
-        <p:txBody>
-          <a:bodyPr/>
-          <a:lstStyle/>
-          <a:p>
-            <a:endParaRPr lang="en-US"/>
-          </a:p>
-        </p:txBody>
-      </p:sp>
-      <p:sp>
-        <p:nvSpPr>
-          <p:cNvPr id="3" name="Content Placeholder 2">
-            <a:extLst>
-              <a:ext uri="{FF2B5EF4-FFF2-40B4-BE49-F238E27FC236}">
-                <a16:creationId xmlns:a16="http://schemas.microsoft.com/office/drawing/2014/main" id="{5C8355C9-46E4-4639-AC41-389E3B5EE70B}"/>
-              </a:ext>
-            </a:extLst>
-          </p:cNvPr>
-          <p:cNvSpPr>
-            <a:spLocks noGrp="1"/>
-          </p:cNvSpPr>
+      <p:pic>
+        <p:nvPicPr>
+          <p:cNvPr id="9" name="Content Placeholder 8" descr="Chart&#10;&#10;Description automatically generated">
+            <a:extLst>
+              <a:ext uri="{FF2B5EF4-FFF2-40B4-BE49-F238E27FC236}">
+                <a16:creationId xmlns:a16="http://schemas.microsoft.com/office/drawing/2014/main" id="{E0B5B8AB-EF5A-4CE3-AA3C-409A8D5AACB3}"/>
+              </a:ext>
+            </a:extLst>
+          </p:cNvPr>
+          <p:cNvPicPr>
+            <a:picLocks noGrp="1" noChangeAspect="1"/>
+          </p:cNvPicPr>
           <p:nvPr>
             <p:ph idx="1"/>
           </p:nvPr>
-        </p:nvSpPr>
-        <p:spPr/>
-        <p:txBody>
-          <a:bodyPr/>
-          <a:lstStyle/>
-          <a:p>
-            <a:endParaRPr lang="en-US"/>
-          </a:p>
-        </p:txBody>
-      </p:sp>
+        </p:nvPicPr>
+        <p:blipFill>
+          <a:blip r:embed="rId2">
+            <a:extLst>
+              <a:ext uri="{28A0092B-C50C-407E-A947-70E740481C1C}">
+                <a14:useLocalDpi xmlns:a14="http://schemas.microsoft.com/office/drawing/2010/main" val="0"/>
+              </a:ext>
+            </a:extLst>
+          </a:blip>
+          <a:stretch>
+            <a:fillRect/>
+          </a:stretch>
+        </p:blipFill>
+        <p:spPr>
+          <a:xfrm>
+            <a:off x="1524000" y="381000"/>
+            <a:ext cx="9144000" cy="6095999"/>
+          </a:xfrm>
+        </p:spPr>
+      </p:pic>
     </p:spTree>
     <p:extLst>
       <p:ext uri="{BB962C8B-B14F-4D97-AF65-F5344CB8AC3E}">
-        <p14:creationId xmlns:p14="http://schemas.microsoft.com/office/powerpoint/2010/main" val="4130249221"/>
+        <p14:creationId xmlns:p14="http://schemas.microsoft.com/office/powerpoint/2010/main" val="2838335333"/>
       </p:ext>
     </p:extLst>
   </p:cSld>
@@ -4230,6 +5077,131 @@
           <a:chExt cx="0" cy="0"/>
         </a:xfrm>
       </p:grpSpPr>
+      <p:pic>
+        <p:nvPicPr>
+          <p:cNvPr id="9" name="Content Placeholder 8" descr="A picture containing chart&#10;&#10;Description automatically generated">
+            <a:extLst>
+              <a:ext uri="{FF2B5EF4-FFF2-40B4-BE49-F238E27FC236}">
+                <a16:creationId xmlns:a16="http://schemas.microsoft.com/office/drawing/2014/main" id="{779FFF67-3C96-4A87-B153-12A4CC6A5B17}"/>
+              </a:ext>
+            </a:extLst>
+          </p:cNvPr>
+          <p:cNvPicPr>
+            <a:picLocks noGrp="1" noChangeAspect="1"/>
+          </p:cNvPicPr>
+          <p:nvPr>
+            <p:ph idx="1"/>
+          </p:nvPr>
+        </p:nvPicPr>
+        <p:blipFill>
+          <a:blip r:embed="rId2">
+            <a:extLst>
+              <a:ext uri="{28A0092B-C50C-407E-A947-70E740481C1C}">
+                <a14:useLocalDpi xmlns:a14="http://schemas.microsoft.com/office/drawing/2010/main" val="0"/>
+              </a:ext>
+            </a:extLst>
+          </a:blip>
+          <a:stretch>
+            <a:fillRect/>
+          </a:stretch>
+        </p:blipFill>
+        <p:spPr>
+          <a:xfrm>
+            <a:off x="1524000" y="381000"/>
+            <a:ext cx="9144000" cy="6095999"/>
+          </a:xfrm>
+        </p:spPr>
+      </p:pic>
+    </p:spTree>
+    <p:extLst>
+      <p:ext uri="{BB962C8B-B14F-4D97-AF65-F5344CB8AC3E}">
+        <p14:creationId xmlns:p14="http://schemas.microsoft.com/office/powerpoint/2010/main" val="165532906"/>
+      </p:ext>
+    </p:extLst>
+  </p:cSld>
+  <p:clrMapOvr>
+    <a:masterClrMapping/>
+  </p:clrMapOvr>
+</p:sld>
+</file>
+
+<file path=ppt/slides/slide8.xml><?xml version="1.0" encoding="utf-8"?>
+<p:sld xmlns:a="http://schemas.openxmlformats.org/drawingml/2006/main" xmlns:r="http://schemas.openxmlformats.org/officeDocument/2006/relationships" xmlns:p="http://schemas.openxmlformats.org/presentationml/2006/main">
+  <p:cSld>
+    <p:spTree>
+      <p:nvGrpSpPr>
+        <p:cNvPr id="1" name=""/>
+        <p:cNvGrpSpPr/>
+        <p:nvPr/>
+      </p:nvGrpSpPr>
+      <p:grpSpPr>
+        <a:xfrm>
+          <a:off x="0" y="0"/>
+          <a:ext cx="0" cy="0"/>
+          <a:chOff x="0" y="0"/>
+          <a:chExt cx="0" cy="0"/>
+        </a:xfrm>
+      </p:grpSpPr>
+      <p:pic>
+        <p:nvPicPr>
+          <p:cNvPr id="5" name="Picture 4">
+            <a:extLst>
+              <a:ext uri="{FF2B5EF4-FFF2-40B4-BE49-F238E27FC236}">
+                <a16:creationId xmlns:a16="http://schemas.microsoft.com/office/drawing/2014/main" id="{6CD091C0-B157-45FA-B0D6-C5DD256C1CE3}"/>
+              </a:ext>
+            </a:extLst>
+          </p:cNvPr>
+          <p:cNvPicPr>
+            <a:picLocks noChangeAspect="1"/>
+          </p:cNvPicPr>
+          <p:nvPr/>
+        </p:nvPicPr>
+        <p:blipFill>
+          <a:blip r:embed="rId2"/>
+          <a:stretch>
+            <a:fillRect/>
+          </a:stretch>
+        </p:blipFill>
+        <p:spPr>
+          <a:xfrm>
+            <a:off x="1718888" y="-1"/>
+            <a:ext cx="8754223" cy="6858001"/>
+          </a:xfrm>
+          <a:prstGeom prst="rect">
+            <a:avLst/>
+          </a:prstGeom>
+        </p:spPr>
+      </p:pic>
+    </p:spTree>
+    <p:extLst>
+      <p:ext uri="{BB962C8B-B14F-4D97-AF65-F5344CB8AC3E}">
+        <p14:creationId xmlns:p14="http://schemas.microsoft.com/office/powerpoint/2010/main" val="799382434"/>
+      </p:ext>
+    </p:extLst>
+  </p:cSld>
+  <p:clrMapOvr>
+    <a:masterClrMapping/>
+  </p:clrMapOvr>
+</p:sld>
+</file>
+
+<file path=ppt/slides/slide9.xml><?xml version="1.0" encoding="utf-8"?>
+<p:sld xmlns:a="http://schemas.openxmlformats.org/drawingml/2006/main" xmlns:r="http://schemas.openxmlformats.org/officeDocument/2006/relationships" xmlns:p="http://schemas.openxmlformats.org/presentationml/2006/main">
+  <p:cSld>
+    <p:spTree>
+      <p:nvGrpSpPr>
+        <p:cNvPr id="1" name=""/>
+        <p:cNvGrpSpPr/>
+        <p:nvPr/>
+      </p:nvGrpSpPr>
+      <p:grpSpPr>
+        <a:xfrm>
+          <a:off x="0" y="0"/>
+          <a:ext cx="0" cy="0"/>
+          <a:chOff x="0" y="0"/>
+          <a:chExt cx="0" cy="0"/>
+        </a:xfrm>
+      </p:grpSpPr>
       <p:sp>
         <p:nvSpPr>
           <p:cNvPr id="2" name="Title 1">
@@ -4251,7 +5223,10 @@
           <a:bodyPr/>
           <a:lstStyle/>
           <a:p>
-            <a:endParaRPr lang="en-US"/>
+            <a:r>
+              <a:rPr lang="en-US" dirty="0"/>
+              <a:t>References</a:t>
+            </a:r>
           </a:p>
         </p:txBody>
       </p:sp>
@@ -4276,7 +5251,169 @@
           <a:bodyPr/>
           <a:lstStyle/>
           <a:p>
-            <a:endParaRPr lang="en-US"/>
+            <a:pPr marL="0" marR="0">
+              <a:lnSpc>
+                <a:spcPct val="107000"/>
+              </a:lnSpc>
+              <a:spcBef>
+                <a:spcPts val="0"/>
+              </a:spcBef>
+              <a:spcAft>
+                <a:spcPts val="800"/>
+              </a:spcAft>
+            </a:pPr>
+            <a:r>
+              <a:rPr lang="en-US" sz="1800" dirty="0">
+                <a:effectLst/>
+                <a:latin typeface="Calibri" panose="020F0502020204030204" pitchFamily="34" charset="0"/>
+                <a:ea typeface="Calibri" panose="020F0502020204030204" pitchFamily="34" charset="0"/>
+                <a:cs typeface="Times New Roman" panose="02020603050405020304" pitchFamily="18" charset="0"/>
+              </a:rPr>
+              <a:t>Graduation rates and entry rates:</a:t>
+            </a:r>
+          </a:p>
+          <a:p>
+            <a:pPr marL="457200" lvl="1">
+              <a:lnSpc>
+                <a:spcPct val="107000"/>
+              </a:lnSpc>
+              <a:spcBef>
+                <a:spcPts val="0"/>
+              </a:spcBef>
+              <a:spcAft>
+                <a:spcPts val="800"/>
+              </a:spcAft>
+            </a:pPr>
+            <a:r>
+              <a:rPr lang="en-US" sz="1400" u="sng" dirty="0">
+                <a:solidFill>
+                  <a:srgbClr val="0563C1"/>
+                </a:solidFill>
+                <a:effectLst/>
+                <a:latin typeface="Calibri" panose="020F0502020204030204" pitchFamily="34" charset="0"/>
+                <a:ea typeface="Calibri" panose="020F0502020204030204" pitchFamily="34" charset="0"/>
+                <a:cs typeface="Times New Roman" panose="02020603050405020304" pitchFamily="18" charset="0"/>
+                <a:hlinkClick r:id="rId2"/>
+              </a:rPr>
+              <a:t>https://stats.oecd.org/Index.aspx?DataSetCode=EAG_GRAD_ENTR_RATES</a:t>
+            </a:r>
+            <a:endParaRPr lang="en-US" sz="1400" dirty="0">
+              <a:effectLst/>
+              <a:latin typeface="Calibri" panose="020F0502020204030204" pitchFamily="34" charset="0"/>
+              <a:ea typeface="Calibri" panose="020F0502020204030204" pitchFamily="34" charset="0"/>
+              <a:cs typeface="Times New Roman" panose="02020603050405020304" pitchFamily="18" charset="0"/>
+            </a:endParaRPr>
+          </a:p>
+          <a:p>
+            <a:pPr marL="0" marR="0">
+              <a:lnSpc>
+                <a:spcPct val="107000"/>
+              </a:lnSpc>
+              <a:spcBef>
+                <a:spcPts val="0"/>
+              </a:spcBef>
+              <a:spcAft>
+                <a:spcPts val="800"/>
+              </a:spcAft>
+            </a:pPr>
+            <a:r>
+              <a:rPr lang="en-US" sz="1800" dirty="0">
+                <a:effectLst/>
+                <a:latin typeface="Calibri" panose="020F0502020204030204" pitchFamily="34" charset="0"/>
+                <a:ea typeface="Calibri" panose="020F0502020204030204" pitchFamily="34" charset="0"/>
+                <a:cs typeface="Times New Roman" panose="02020603050405020304" pitchFamily="18" charset="0"/>
+              </a:rPr>
+              <a:t>Government expenditure on education (%of GDP):</a:t>
+            </a:r>
+          </a:p>
+          <a:p>
+            <a:pPr marL="457200" lvl="1">
+              <a:lnSpc>
+                <a:spcPct val="107000"/>
+              </a:lnSpc>
+              <a:spcBef>
+                <a:spcPts val="0"/>
+              </a:spcBef>
+              <a:spcAft>
+                <a:spcPts val="800"/>
+              </a:spcAft>
+            </a:pPr>
+            <a:r>
+              <a:rPr lang="en-US" sz="1400" u="sng" dirty="0">
+                <a:solidFill>
+                  <a:srgbClr val="0563C1"/>
+                </a:solidFill>
+                <a:effectLst/>
+                <a:latin typeface="Calibri" panose="020F0502020204030204" pitchFamily="34" charset="0"/>
+                <a:ea typeface="Calibri" panose="020F0502020204030204" pitchFamily="34" charset="0"/>
+                <a:cs typeface="Times New Roman" panose="02020603050405020304" pitchFamily="18" charset="0"/>
+                <a:hlinkClick r:id="rId3"/>
+              </a:rPr>
+              <a:t>https://ourworldindata.org/grapher/government-expenditure-on-education?time=2014</a:t>
+            </a:r>
+            <a:endParaRPr lang="en-US" sz="1400" dirty="0">
+              <a:effectLst/>
+              <a:latin typeface="Calibri" panose="020F0502020204030204" pitchFamily="34" charset="0"/>
+              <a:ea typeface="Calibri" panose="020F0502020204030204" pitchFamily="34" charset="0"/>
+              <a:cs typeface="Times New Roman" panose="02020603050405020304" pitchFamily="18" charset="0"/>
+            </a:endParaRPr>
+          </a:p>
+          <a:p>
+            <a:pPr marL="0" marR="0">
+              <a:lnSpc>
+                <a:spcPct val="107000"/>
+              </a:lnSpc>
+              <a:spcBef>
+                <a:spcPts val="0"/>
+              </a:spcBef>
+              <a:spcAft>
+                <a:spcPts val="800"/>
+              </a:spcAft>
+            </a:pPr>
+            <a:r>
+              <a:rPr lang="en-US" sz="1800" dirty="0">
+                <a:effectLst/>
+                <a:latin typeface="Calibri" panose="020F0502020204030204" pitchFamily="34" charset="0"/>
+                <a:ea typeface="Calibri" panose="020F0502020204030204" pitchFamily="34" charset="0"/>
+                <a:cs typeface="Times New Roman" panose="02020603050405020304" pitchFamily="18" charset="0"/>
+              </a:rPr>
+              <a:t>Persons held in prisons:</a:t>
+            </a:r>
+          </a:p>
+          <a:p>
+            <a:pPr marL="457200" lvl="1">
+              <a:lnSpc>
+                <a:spcPct val="107000"/>
+              </a:lnSpc>
+              <a:spcBef>
+                <a:spcPts val="0"/>
+              </a:spcBef>
+              <a:spcAft>
+                <a:spcPts val="800"/>
+              </a:spcAft>
+            </a:pPr>
+            <a:r>
+              <a:rPr lang="en-US" sz="1400" u="sng" dirty="0">
+                <a:solidFill>
+                  <a:srgbClr val="0563C1"/>
+                </a:solidFill>
+                <a:effectLst/>
+                <a:latin typeface="Calibri" panose="020F0502020204030204" pitchFamily="34" charset="0"/>
+                <a:ea typeface="Calibri" panose="020F0502020204030204" pitchFamily="34" charset="0"/>
+                <a:cs typeface="Times New Roman" panose="02020603050405020304" pitchFamily="18" charset="0"/>
+                <a:hlinkClick r:id="rId4"/>
+              </a:rPr>
+              <a:t>https://dataunodc.un.org/data/prison/persons%20held%20total</a:t>
+            </a:r>
+            <a:endParaRPr lang="en-US" sz="1400" dirty="0">
+              <a:effectLst/>
+              <a:latin typeface="Calibri" panose="020F0502020204030204" pitchFamily="34" charset="0"/>
+              <a:ea typeface="Calibri" panose="020F0502020204030204" pitchFamily="34" charset="0"/>
+              <a:cs typeface="Times New Roman" panose="02020603050405020304" pitchFamily="18" charset="0"/>
+            </a:endParaRPr>
+          </a:p>
+          <a:p>
+            <a:endParaRPr lang="en-US" dirty="0"/>
           </a:p>
         </p:txBody>
       </p:sp>
@@ -4586,4 +5723,299 @@
     </a:ext>
   </a:extLst>
 </a:theme>
+</file>
+
+<file path=ppt/theme/theme2.xml><?xml version="1.0" encoding="utf-8"?>
+<a:theme xmlns:a="http://schemas.openxmlformats.org/drawingml/2006/main" name="Office Theme">
+  <a:themeElements>
+    <a:clrScheme name="Office">
+      <a:dk1>
+        <a:sysClr val="windowText" lastClr="000000"/>
+      </a:dk1>
+      <a:lt1>
+        <a:sysClr val="window" lastClr="FFFFFF"/>
+      </a:lt1>
+      <a:dk2>
+        <a:srgbClr val="44546A"/>
+      </a:dk2>
+      <a:lt2>
+        <a:srgbClr val="E7E6E6"/>
+      </a:lt2>
+      <a:accent1>
+        <a:srgbClr val="4472C4"/>
+      </a:accent1>
+      <a:accent2>
+        <a:srgbClr val="ED7D31"/>
+      </a:accent2>
+      <a:accent3>
+        <a:srgbClr val="A5A5A5"/>
+      </a:accent3>
+      <a:accent4>
+        <a:srgbClr val="FFC000"/>
+      </a:accent4>
+      <a:accent5>
+        <a:srgbClr val="5B9BD5"/>
+      </a:accent5>
+      <a:accent6>
+        <a:srgbClr val="70AD47"/>
+      </a:accent6>
+      <a:hlink>
+        <a:srgbClr val="0563C1"/>
+      </a:hlink>
+      <a:folHlink>
+        <a:srgbClr val="954F72"/>
+      </a:folHlink>
+    </a:clrScheme>
+    <a:fontScheme name="Office">
+      <a:majorFont>
+        <a:latin typeface="Calibri Light" panose="020F0302020204030204"/>
+        <a:ea typeface=""/>
+        <a:cs typeface=""/>
+        <a:font script="Jpan" typeface="游ゴシック Light"/>
+        <a:font script="Hang" typeface="맑은 고딕"/>
+        <a:font script="Hans" typeface="等线 Light"/>
+        <a:font script="Hant" typeface="新細明體"/>
+        <a:font script="Arab" typeface="Times New Roman"/>
+        <a:font script="Hebr" typeface="Times New Roman"/>
+        <a:font script="Thai" typeface="Angsana New"/>
+        <a:font script="Ethi" typeface="Nyala"/>
+        <a:font script="Beng" typeface="Vrinda"/>
+        <a:font script="Gujr" typeface="Shruti"/>
+        <a:font script="Khmr" typeface="MoolBoran"/>
+        <a:font script="Knda" typeface="Tunga"/>
+        <a:font script="Guru" typeface="Raavi"/>
+        <a:font script="Cans" typeface="Euphemia"/>
+        <a:font script="Cher" typeface="Plantagenet Cherokee"/>
+        <a:font script="Yiii" typeface="Microsoft Yi Baiti"/>
+        <a:font script="Tibt" typeface="Microsoft Himalaya"/>
+        <a:font script="Thaa" typeface="MV Boli"/>
+        <a:font script="Deva" typeface="Mangal"/>
+        <a:font script="Telu" typeface="Gautami"/>
+        <a:font script="Taml" typeface="Latha"/>
+        <a:font script="Syrc" typeface="Estrangelo Edessa"/>
+        <a:font script="Orya" typeface="Kalinga"/>
+        <a:font script="Mlym" typeface="Kartika"/>
+        <a:font script="Laoo" typeface="DokChampa"/>
+        <a:font script="Sinh" typeface="Iskoola Pota"/>
+        <a:font script="Mong" typeface="Mongolian Baiti"/>
+        <a:font script="Viet" typeface="Times New Roman"/>
+        <a:font script="Uigh" typeface="Microsoft Uighur"/>
+        <a:font script="Geor" typeface="Sylfaen"/>
+        <a:font script="Armn" typeface="Arial"/>
+        <a:font script="Bugi" typeface="Leelawadee UI"/>
+        <a:font script="Bopo" typeface="Microsoft JhengHei"/>
+        <a:font script="Java" typeface="Javanese Text"/>
+        <a:font script="Lisu" typeface="Segoe UI"/>
+        <a:font script="Mymr" typeface="Myanmar Text"/>
+        <a:font script="Nkoo" typeface="Ebrima"/>
+        <a:font script="Olck" typeface="Nirmala UI"/>
+        <a:font script="Osma" typeface="Ebrima"/>
+        <a:font script="Phag" typeface="Phagspa"/>
+        <a:font script="Syrn" typeface="Estrangelo Edessa"/>
+        <a:font script="Syrj" typeface="Estrangelo Edessa"/>
+        <a:font script="Syre" typeface="Estrangelo Edessa"/>
+        <a:font script="Sora" typeface="Nirmala UI"/>
+        <a:font script="Tale" typeface="Microsoft Tai Le"/>
+        <a:font script="Talu" typeface="Microsoft New Tai Lue"/>
+        <a:font script="Tfng" typeface="Ebrima"/>
+      </a:majorFont>
+      <a:minorFont>
+        <a:latin typeface="Calibri" panose="020F0502020204030204"/>
+        <a:ea typeface=""/>
+        <a:cs typeface=""/>
+        <a:font script="Jpan" typeface="游ゴシック"/>
+        <a:font script="Hang" typeface="맑은 고딕"/>
+        <a:font script="Hans" typeface="等线"/>
+        <a:font script="Hant" typeface="新細明體"/>
+        <a:font script="Arab" typeface="Arial"/>
+        <a:font script="Hebr" typeface="Arial"/>
+        <a:font script="Thai" typeface="Cordia New"/>
+        <a:font script="Ethi" typeface="Nyala"/>
+        <a:font script="Beng" typeface="Vrinda"/>
+        <a:font script="Gujr" typeface="Shruti"/>
+        <a:font script="Khmr" typeface="DaunPenh"/>
+        <a:font script="Knda" typeface="Tunga"/>
+        <a:font script="Guru" typeface="Raavi"/>
+        <a:font script="Cans" typeface="Euphemia"/>
+        <a:font script="Cher" typeface="Plantagenet Cherokee"/>
+        <a:font script="Yiii" typeface="Microsoft Yi Baiti"/>
+        <a:font script="Tibt" typeface="Microsoft Himalaya"/>
+        <a:font script="Thaa" typeface="MV Boli"/>
+        <a:font script="Deva" typeface="Mangal"/>
+        <a:font script="Telu" typeface="Gautami"/>
+        <a:font script="Taml" typeface="Latha"/>
+        <a:font script="Syrc" typeface="Estrangelo Edessa"/>
+        <a:font script="Orya" typeface="Kalinga"/>
+        <a:font script="Mlym" typeface="Kartika"/>
+        <a:font script="Laoo" typeface="DokChampa"/>
+        <a:font script="Sinh" typeface="Iskoola Pota"/>
+        <a:font script="Mong" typeface="Mongolian Baiti"/>
+        <a:font script="Viet" typeface="Arial"/>
+        <a:font script="Uigh" typeface="Microsoft Uighur"/>
+        <a:font script="Geor" typeface="Sylfaen"/>
+        <a:font script="Armn" typeface="Arial"/>
+        <a:font script="Bugi" typeface="Leelawadee UI"/>
+        <a:font script="Bopo" typeface="Microsoft JhengHei"/>
+        <a:font script="Java" typeface="Javanese Text"/>
+        <a:font script="Lisu" typeface="Segoe UI"/>
+        <a:font script="Mymr" typeface="Myanmar Text"/>
+        <a:font script="Nkoo" typeface="Ebrima"/>
+        <a:font script="Olck" typeface="Nirmala UI"/>
+        <a:font script="Osma" typeface="Ebrima"/>
+        <a:font script="Phag" typeface="Phagspa"/>
+        <a:font script="Syrn" typeface="Estrangelo Edessa"/>
+        <a:font script="Syrj" typeface="Estrangelo Edessa"/>
+        <a:font script="Syre" typeface="Estrangelo Edessa"/>
+        <a:font script="Sora" typeface="Nirmala UI"/>
+        <a:font script="Tale" typeface="Microsoft Tai Le"/>
+        <a:font script="Talu" typeface="Microsoft New Tai Lue"/>
+        <a:font script="Tfng" typeface="Ebrima"/>
+      </a:minorFont>
+    </a:fontScheme>
+    <a:fmtScheme name="Office">
+      <a:fillStyleLst>
+        <a:solidFill>
+          <a:schemeClr val="phClr"/>
+        </a:solidFill>
+        <a:gradFill rotWithShape="1">
+          <a:gsLst>
+            <a:gs pos="0">
+              <a:schemeClr val="phClr">
+                <a:lumMod val="110000"/>
+                <a:satMod val="105000"/>
+                <a:tint val="67000"/>
+              </a:schemeClr>
+            </a:gs>
+            <a:gs pos="50000">
+              <a:schemeClr val="phClr">
+                <a:lumMod val="105000"/>
+                <a:satMod val="103000"/>
+                <a:tint val="73000"/>
+              </a:schemeClr>
+            </a:gs>
+            <a:gs pos="100000">
+              <a:schemeClr val="phClr">
+                <a:lumMod val="105000"/>
+                <a:satMod val="109000"/>
+                <a:tint val="81000"/>
+              </a:schemeClr>
+            </a:gs>
+          </a:gsLst>
+          <a:lin ang="5400000" scaled="0"/>
+        </a:gradFill>
+        <a:gradFill rotWithShape="1">
+          <a:gsLst>
+            <a:gs pos="0">
+              <a:schemeClr val="phClr">
+                <a:satMod val="103000"/>
+                <a:lumMod val="102000"/>
+                <a:tint val="94000"/>
+              </a:schemeClr>
+            </a:gs>
+            <a:gs pos="50000">
+              <a:schemeClr val="phClr">
+                <a:satMod val="110000"/>
+                <a:lumMod val="100000"/>
+                <a:shade val="100000"/>
+              </a:schemeClr>
+            </a:gs>
+            <a:gs pos="100000">
+              <a:schemeClr val="phClr">
+                <a:lumMod val="99000"/>
+                <a:satMod val="120000"/>
+                <a:shade val="78000"/>
+              </a:schemeClr>
+            </a:gs>
+          </a:gsLst>
+          <a:lin ang="5400000" scaled="0"/>
+        </a:gradFill>
+      </a:fillStyleLst>
+      <a:lnStyleLst>
+        <a:ln w="6350" cap="flat" cmpd="sng" algn="ctr">
+          <a:solidFill>
+            <a:schemeClr val="phClr"/>
+          </a:solidFill>
+          <a:prstDash val="solid"/>
+          <a:miter lim="800000"/>
+        </a:ln>
+        <a:ln w="12700" cap="flat" cmpd="sng" algn="ctr">
+          <a:solidFill>
+            <a:schemeClr val="phClr"/>
+          </a:solidFill>
+          <a:prstDash val="solid"/>
+          <a:miter lim="800000"/>
+        </a:ln>
+        <a:ln w="19050" cap="flat" cmpd="sng" algn="ctr">
+          <a:solidFill>
+            <a:schemeClr val="phClr"/>
+          </a:solidFill>
+          <a:prstDash val="solid"/>
+          <a:miter lim="800000"/>
+        </a:ln>
+      </a:lnStyleLst>
+      <a:effectStyleLst>
+        <a:effectStyle>
+          <a:effectLst/>
+        </a:effectStyle>
+        <a:effectStyle>
+          <a:effectLst/>
+        </a:effectStyle>
+        <a:effectStyle>
+          <a:effectLst>
+            <a:outerShdw blurRad="57150" dist="19050" dir="5400000" algn="ctr" rotWithShape="0">
+              <a:srgbClr val="000000">
+                <a:alpha val="63000"/>
+              </a:srgbClr>
+            </a:outerShdw>
+          </a:effectLst>
+        </a:effectStyle>
+      </a:effectStyleLst>
+      <a:bgFillStyleLst>
+        <a:solidFill>
+          <a:schemeClr val="phClr"/>
+        </a:solidFill>
+        <a:solidFill>
+          <a:schemeClr val="phClr">
+            <a:tint val="95000"/>
+            <a:satMod val="170000"/>
+          </a:schemeClr>
+        </a:solidFill>
+        <a:gradFill rotWithShape="1">
+          <a:gsLst>
+            <a:gs pos="0">
+              <a:schemeClr val="phClr">
+                <a:tint val="93000"/>
+                <a:satMod val="150000"/>
+                <a:shade val="98000"/>
+                <a:lumMod val="102000"/>
+              </a:schemeClr>
+            </a:gs>
+            <a:gs pos="50000">
+              <a:schemeClr val="phClr">
+                <a:tint val="98000"/>
+                <a:satMod val="130000"/>
+                <a:shade val="90000"/>
+                <a:lumMod val="103000"/>
+              </a:schemeClr>
+            </a:gs>
+            <a:gs pos="100000">
+              <a:schemeClr val="phClr">
+                <a:shade val="63000"/>
+                <a:satMod val="120000"/>
+              </a:schemeClr>
+            </a:gs>
+          </a:gsLst>
+          <a:lin ang="5400000" scaled="0"/>
+        </a:gradFill>
+      </a:bgFillStyleLst>
+    </a:fmtScheme>
+  </a:themeElements>
+  <a:objectDefaults/>
+  <a:extraClrSchemeLst/>
+  <a:extLst>
+    <a:ext uri="{05A4C25C-085E-4340-85A3-A5531E510DB2}">
+      <thm15:themeFamily xmlns:thm15="http://schemas.microsoft.com/office/thememl/2012/main" name="Office Theme" id="{62F939B6-93AF-4DB8-9C6B-D6C7DFDC589F}" vid="{4A3C46E8-61CC-4603-A589-7422A47A8E4A}"/>
+    </a:ext>
+  </a:extLst>
+</a:theme>
 </file>
</xml_diff>

<commit_message>
all images added to ppt
</commit_message>
<xml_diff>
--- a/Presentation.pptx
+++ b/Presentation.pptx
@@ -5,7 +5,7 @@
     <p:sldMasterId id="2147483648" r:id="rId1"/>
   </p:sldMasterIdLst>
   <p:notesMasterIdLst>
-    <p:notesMasterId r:id="rId11"/>
+    <p:notesMasterId r:id="rId17"/>
   </p:notesMasterIdLst>
   <p:sldIdLst>
     <p:sldId id="256" r:id="rId2"/>
@@ -16,7 +16,13 @@
     <p:sldId id="265" r:id="rId7"/>
     <p:sldId id="266" r:id="rId8"/>
     <p:sldId id="259" r:id="rId9"/>
-    <p:sldId id="262" r:id="rId10"/>
+    <p:sldId id="269" r:id="rId10"/>
+    <p:sldId id="268" r:id="rId11"/>
+    <p:sldId id="270" r:id="rId12"/>
+    <p:sldId id="271" r:id="rId13"/>
+    <p:sldId id="272" r:id="rId14"/>
+    <p:sldId id="273" r:id="rId15"/>
+    <p:sldId id="262" r:id="rId16"/>
   </p:sldIdLst>
   <p:sldSz cx="12192000" cy="6858000"/>
   <p:notesSz cx="6858000" cy="9144000"/>
@@ -133,6 +139,249 @@
 
 <file path=ppt/changesInfos/changesInfo1.xml><?xml version="1.0" encoding="utf-8"?>
 <pc:chgInfo xmlns:a="http://schemas.openxmlformats.org/drawingml/2006/main" xmlns:r="http://schemas.openxmlformats.org/officeDocument/2006/relationships" xmlns:ac="http://schemas.microsoft.com/office/drawing/2013/main/command" xmlns:pc="http://schemas.microsoft.com/office/powerpoint/2013/main/command">
+  <pc:docChgLst>
+    <pc:chgData name="Nicolas Bello" userId="2c9c2fd434c754b4" providerId="LiveId" clId="{80C3D7AE-5AB5-439E-B8E3-CE43FFB0FFAC}"/>
+    <pc:docChg chg="undo custSel addSld modSld">
+      <pc:chgData name="Nicolas Bello" userId="2c9c2fd434c754b4" providerId="LiveId" clId="{80C3D7AE-5AB5-439E-B8E3-CE43FFB0FFAC}" dt="2021-02-11T02:02:06.700" v="89" actId="1076"/>
+      <pc:docMkLst>
+        <pc:docMk/>
+      </pc:docMkLst>
+      <pc:sldChg chg="addSp delSp modSp new mod">
+        <pc:chgData name="Nicolas Bello" userId="2c9c2fd434c754b4" providerId="LiveId" clId="{80C3D7AE-5AB5-439E-B8E3-CE43FFB0FFAC}" dt="2021-02-11T01:47:02.849" v="33" actId="1076"/>
+        <pc:sldMkLst>
+          <pc:docMk/>
+          <pc:sldMk cId="3107796215" sldId="268"/>
+        </pc:sldMkLst>
+        <pc:spChg chg="del">
+          <ac:chgData name="Nicolas Bello" userId="2c9c2fd434c754b4" providerId="LiveId" clId="{80C3D7AE-5AB5-439E-B8E3-CE43FFB0FFAC}" dt="2021-02-11T01:46:15.111" v="28" actId="478"/>
+          <ac:spMkLst>
+            <pc:docMk/>
+            <pc:sldMk cId="3107796215" sldId="268"/>
+            <ac:spMk id="2" creationId="{F4F4D6D3-65C0-4AB8-B449-1B121408B176}"/>
+          </ac:spMkLst>
+        </pc:spChg>
+        <pc:spChg chg="del">
+          <ac:chgData name="Nicolas Bello" userId="2c9c2fd434c754b4" providerId="LiveId" clId="{80C3D7AE-5AB5-439E-B8E3-CE43FFB0FFAC}" dt="2021-02-11T01:45:54.499" v="22" actId="931"/>
+          <ac:spMkLst>
+            <pc:docMk/>
+            <pc:sldMk cId="3107796215" sldId="268"/>
+            <ac:spMk id="3" creationId="{F595572F-A6B4-4C25-BA14-7B9BAF38120E}"/>
+          </ac:spMkLst>
+        </pc:spChg>
+        <pc:picChg chg="add mod">
+          <ac:chgData name="Nicolas Bello" userId="2c9c2fd434c754b4" providerId="LiveId" clId="{80C3D7AE-5AB5-439E-B8E3-CE43FFB0FFAC}" dt="2021-02-11T01:47:02.849" v="33" actId="1076"/>
+          <ac:picMkLst>
+            <pc:docMk/>
+            <pc:sldMk cId="3107796215" sldId="268"/>
+            <ac:picMk id="5" creationId="{196754CC-62F3-459E-86D9-3F2E28FD1A7D}"/>
+          </ac:picMkLst>
+        </pc:picChg>
+        <pc:picChg chg="add mod">
+          <ac:chgData name="Nicolas Bello" userId="2c9c2fd434c754b4" providerId="LiveId" clId="{80C3D7AE-5AB5-439E-B8E3-CE43FFB0FFAC}" dt="2021-02-11T01:46:55.549" v="32" actId="1076"/>
+          <ac:picMkLst>
+            <pc:docMk/>
+            <pc:sldMk cId="3107796215" sldId="268"/>
+            <ac:picMk id="7" creationId="{05E96D42-3F9E-47C9-80D4-F6E5944131A0}"/>
+          </ac:picMkLst>
+        </pc:picChg>
+      </pc:sldChg>
+      <pc:sldChg chg="addSp delSp modSp new mod">
+        <pc:chgData name="Nicolas Bello" userId="2c9c2fd434c754b4" providerId="LiveId" clId="{80C3D7AE-5AB5-439E-B8E3-CE43FFB0FFAC}" dt="2021-02-11T01:47:21.471" v="36" actId="1076"/>
+        <pc:sldMkLst>
+          <pc:docMk/>
+          <pc:sldMk cId="1342303891" sldId="269"/>
+        </pc:sldMkLst>
+        <pc:spChg chg="del">
+          <ac:chgData name="Nicolas Bello" userId="2c9c2fd434c754b4" providerId="LiveId" clId="{80C3D7AE-5AB5-439E-B8E3-CE43FFB0FFAC}" dt="2021-02-11T01:42:43.327" v="15" actId="478"/>
+          <ac:spMkLst>
+            <pc:docMk/>
+            <pc:sldMk cId="1342303891" sldId="269"/>
+            <ac:spMk id="2" creationId="{277F7AD3-2D7C-4D07-9A7F-820155B52E63}"/>
+          </ac:spMkLst>
+        </pc:spChg>
+        <pc:spChg chg="del">
+          <ac:chgData name="Nicolas Bello" userId="2c9c2fd434c754b4" providerId="LiveId" clId="{80C3D7AE-5AB5-439E-B8E3-CE43FFB0FFAC}" dt="2021-02-11T01:41:29.135" v="2" actId="931"/>
+          <ac:spMkLst>
+            <pc:docMk/>
+            <pc:sldMk cId="1342303891" sldId="269"/>
+            <ac:spMk id="3" creationId="{ADFB3314-798C-4626-9815-D12FEDFCAC08}"/>
+          </ac:spMkLst>
+        </pc:spChg>
+        <pc:picChg chg="add mod">
+          <ac:chgData name="Nicolas Bello" userId="2c9c2fd434c754b4" providerId="LiveId" clId="{80C3D7AE-5AB5-439E-B8E3-CE43FFB0FFAC}" dt="2021-02-11T01:47:21.471" v="36" actId="1076"/>
+          <ac:picMkLst>
+            <pc:docMk/>
+            <pc:sldMk cId="1342303891" sldId="269"/>
+            <ac:picMk id="5" creationId="{82D3C8FB-67B4-458E-AD97-22EED0383CBB}"/>
+          </ac:picMkLst>
+        </pc:picChg>
+        <pc:picChg chg="add mod">
+          <ac:chgData name="Nicolas Bello" userId="2c9c2fd434c754b4" providerId="LiveId" clId="{80C3D7AE-5AB5-439E-B8E3-CE43FFB0FFAC}" dt="2021-02-11T01:47:15.238" v="35" actId="1076"/>
+          <ac:picMkLst>
+            <pc:docMk/>
+            <pc:sldMk cId="1342303891" sldId="269"/>
+            <ac:picMk id="7" creationId="{CCC326B8-19C9-434D-A508-CC70423EC063}"/>
+          </ac:picMkLst>
+        </pc:picChg>
+      </pc:sldChg>
+      <pc:sldChg chg="addSp delSp modSp new mod">
+        <pc:chgData name="Nicolas Bello" userId="2c9c2fd434c754b4" providerId="LiveId" clId="{80C3D7AE-5AB5-439E-B8E3-CE43FFB0FFAC}" dt="2021-02-11T01:49:03.828" v="52" actId="1076"/>
+        <pc:sldMkLst>
+          <pc:docMk/>
+          <pc:sldMk cId="1318568891" sldId="270"/>
+        </pc:sldMkLst>
+        <pc:spChg chg="del">
+          <ac:chgData name="Nicolas Bello" userId="2c9c2fd434c754b4" providerId="LiveId" clId="{80C3D7AE-5AB5-439E-B8E3-CE43FFB0FFAC}" dt="2021-02-11T01:48:05.311" v="41" actId="478"/>
+          <ac:spMkLst>
+            <pc:docMk/>
+            <pc:sldMk cId="1318568891" sldId="270"/>
+            <ac:spMk id="2" creationId="{D0E2A16A-31D7-4EFA-B8D8-F029EACEF3DB}"/>
+          </ac:spMkLst>
+        </pc:spChg>
+        <pc:spChg chg="del">
+          <ac:chgData name="Nicolas Bello" userId="2c9c2fd434c754b4" providerId="LiveId" clId="{80C3D7AE-5AB5-439E-B8E3-CE43FFB0FFAC}" dt="2021-02-11T01:47:59.289" v="38" actId="931"/>
+          <ac:spMkLst>
+            <pc:docMk/>
+            <pc:sldMk cId="1318568891" sldId="270"/>
+            <ac:spMk id="3" creationId="{69607F2B-2AA6-42DC-BB53-E158DE9D6C3B}"/>
+          </ac:spMkLst>
+        </pc:spChg>
+        <pc:picChg chg="add mod">
+          <ac:chgData name="Nicolas Bello" userId="2c9c2fd434c754b4" providerId="LiveId" clId="{80C3D7AE-5AB5-439E-B8E3-CE43FFB0FFAC}" dt="2021-02-11T01:49:03.828" v="52" actId="1076"/>
+          <ac:picMkLst>
+            <pc:docMk/>
+            <pc:sldMk cId="1318568891" sldId="270"/>
+            <ac:picMk id="5" creationId="{18230708-ECDE-4637-AB7D-E310A96DCE18}"/>
+          </ac:picMkLst>
+        </pc:picChg>
+        <pc:picChg chg="add mod">
+          <ac:chgData name="Nicolas Bello" userId="2c9c2fd434c754b4" providerId="LiveId" clId="{80C3D7AE-5AB5-439E-B8E3-CE43FFB0FFAC}" dt="2021-02-11T01:48:52.292" v="49" actId="1076"/>
+          <ac:picMkLst>
+            <pc:docMk/>
+            <pc:sldMk cId="1318568891" sldId="270"/>
+            <ac:picMk id="7" creationId="{6F74EE74-9DE0-4FCC-B45D-EAECE51574F4}"/>
+          </ac:picMkLst>
+        </pc:picChg>
+      </pc:sldChg>
+      <pc:sldChg chg="addSp delSp modSp new mod">
+        <pc:chgData name="Nicolas Bello" userId="2c9c2fd434c754b4" providerId="LiveId" clId="{80C3D7AE-5AB5-439E-B8E3-CE43FFB0FFAC}" dt="2021-02-11T01:59:14.651" v="65" actId="1076"/>
+        <pc:sldMkLst>
+          <pc:docMk/>
+          <pc:sldMk cId="2383399923" sldId="271"/>
+        </pc:sldMkLst>
+        <pc:spChg chg="del">
+          <ac:chgData name="Nicolas Bello" userId="2c9c2fd434c754b4" providerId="LiveId" clId="{80C3D7AE-5AB5-439E-B8E3-CE43FFB0FFAC}" dt="2021-02-11T01:57:51.316" v="54" actId="478"/>
+          <ac:spMkLst>
+            <pc:docMk/>
+            <pc:sldMk cId="2383399923" sldId="271"/>
+            <ac:spMk id="2" creationId="{9CA4B257-B0F6-42B0-8BE0-6A6DCFC7384B}"/>
+          </ac:spMkLst>
+        </pc:spChg>
+        <pc:spChg chg="del">
+          <ac:chgData name="Nicolas Bello" userId="2c9c2fd434c754b4" providerId="LiveId" clId="{80C3D7AE-5AB5-439E-B8E3-CE43FFB0FFAC}" dt="2021-02-11T01:58:14.505" v="55" actId="931"/>
+          <ac:spMkLst>
+            <pc:docMk/>
+            <pc:sldMk cId="2383399923" sldId="271"/>
+            <ac:spMk id="3" creationId="{7CCD3C84-70D2-48B7-A109-F1C0C1EA07F0}"/>
+          </ac:spMkLst>
+        </pc:spChg>
+        <pc:picChg chg="add mod">
+          <ac:chgData name="Nicolas Bello" userId="2c9c2fd434c754b4" providerId="LiveId" clId="{80C3D7AE-5AB5-439E-B8E3-CE43FFB0FFAC}" dt="2021-02-11T01:59:14.651" v="65" actId="1076"/>
+          <ac:picMkLst>
+            <pc:docMk/>
+            <pc:sldMk cId="2383399923" sldId="271"/>
+            <ac:picMk id="5" creationId="{54BBCF21-37A4-4847-9DE0-8676685459D0}"/>
+          </ac:picMkLst>
+        </pc:picChg>
+        <pc:picChg chg="add mod">
+          <ac:chgData name="Nicolas Bello" userId="2c9c2fd434c754b4" providerId="LiveId" clId="{80C3D7AE-5AB5-439E-B8E3-CE43FFB0FFAC}" dt="2021-02-11T01:59:00.077" v="62" actId="1076"/>
+          <ac:picMkLst>
+            <pc:docMk/>
+            <pc:sldMk cId="2383399923" sldId="271"/>
+            <ac:picMk id="7" creationId="{EB3E75BD-58A5-4A9C-A614-0508F5351536}"/>
+          </ac:picMkLst>
+        </pc:picChg>
+      </pc:sldChg>
+      <pc:sldChg chg="addSp delSp modSp new mod">
+        <pc:chgData name="Nicolas Bello" userId="2c9c2fd434c754b4" providerId="LiveId" clId="{80C3D7AE-5AB5-439E-B8E3-CE43FFB0FFAC}" dt="2021-02-11T02:00:46.507" v="76" actId="1076"/>
+        <pc:sldMkLst>
+          <pc:docMk/>
+          <pc:sldMk cId="1380461838" sldId="272"/>
+        </pc:sldMkLst>
+        <pc:spChg chg="del">
+          <ac:chgData name="Nicolas Bello" userId="2c9c2fd434c754b4" providerId="LiveId" clId="{80C3D7AE-5AB5-439E-B8E3-CE43FFB0FFAC}" dt="2021-02-11T01:59:36.720" v="67" actId="478"/>
+          <ac:spMkLst>
+            <pc:docMk/>
+            <pc:sldMk cId="1380461838" sldId="272"/>
+            <ac:spMk id="2" creationId="{ECAF25AA-4900-43A3-8F04-BC3041A0C6A8}"/>
+          </ac:spMkLst>
+        </pc:spChg>
+        <pc:spChg chg="del">
+          <ac:chgData name="Nicolas Bello" userId="2c9c2fd434c754b4" providerId="LiveId" clId="{80C3D7AE-5AB5-439E-B8E3-CE43FFB0FFAC}" dt="2021-02-11T02:00:01.868" v="68" actId="931"/>
+          <ac:spMkLst>
+            <pc:docMk/>
+            <pc:sldMk cId="1380461838" sldId="272"/>
+            <ac:spMk id="3" creationId="{1134FD91-DE08-4133-BDEA-65E51E95D188}"/>
+          </ac:spMkLst>
+        </pc:spChg>
+        <pc:picChg chg="add mod">
+          <ac:chgData name="Nicolas Bello" userId="2c9c2fd434c754b4" providerId="LiveId" clId="{80C3D7AE-5AB5-439E-B8E3-CE43FFB0FFAC}" dt="2021-02-11T02:00:46.507" v="76" actId="1076"/>
+          <ac:picMkLst>
+            <pc:docMk/>
+            <pc:sldMk cId="1380461838" sldId="272"/>
+            <ac:picMk id="5" creationId="{6A27756A-83DA-43EB-B3F6-2903E84B18EC}"/>
+          </ac:picMkLst>
+        </pc:picChg>
+        <pc:picChg chg="add mod">
+          <ac:chgData name="Nicolas Bello" userId="2c9c2fd434c754b4" providerId="LiveId" clId="{80C3D7AE-5AB5-439E-B8E3-CE43FFB0FFAC}" dt="2021-02-11T02:00:38.448" v="74" actId="1076"/>
+          <ac:picMkLst>
+            <pc:docMk/>
+            <pc:sldMk cId="1380461838" sldId="272"/>
+            <ac:picMk id="7" creationId="{A747418E-7652-43E4-9AA0-117AEDD024E1}"/>
+          </ac:picMkLst>
+        </pc:picChg>
+      </pc:sldChg>
+      <pc:sldChg chg="addSp delSp modSp new mod">
+        <pc:chgData name="Nicolas Bello" userId="2c9c2fd434c754b4" providerId="LiveId" clId="{80C3D7AE-5AB5-439E-B8E3-CE43FFB0FFAC}" dt="2021-02-11T02:02:06.700" v="89" actId="1076"/>
+        <pc:sldMkLst>
+          <pc:docMk/>
+          <pc:sldMk cId="2390217425" sldId="273"/>
+        </pc:sldMkLst>
+        <pc:spChg chg="del">
+          <ac:chgData name="Nicolas Bello" userId="2c9c2fd434c754b4" providerId="LiveId" clId="{80C3D7AE-5AB5-439E-B8E3-CE43FFB0FFAC}" dt="2021-02-11T02:01:38.820" v="84" actId="478"/>
+          <ac:spMkLst>
+            <pc:docMk/>
+            <pc:sldMk cId="2390217425" sldId="273"/>
+            <ac:spMk id="2" creationId="{E4ACBC08-780D-4014-B677-2AD7AE83D860}"/>
+          </ac:spMkLst>
+        </pc:spChg>
+        <pc:spChg chg="del">
+          <ac:chgData name="Nicolas Bello" userId="2c9c2fd434c754b4" providerId="LiveId" clId="{80C3D7AE-5AB5-439E-B8E3-CE43FFB0FFAC}" dt="2021-02-11T02:01:25.545" v="78" actId="931"/>
+          <ac:spMkLst>
+            <pc:docMk/>
+            <pc:sldMk cId="2390217425" sldId="273"/>
+            <ac:spMk id="3" creationId="{FF557036-CF38-4B8A-AEA6-B13F3FAB42BC}"/>
+          </ac:spMkLst>
+        </pc:spChg>
+        <pc:picChg chg="add mod">
+          <ac:chgData name="Nicolas Bello" userId="2c9c2fd434c754b4" providerId="LiveId" clId="{80C3D7AE-5AB5-439E-B8E3-CE43FFB0FFAC}" dt="2021-02-11T02:02:06.700" v="89" actId="1076"/>
+          <ac:picMkLst>
+            <pc:docMk/>
+            <pc:sldMk cId="2390217425" sldId="273"/>
+            <ac:picMk id="5" creationId="{16AFEACB-CE01-4046-B709-65EEF46D5E0C}"/>
+          </ac:picMkLst>
+        </pc:picChg>
+        <pc:picChg chg="add mod">
+          <ac:chgData name="Nicolas Bello" userId="2c9c2fd434c754b4" providerId="LiveId" clId="{80C3D7AE-5AB5-439E-B8E3-CE43FFB0FFAC}" dt="2021-02-11T02:02:04.614" v="88" actId="1076"/>
+          <ac:picMkLst>
+            <pc:docMk/>
+            <pc:sldMk cId="2390217425" sldId="273"/>
+            <ac:picMk id="7" creationId="{F2AC53FB-7B59-483F-B3D9-83FC7B6272F4}"/>
+          </ac:picMkLst>
+        </pc:picChg>
+      </pc:sldChg>
+    </pc:docChg>
+  </pc:docChgLst>
   <pc:docChgLst>
     <pc:chgData name="pamela hinostroza" userId="c80913c5e854edc0" providerId="LiveId" clId="{2039BAF4-23A1-4312-9CE0-DBE1F5B3E171}"/>
     <pc:docChg chg="custSel addSld delSld modSld sldOrd">
@@ -1290,6 +1539,90 @@
     <p:extLst>
       <p:ext uri="{BB962C8B-B14F-4D97-AF65-F5344CB8AC3E}">
         <p14:creationId xmlns:p14="http://schemas.microsoft.com/office/powerpoint/2010/main" val="1689305134"/>
+      </p:ext>
+    </p:extLst>
+  </p:cSld>
+  <p:clrMapOvr>
+    <a:masterClrMapping/>
+  </p:clrMapOvr>
+</p:notes>
+</file>
+
+<file path=ppt/notesSlides/notesSlide4.xml><?xml version="1.0" encoding="utf-8"?>
+<p:notes xmlns:a="http://schemas.openxmlformats.org/drawingml/2006/main" xmlns:r="http://schemas.openxmlformats.org/officeDocument/2006/relationships" xmlns:p="http://schemas.openxmlformats.org/presentationml/2006/main">
+  <p:cSld>
+    <p:spTree>
+      <p:nvGrpSpPr>
+        <p:cNvPr id="1" name=""/>
+        <p:cNvGrpSpPr/>
+        <p:nvPr/>
+      </p:nvGrpSpPr>
+      <p:grpSpPr>
+        <a:xfrm>
+          <a:off x="0" y="0"/>
+          <a:ext cx="0" cy="0"/>
+          <a:chOff x="0" y="0"/>
+          <a:chExt cx="0" cy="0"/>
+        </a:xfrm>
+      </p:grpSpPr>
+      <p:sp>
+        <p:nvSpPr>
+          <p:cNvPr id="2" name="Slide Image Placeholder 1"/>
+          <p:cNvSpPr>
+            <a:spLocks noGrp="1" noRot="1" noChangeAspect="1"/>
+          </p:cNvSpPr>
+          <p:nvPr>
+            <p:ph type="sldImg"/>
+          </p:nvPr>
+        </p:nvSpPr>
+        <p:spPr/>
+      </p:sp>
+      <p:sp>
+        <p:nvSpPr>
+          <p:cNvPr id="3" name="Notes Placeholder 2"/>
+          <p:cNvSpPr>
+            <a:spLocks noGrp="1"/>
+          </p:cNvSpPr>
+          <p:nvPr>
+            <p:ph type="body" idx="1"/>
+          </p:nvPr>
+        </p:nvSpPr>
+        <p:spPr/>
+        <p:txBody>
+          <a:bodyPr/>
+          <a:lstStyle/>
+          <a:p>
+            <a:endParaRPr lang="en-US" dirty="0"/>
+          </a:p>
+        </p:txBody>
+      </p:sp>
+      <p:sp>
+        <p:nvSpPr>
+          <p:cNvPr id="4" name="Slide Number Placeholder 3"/>
+          <p:cNvSpPr>
+            <a:spLocks noGrp="1"/>
+          </p:cNvSpPr>
+          <p:nvPr>
+            <p:ph type="sldNum" sz="quarter" idx="5"/>
+          </p:nvPr>
+        </p:nvSpPr>
+        <p:spPr/>
+        <p:txBody>
+          <a:bodyPr/>
+          <a:lstStyle/>
+          <a:p>
+            <a:fld id="{B9122BD1-4087-48A7-BD72-C1CFA9C767DC}" type="slidenum">
+              <a:rPr lang="en-US" smtClean="0"/>
+              <a:t>10</a:t>
+            </a:fld>
+            <a:endParaRPr lang="en-US"/>
+          </a:p>
+        </p:txBody>
+      </p:sp>
+    </p:spTree>
+    <p:extLst>
+      <p:ext uri="{BB962C8B-B14F-4D97-AF65-F5344CB8AC3E}">
+        <p14:creationId xmlns:p14="http://schemas.microsoft.com/office/powerpoint/2010/main" val="3681647140"/>
       </p:ext>
     </p:extLst>
   </p:cSld>
@@ -4579,6 +4912,726 @@
 </p:sld>
 </file>
 
+<file path=ppt/slides/slide10.xml><?xml version="1.0" encoding="utf-8"?>
+<p:sld xmlns:a="http://schemas.openxmlformats.org/drawingml/2006/main" xmlns:r="http://schemas.openxmlformats.org/officeDocument/2006/relationships" xmlns:p="http://schemas.openxmlformats.org/presentationml/2006/main">
+  <p:cSld>
+    <p:spTree>
+      <p:nvGrpSpPr>
+        <p:cNvPr id="1" name=""/>
+        <p:cNvGrpSpPr/>
+        <p:nvPr/>
+      </p:nvGrpSpPr>
+      <p:grpSpPr>
+        <a:xfrm>
+          <a:off x="0" y="0"/>
+          <a:ext cx="0" cy="0"/>
+          <a:chOff x="0" y="0"/>
+          <a:chExt cx="0" cy="0"/>
+        </a:xfrm>
+      </p:grpSpPr>
+      <p:pic>
+        <p:nvPicPr>
+          <p:cNvPr id="5" name="Content Placeholder 4" descr="Chart, scatter chart&#10;&#10;Description automatically generated">
+            <a:extLst>
+              <a:ext uri="{FF2B5EF4-FFF2-40B4-BE49-F238E27FC236}">
+                <a16:creationId xmlns:a16="http://schemas.microsoft.com/office/drawing/2014/main" id="{196754CC-62F3-459E-86D9-3F2E28FD1A7D}"/>
+              </a:ext>
+            </a:extLst>
+          </p:cNvPr>
+          <p:cNvPicPr>
+            <a:picLocks noGrp="1" noChangeAspect="1"/>
+          </p:cNvPicPr>
+          <p:nvPr>
+            <p:ph idx="1"/>
+          </p:nvPr>
+        </p:nvPicPr>
+        <p:blipFill>
+          <a:blip r:embed="rId3">
+            <a:extLst>
+              <a:ext uri="{28A0092B-C50C-407E-A947-70E740481C1C}">
+                <a14:useLocalDpi xmlns:a14="http://schemas.microsoft.com/office/drawing/2010/main" val="0"/>
+              </a:ext>
+            </a:extLst>
+          </a:blip>
+          <a:stretch>
+            <a:fillRect/>
+          </a:stretch>
+        </p:blipFill>
+        <p:spPr>
+          <a:xfrm>
+            <a:off x="2667280" y="2172077"/>
+            <a:ext cx="6857435" cy="4571623"/>
+          </a:xfrm>
+        </p:spPr>
+      </p:pic>
+      <p:pic>
+        <p:nvPicPr>
+          <p:cNvPr id="7" name="Picture 6">
+            <a:extLst>
+              <a:ext uri="{FF2B5EF4-FFF2-40B4-BE49-F238E27FC236}">
+                <a16:creationId xmlns:a16="http://schemas.microsoft.com/office/drawing/2014/main" id="{05E96D42-3F9E-47C9-80D4-F6E5944131A0}"/>
+              </a:ext>
+            </a:extLst>
+          </p:cNvPr>
+          <p:cNvPicPr>
+            <a:picLocks noChangeAspect="1"/>
+          </p:cNvPicPr>
+          <p:nvPr/>
+        </p:nvPicPr>
+        <p:blipFill>
+          <a:blip r:embed="rId4"/>
+          <a:stretch>
+            <a:fillRect/>
+          </a:stretch>
+        </p:blipFill>
+        <p:spPr>
+          <a:xfrm>
+            <a:off x="2462211" y="114300"/>
+            <a:ext cx="7267575" cy="2194430"/>
+          </a:xfrm>
+          <a:prstGeom prst="rect">
+            <a:avLst/>
+          </a:prstGeom>
+        </p:spPr>
+      </p:pic>
+    </p:spTree>
+    <p:extLst>
+      <p:ext uri="{BB962C8B-B14F-4D97-AF65-F5344CB8AC3E}">
+        <p14:creationId xmlns:p14="http://schemas.microsoft.com/office/powerpoint/2010/main" val="3107796215"/>
+      </p:ext>
+    </p:extLst>
+  </p:cSld>
+  <p:clrMapOvr>
+    <a:masterClrMapping/>
+  </p:clrMapOvr>
+</p:sld>
+</file>
+
+<file path=ppt/slides/slide11.xml><?xml version="1.0" encoding="utf-8"?>
+<p:sld xmlns:a="http://schemas.openxmlformats.org/drawingml/2006/main" xmlns:r="http://schemas.openxmlformats.org/officeDocument/2006/relationships" xmlns:p="http://schemas.openxmlformats.org/presentationml/2006/main">
+  <p:cSld>
+    <p:spTree>
+      <p:nvGrpSpPr>
+        <p:cNvPr id="1" name=""/>
+        <p:cNvGrpSpPr/>
+        <p:nvPr/>
+      </p:nvGrpSpPr>
+      <p:grpSpPr>
+        <a:xfrm>
+          <a:off x="0" y="0"/>
+          <a:ext cx="0" cy="0"/>
+          <a:chOff x="0" y="0"/>
+          <a:chExt cx="0" cy="0"/>
+        </a:xfrm>
+      </p:grpSpPr>
+      <p:pic>
+        <p:nvPicPr>
+          <p:cNvPr id="5" name="Content Placeholder 4" descr="Chart, scatter chart&#10;&#10;Description automatically generated">
+            <a:extLst>
+              <a:ext uri="{FF2B5EF4-FFF2-40B4-BE49-F238E27FC236}">
+                <a16:creationId xmlns:a16="http://schemas.microsoft.com/office/drawing/2014/main" id="{18230708-ECDE-4637-AB7D-E310A96DCE18}"/>
+              </a:ext>
+            </a:extLst>
+          </p:cNvPr>
+          <p:cNvPicPr>
+            <a:picLocks noGrp="1" noChangeAspect="1"/>
+          </p:cNvPicPr>
+          <p:nvPr>
+            <p:ph idx="1"/>
+          </p:nvPr>
+        </p:nvPicPr>
+        <p:blipFill>
+          <a:blip r:embed="rId2">
+            <a:extLst>
+              <a:ext uri="{28A0092B-C50C-407E-A947-70E740481C1C}">
+                <a14:useLocalDpi xmlns:a14="http://schemas.microsoft.com/office/drawing/2010/main" val="0"/>
+              </a:ext>
+            </a:extLst>
+          </a:blip>
+          <a:stretch>
+            <a:fillRect/>
+          </a:stretch>
+        </p:blipFill>
+        <p:spPr>
+          <a:xfrm>
+            <a:off x="2552387" y="1933952"/>
+            <a:ext cx="7087225" cy="4724816"/>
+          </a:xfrm>
+        </p:spPr>
+      </p:pic>
+      <p:pic>
+        <p:nvPicPr>
+          <p:cNvPr id="7" name="Picture 6">
+            <a:extLst>
+              <a:ext uri="{FF2B5EF4-FFF2-40B4-BE49-F238E27FC236}">
+                <a16:creationId xmlns:a16="http://schemas.microsoft.com/office/drawing/2014/main" id="{6F74EE74-9DE0-4FCC-B45D-EAECE51574F4}"/>
+              </a:ext>
+            </a:extLst>
+          </p:cNvPr>
+          <p:cNvPicPr>
+            <a:picLocks noChangeAspect="1"/>
+          </p:cNvPicPr>
+          <p:nvPr/>
+        </p:nvPicPr>
+        <p:blipFill>
+          <a:blip r:embed="rId3"/>
+          <a:stretch>
+            <a:fillRect/>
+          </a:stretch>
+        </p:blipFill>
+        <p:spPr>
+          <a:xfrm>
+            <a:off x="2805112" y="74833"/>
+            <a:ext cx="6581776" cy="2097244"/>
+          </a:xfrm>
+          <a:prstGeom prst="rect">
+            <a:avLst/>
+          </a:prstGeom>
+        </p:spPr>
+      </p:pic>
+    </p:spTree>
+    <p:extLst>
+      <p:ext uri="{BB962C8B-B14F-4D97-AF65-F5344CB8AC3E}">
+        <p14:creationId xmlns:p14="http://schemas.microsoft.com/office/powerpoint/2010/main" val="1318568891"/>
+      </p:ext>
+    </p:extLst>
+  </p:cSld>
+  <p:clrMapOvr>
+    <a:masterClrMapping/>
+  </p:clrMapOvr>
+</p:sld>
+</file>
+
+<file path=ppt/slides/slide12.xml><?xml version="1.0" encoding="utf-8"?>
+<p:sld xmlns:a="http://schemas.openxmlformats.org/drawingml/2006/main" xmlns:r="http://schemas.openxmlformats.org/officeDocument/2006/relationships" xmlns:p="http://schemas.openxmlformats.org/presentationml/2006/main">
+  <p:cSld>
+    <p:spTree>
+      <p:nvGrpSpPr>
+        <p:cNvPr id="1" name=""/>
+        <p:cNvGrpSpPr/>
+        <p:nvPr/>
+      </p:nvGrpSpPr>
+      <p:grpSpPr>
+        <a:xfrm>
+          <a:off x="0" y="0"/>
+          <a:ext cx="0" cy="0"/>
+          <a:chOff x="0" y="0"/>
+          <a:chExt cx="0" cy="0"/>
+        </a:xfrm>
+      </p:grpSpPr>
+      <p:pic>
+        <p:nvPicPr>
+          <p:cNvPr id="5" name="Content Placeholder 4" descr="Chart, scatter chart&#10;&#10;Description automatically generated">
+            <a:extLst>
+              <a:ext uri="{FF2B5EF4-FFF2-40B4-BE49-F238E27FC236}">
+                <a16:creationId xmlns:a16="http://schemas.microsoft.com/office/drawing/2014/main" id="{54BBCF21-37A4-4847-9DE0-8676685459D0}"/>
+              </a:ext>
+            </a:extLst>
+          </p:cNvPr>
+          <p:cNvPicPr>
+            <a:picLocks noGrp="1" noChangeAspect="1"/>
+          </p:cNvPicPr>
+          <p:nvPr>
+            <p:ph idx="1"/>
+          </p:nvPr>
+        </p:nvPicPr>
+        <p:blipFill>
+          <a:blip r:embed="rId2">
+            <a:extLst>
+              <a:ext uri="{28A0092B-C50C-407E-A947-70E740481C1C}">
+                <a14:useLocalDpi xmlns:a14="http://schemas.microsoft.com/office/drawing/2010/main" val="0"/>
+              </a:ext>
+            </a:extLst>
+          </a:blip>
+          <a:stretch>
+            <a:fillRect/>
+          </a:stretch>
+        </p:blipFill>
+        <p:spPr>
+          <a:xfrm>
+            <a:off x="2652400" y="2204769"/>
+            <a:ext cx="6887200" cy="4591466"/>
+          </a:xfrm>
+        </p:spPr>
+      </p:pic>
+      <p:pic>
+        <p:nvPicPr>
+          <p:cNvPr id="7" name="Picture 6">
+            <a:extLst>
+              <a:ext uri="{FF2B5EF4-FFF2-40B4-BE49-F238E27FC236}">
+                <a16:creationId xmlns:a16="http://schemas.microsoft.com/office/drawing/2014/main" id="{EB3E75BD-58A5-4A9C-A614-0508F5351536}"/>
+              </a:ext>
+            </a:extLst>
+          </p:cNvPr>
+          <p:cNvPicPr>
+            <a:picLocks noChangeAspect="1"/>
+          </p:cNvPicPr>
+          <p:nvPr/>
+        </p:nvPicPr>
+        <p:blipFill>
+          <a:blip r:embed="rId3"/>
+          <a:stretch>
+            <a:fillRect/>
+          </a:stretch>
+        </p:blipFill>
+        <p:spPr>
+          <a:xfrm>
+            <a:off x="2688431" y="109574"/>
+            <a:ext cx="6815138" cy="2247925"/>
+          </a:xfrm>
+          <a:prstGeom prst="rect">
+            <a:avLst/>
+          </a:prstGeom>
+        </p:spPr>
+      </p:pic>
+    </p:spTree>
+    <p:extLst>
+      <p:ext uri="{BB962C8B-B14F-4D97-AF65-F5344CB8AC3E}">
+        <p14:creationId xmlns:p14="http://schemas.microsoft.com/office/powerpoint/2010/main" val="2383399923"/>
+      </p:ext>
+    </p:extLst>
+  </p:cSld>
+  <p:clrMapOvr>
+    <a:masterClrMapping/>
+  </p:clrMapOvr>
+</p:sld>
+</file>
+
+<file path=ppt/slides/slide13.xml><?xml version="1.0" encoding="utf-8"?>
+<p:sld xmlns:a="http://schemas.openxmlformats.org/drawingml/2006/main" xmlns:r="http://schemas.openxmlformats.org/officeDocument/2006/relationships" xmlns:p="http://schemas.openxmlformats.org/presentationml/2006/main">
+  <p:cSld>
+    <p:spTree>
+      <p:nvGrpSpPr>
+        <p:cNvPr id="1" name=""/>
+        <p:cNvGrpSpPr/>
+        <p:nvPr/>
+      </p:nvGrpSpPr>
+      <p:grpSpPr>
+        <a:xfrm>
+          <a:off x="0" y="0"/>
+          <a:ext cx="0" cy="0"/>
+          <a:chOff x="0" y="0"/>
+          <a:chExt cx="0" cy="0"/>
+        </a:xfrm>
+      </p:grpSpPr>
+      <p:pic>
+        <p:nvPicPr>
+          <p:cNvPr id="5" name="Content Placeholder 4" descr="Chart, scatter chart&#10;&#10;Description automatically generated">
+            <a:extLst>
+              <a:ext uri="{FF2B5EF4-FFF2-40B4-BE49-F238E27FC236}">
+                <a16:creationId xmlns:a16="http://schemas.microsoft.com/office/drawing/2014/main" id="{6A27756A-83DA-43EB-B3F6-2903E84B18EC}"/>
+              </a:ext>
+            </a:extLst>
+          </p:cNvPr>
+          <p:cNvPicPr>
+            <a:picLocks noGrp="1" noChangeAspect="1"/>
+          </p:cNvPicPr>
+          <p:nvPr>
+            <p:ph idx="1"/>
+          </p:nvPr>
+        </p:nvPicPr>
+        <p:blipFill>
+          <a:blip r:embed="rId2">
+            <a:extLst>
+              <a:ext uri="{28A0092B-C50C-407E-A947-70E740481C1C}">
+                <a14:useLocalDpi xmlns:a14="http://schemas.microsoft.com/office/drawing/2010/main" val="0"/>
+              </a:ext>
+            </a:extLst>
+          </a:blip>
+          <a:stretch>
+            <a:fillRect/>
+          </a:stretch>
+        </p:blipFill>
+        <p:spPr>
+          <a:xfrm>
+            <a:off x="2776225" y="2319163"/>
+            <a:ext cx="6639550" cy="4426366"/>
+          </a:xfrm>
+        </p:spPr>
+      </p:pic>
+      <p:pic>
+        <p:nvPicPr>
+          <p:cNvPr id="7" name="Picture 6">
+            <a:extLst>
+              <a:ext uri="{FF2B5EF4-FFF2-40B4-BE49-F238E27FC236}">
+                <a16:creationId xmlns:a16="http://schemas.microsoft.com/office/drawing/2014/main" id="{A747418E-7652-43E4-9AA0-117AEDD024E1}"/>
+              </a:ext>
+            </a:extLst>
+          </p:cNvPr>
+          <p:cNvPicPr>
+            <a:picLocks noChangeAspect="1"/>
+          </p:cNvPicPr>
+          <p:nvPr/>
+        </p:nvPicPr>
+        <p:blipFill>
+          <a:blip r:embed="rId3"/>
+          <a:stretch>
+            <a:fillRect/>
+          </a:stretch>
+        </p:blipFill>
+        <p:spPr>
+          <a:xfrm>
+            <a:off x="2581275" y="67052"/>
+            <a:ext cx="7029450" cy="2258603"/>
+          </a:xfrm>
+          <a:prstGeom prst="rect">
+            <a:avLst/>
+          </a:prstGeom>
+        </p:spPr>
+      </p:pic>
+    </p:spTree>
+    <p:extLst>
+      <p:ext uri="{BB962C8B-B14F-4D97-AF65-F5344CB8AC3E}">
+        <p14:creationId xmlns:p14="http://schemas.microsoft.com/office/powerpoint/2010/main" val="1380461838"/>
+      </p:ext>
+    </p:extLst>
+  </p:cSld>
+  <p:clrMapOvr>
+    <a:masterClrMapping/>
+  </p:clrMapOvr>
+</p:sld>
+</file>
+
+<file path=ppt/slides/slide14.xml><?xml version="1.0" encoding="utf-8"?>
+<p:sld xmlns:a="http://schemas.openxmlformats.org/drawingml/2006/main" xmlns:r="http://schemas.openxmlformats.org/officeDocument/2006/relationships" xmlns:p="http://schemas.openxmlformats.org/presentationml/2006/main">
+  <p:cSld>
+    <p:spTree>
+      <p:nvGrpSpPr>
+        <p:cNvPr id="1" name=""/>
+        <p:cNvGrpSpPr/>
+        <p:nvPr/>
+      </p:nvGrpSpPr>
+      <p:grpSpPr>
+        <a:xfrm>
+          <a:off x="0" y="0"/>
+          <a:ext cx="0" cy="0"/>
+          <a:chOff x="0" y="0"/>
+          <a:chExt cx="0" cy="0"/>
+        </a:xfrm>
+      </p:grpSpPr>
+      <p:pic>
+        <p:nvPicPr>
+          <p:cNvPr id="5" name="Content Placeholder 4" descr="Chart, scatter chart&#10;&#10;Description automatically generated">
+            <a:extLst>
+              <a:ext uri="{FF2B5EF4-FFF2-40B4-BE49-F238E27FC236}">
+                <a16:creationId xmlns:a16="http://schemas.microsoft.com/office/drawing/2014/main" id="{16AFEACB-CE01-4046-B709-65EEF46D5E0C}"/>
+              </a:ext>
+            </a:extLst>
+          </p:cNvPr>
+          <p:cNvPicPr>
+            <a:picLocks noGrp="1" noChangeAspect="1"/>
+          </p:cNvPicPr>
+          <p:nvPr>
+            <p:ph idx="1"/>
+          </p:nvPr>
+        </p:nvPicPr>
+        <p:blipFill>
+          <a:blip r:embed="rId2">
+            <a:extLst>
+              <a:ext uri="{28A0092B-C50C-407E-A947-70E740481C1C}">
+                <a14:useLocalDpi xmlns:a14="http://schemas.microsoft.com/office/drawing/2010/main" val="0"/>
+              </a:ext>
+            </a:extLst>
+          </a:blip>
+          <a:stretch>
+            <a:fillRect/>
+          </a:stretch>
+        </p:blipFill>
+        <p:spPr>
+          <a:xfrm>
+            <a:off x="2645904" y="2077476"/>
+            <a:ext cx="6900189" cy="4600126"/>
+          </a:xfrm>
+        </p:spPr>
+      </p:pic>
+      <p:pic>
+        <p:nvPicPr>
+          <p:cNvPr id="7" name="Picture 6">
+            <a:extLst>
+              <a:ext uri="{FF2B5EF4-FFF2-40B4-BE49-F238E27FC236}">
+                <a16:creationId xmlns:a16="http://schemas.microsoft.com/office/drawing/2014/main" id="{F2AC53FB-7B59-483F-B3D9-83FC7B6272F4}"/>
+              </a:ext>
+            </a:extLst>
+          </p:cNvPr>
+          <p:cNvPicPr>
+            <a:picLocks noChangeAspect="1"/>
+          </p:cNvPicPr>
+          <p:nvPr/>
+        </p:nvPicPr>
+        <p:blipFill>
+          <a:blip r:embed="rId3"/>
+          <a:stretch>
+            <a:fillRect/>
+          </a:stretch>
+        </p:blipFill>
+        <p:spPr>
+          <a:xfrm>
+            <a:off x="1992745" y="71870"/>
+            <a:ext cx="8206508" cy="2096228"/>
+          </a:xfrm>
+          <a:prstGeom prst="rect">
+            <a:avLst/>
+          </a:prstGeom>
+        </p:spPr>
+      </p:pic>
+    </p:spTree>
+    <p:extLst>
+      <p:ext uri="{BB962C8B-B14F-4D97-AF65-F5344CB8AC3E}">
+        <p14:creationId xmlns:p14="http://schemas.microsoft.com/office/powerpoint/2010/main" val="2390217425"/>
+      </p:ext>
+    </p:extLst>
+  </p:cSld>
+  <p:clrMapOvr>
+    <a:masterClrMapping/>
+  </p:clrMapOvr>
+</p:sld>
+</file>
+
+<file path=ppt/slides/slide15.xml><?xml version="1.0" encoding="utf-8"?>
+<p:sld xmlns:a="http://schemas.openxmlformats.org/drawingml/2006/main" xmlns:r="http://schemas.openxmlformats.org/officeDocument/2006/relationships" xmlns:p="http://schemas.openxmlformats.org/presentationml/2006/main">
+  <p:cSld>
+    <p:spTree>
+      <p:nvGrpSpPr>
+        <p:cNvPr id="1" name=""/>
+        <p:cNvGrpSpPr/>
+        <p:nvPr/>
+      </p:nvGrpSpPr>
+      <p:grpSpPr>
+        <a:xfrm>
+          <a:off x="0" y="0"/>
+          <a:ext cx="0" cy="0"/>
+          <a:chOff x="0" y="0"/>
+          <a:chExt cx="0" cy="0"/>
+        </a:xfrm>
+      </p:grpSpPr>
+      <p:sp>
+        <p:nvSpPr>
+          <p:cNvPr id="2" name="Title 1">
+            <a:extLst>
+              <a:ext uri="{FF2B5EF4-FFF2-40B4-BE49-F238E27FC236}">
+                <a16:creationId xmlns:a16="http://schemas.microsoft.com/office/drawing/2014/main" id="{A6BE369A-4269-4A2C-95A9-5DC57CB6362C}"/>
+              </a:ext>
+            </a:extLst>
+          </p:cNvPr>
+          <p:cNvSpPr>
+            <a:spLocks noGrp="1"/>
+          </p:cNvSpPr>
+          <p:nvPr>
+            <p:ph type="title"/>
+          </p:nvPr>
+        </p:nvSpPr>
+        <p:spPr/>
+        <p:txBody>
+          <a:bodyPr/>
+          <a:lstStyle/>
+          <a:p>
+            <a:r>
+              <a:rPr lang="en-US" dirty="0"/>
+              <a:t>References</a:t>
+            </a:r>
+          </a:p>
+        </p:txBody>
+      </p:sp>
+      <p:sp>
+        <p:nvSpPr>
+          <p:cNvPr id="3" name="Content Placeholder 2">
+            <a:extLst>
+              <a:ext uri="{FF2B5EF4-FFF2-40B4-BE49-F238E27FC236}">
+                <a16:creationId xmlns:a16="http://schemas.microsoft.com/office/drawing/2014/main" id="{CC0B831E-731A-412B-BAE2-376D6674DE30}"/>
+              </a:ext>
+            </a:extLst>
+          </p:cNvPr>
+          <p:cNvSpPr>
+            <a:spLocks noGrp="1"/>
+          </p:cNvSpPr>
+          <p:nvPr>
+            <p:ph idx="1"/>
+          </p:nvPr>
+        </p:nvSpPr>
+        <p:spPr/>
+        <p:txBody>
+          <a:bodyPr/>
+          <a:lstStyle/>
+          <a:p>
+            <a:pPr marL="0" marR="0">
+              <a:lnSpc>
+                <a:spcPct val="107000"/>
+              </a:lnSpc>
+              <a:spcBef>
+                <a:spcPts val="0"/>
+              </a:spcBef>
+              <a:spcAft>
+                <a:spcPts val="800"/>
+              </a:spcAft>
+            </a:pPr>
+            <a:r>
+              <a:rPr lang="en-US" sz="1800" dirty="0">
+                <a:effectLst/>
+                <a:latin typeface="Calibri" panose="020F0502020204030204" pitchFamily="34" charset="0"/>
+                <a:ea typeface="Calibri" panose="020F0502020204030204" pitchFamily="34" charset="0"/>
+                <a:cs typeface="Times New Roman" panose="02020603050405020304" pitchFamily="18" charset="0"/>
+              </a:rPr>
+              <a:t>Graduation rates and entry rates:</a:t>
+            </a:r>
+          </a:p>
+          <a:p>
+            <a:pPr marL="457200" lvl="1">
+              <a:lnSpc>
+                <a:spcPct val="107000"/>
+              </a:lnSpc>
+              <a:spcBef>
+                <a:spcPts val="0"/>
+              </a:spcBef>
+              <a:spcAft>
+                <a:spcPts val="800"/>
+              </a:spcAft>
+            </a:pPr>
+            <a:r>
+              <a:rPr lang="en-US" sz="1400" u="sng" dirty="0">
+                <a:solidFill>
+                  <a:srgbClr val="0563C1"/>
+                </a:solidFill>
+                <a:effectLst/>
+                <a:latin typeface="Calibri" panose="020F0502020204030204" pitchFamily="34" charset="0"/>
+                <a:ea typeface="Calibri" panose="020F0502020204030204" pitchFamily="34" charset="0"/>
+                <a:cs typeface="Times New Roman" panose="02020603050405020304" pitchFamily="18" charset="0"/>
+                <a:hlinkClick r:id="rId2"/>
+              </a:rPr>
+              <a:t>https://stats.oecd.org/Index.aspx?DataSetCode=EAG_GRAD_ENTR_RATES</a:t>
+            </a:r>
+            <a:endParaRPr lang="en-US" sz="1400" dirty="0">
+              <a:effectLst/>
+              <a:latin typeface="Calibri" panose="020F0502020204030204" pitchFamily="34" charset="0"/>
+              <a:ea typeface="Calibri" panose="020F0502020204030204" pitchFamily="34" charset="0"/>
+              <a:cs typeface="Times New Roman" panose="02020603050405020304" pitchFamily="18" charset="0"/>
+            </a:endParaRPr>
+          </a:p>
+          <a:p>
+            <a:pPr marL="0" marR="0">
+              <a:lnSpc>
+                <a:spcPct val="107000"/>
+              </a:lnSpc>
+              <a:spcBef>
+                <a:spcPts val="0"/>
+              </a:spcBef>
+              <a:spcAft>
+                <a:spcPts val="800"/>
+              </a:spcAft>
+            </a:pPr>
+            <a:r>
+              <a:rPr lang="en-US" sz="1800" dirty="0">
+                <a:effectLst/>
+                <a:latin typeface="Calibri" panose="020F0502020204030204" pitchFamily="34" charset="0"/>
+                <a:ea typeface="Calibri" panose="020F0502020204030204" pitchFamily="34" charset="0"/>
+                <a:cs typeface="Times New Roman" panose="02020603050405020304" pitchFamily="18" charset="0"/>
+              </a:rPr>
+              <a:t>Government expenditure on education (%of GDP):</a:t>
+            </a:r>
+          </a:p>
+          <a:p>
+            <a:pPr marL="457200" lvl="1">
+              <a:lnSpc>
+                <a:spcPct val="107000"/>
+              </a:lnSpc>
+              <a:spcBef>
+                <a:spcPts val="0"/>
+              </a:spcBef>
+              <a:spcAft>
+                <a:spcPts val="800"/>
+              </a:spcAft>
+            </a:pPr>
+            <a:r>
+              <a:rPr lang="en-US" sz="1400" u="sng" dirty="0">
+                <a:solidFill>
+                  <a:srgbClr val="0563C1"/>
+                </a:solidFill>
+                <a:effectLst/>
+                <a:latin typeface="Calibri" panose="020F0502020204030204" pitchFamily="34" charset="0"/>
+                <a:ea typeface="Calibri" panose="020F0502020204030204" pitchFamily="34" charset="0"/>
+                <a:cs typeface="Times New Roman" panose="02020603050405020304" pitchFamily="18" charset="0"/>
+                <a:hlinkClick r:id="rId3"/>
+              </a:rPr>
+              <a:t>https://ourworldindata.org/grapher/government-expenditure-on-education?time=2014</a:t>
+            </a:r>
+            <a:endParaRPr lang="en-US" sz="1400" dirty="0">
+              <a:effectLst/>
+              <a:latin typeface="Calibri" panose="020F0502020204030204" pitchFamily="34" charset="0"/>
+              <a:ea typeface="Calibri" panose="020F0502020204030204" pitchFamily="34" charset="0"/>
+              <a:cs typeface="Times New Roman" panose="02020603050405020304" pitchFamily="18" charset="0"/>
+            </a:endParaRPr>
+          </a:p>
+          <a:p>
+            <a:pPr marL="0" marR="0">
+              <a:lnSpc>
+                <a:spcPct val="107000"/>
+              </a:lnSpc>
+              <a:spcBef>
+                <a:spcPts val="0"/>
+              </a:spcBef>
+              <a:spcAft>
+                <a:spcPts val="800"/>
+              </a:spcAft>
+            </a:pPr>
+            <a:r>
+              <a:rPr lang="en-US" sz="1800" dirty="0">
+                <a:effectLst/>
+                <a:latin typeface="Calibri" panose="020F0502020204030204" pitchFamily="34" charset="0"/>
+                <a:ea typeface="Calibri" panose="020F0502020204030204" pitchFamily="34" charset="0"/>
+                <a:cs typeface="Times New Roman" panose="02020603050405020304" pitchFamily="18" charset="0"/>
+              </a:rPr>
+              <a:t>Persons held in prisons:</a:t>
+            </a:r>
+          </a:p>
+          <a:p>
+            <a:pPr marL="457200" lvl="1">
+              <a:lnSpc>
+                <a:spcPct val="107000"/>
+              </a:lnSpc>
+              <a:spcBef>
+                <a:spcPts val="0"/>
+              </a:spcBef>
+              <a:spcAft>
+                <a:spcPts val="800"/>
+              </a:spcAft>
+            </a:pPr>
+            <a:r>
+              <a:rPr lang="en-US" sz="1400" u="sng" dirty="0">
+                <a:solidFill>
+                  <a:srgbClr val="0563C1"/>
+                </a:solidFill>
+                <a:effectLst/>
+                <a:latin typeface="Calibri" panose="020F0502020204030204" pitchFamily="34" charset="0"/>
+                <a:ea typeface="Calibri" panose="020F0502020204030204" pitchFamily="34" charset="0"/>
+                <a:cs typeface="Times New Roman" panose="02020603050405020304" pitchFamily="18" charset="0"/>
+                <a:hlinkClick r:id="rId4"/>
+              </a:rPr>
+              <a:t>https://dataunodc.un.org/data/prison/persons%20held%20total</a:t>
+            </a:r>
+            <a:endParaRPr lang="en-US" sz="1400" dirty="0">
+              <a:effectLst/>
+              <a:latin typeface="Calibri" panose="020F0502020204030204" pitchFamily="34" charset="0"/>
+              <a:ea typeface="Calibri" panose="020F0502020204030204" pitchFamily="34" charset="0"/>
+              <a:cs typeface="Times New Roman" panose="02020603050405020304" pitchFamily="18" charset="0"/>
+            </a:endParaRPr>
+          </a:p>
+          <a:p>
+            <a:endParaRPr lang="en-US" dirty="0"/>
+          </a:p>
+        </p:txBody>
+      </p:sp>
+    </p:spTree>
+    <p:extLst>
+      <p:ext uri="{BB962C8B-B14F-4D97-AF65-F5344CB8AC3E}">
+        <p14:creationId xmlns:p14="http://schemas.microsoft.com/office/powerpoint/2010/main" val="3523656184"/>
+      </p:ext>
+    </p:extLst>
+  </p:cSld>
+  <p:clrMapOvr>
+    <a:masterClrMapping/>
+  </p:clrMapOvr>
+</p:sld>
+</file>
+
 <file path=ppt/slides/slide2.xml><?xml version="1.0" encoding="utf-8"?>
 <p:sld xmlns:a="http://schemas.openxmlformats.org/drawingml/2006/main" xmlns:r="http://schemas.openxmlformats.org/officeDocument/2006/relationships" xmlns:p="http://schemas.openxmlformats.org/presentationml/2006/main">
   <p:cSld>
@@ -5202,225 +6255,75 @@
           <a:chExt cx="0" cy="0"/>
         </a:xfrm>
       </p:grpSpPr>
-      <p:sp>
-        <p:nvSpPr>
-          <p:cNvPr id="2" name="Title 1">
-            <a:extLst>
-              <a:ext uri="{FF2B5EF4-FFF2-40B4-BE49-F238E27FC236}">
-                <a16:creationId xmlns:a16="http://schemas.microsoft.com/office/drawing/2014/main" id="{A6BE369A-4269-4A2C-95A9-5DC57CB6362C}"/>
-              </a:ext>
-            </a:extLst>
-          </p:cNvPr>
-          <p:cNvSpPr>
-            <a:spLocks noGrp="1"/>
-          </p:cNvSpPr>
-          <p:nvPr>
-            <p:ph type="title"/>
-          </p:nvPr>
-        </p:nvSpPr>
-        <p:spPr/>
-        <p:txBody>
-          <a:bodyPr/>
-          <a:lstStyle/>
-          <a:p>
-            <a:r>
-              <a:rPr lang="en-US" dirty="0"/>
-              <a:t>References</a:t>
-            </a:r>
-          </a:p>
-        </p:txBody>
-      </p:sp>
-      <p:sp>
-        <p:nvSpPr>
-          <p:cNvPr id="3" name="Content Placeholder 2">
-            <a:extLst>
-              <a:ext uri="{FF2B5EF4-FFF2-40B4-BE49-F238E27FC236}">
-                <a16:creationId xmlns:a16="http://schemas.microsoft.com/office/drawing/2014/main" id="{CC0B831E-731A-412B-BAE2-376D6674DE30}"/>
-              </a:ext>
-            </a:extLst>
-          </p:cNvPr>
-          <p:cNvSpPr>
-            <a:spLocks noGrp="1"/>
-          </p:cNvSpPr>
+      <p:pic>
+        <p:nvPicPr>
+          <p:cNvPr id="5" name="Content Placeholder 4" descr="Chart, bar chart&#10;&#10;Description automatically generated">
+            <a:extLst>
+              <a:ext uri="{FF2B5EF4-FFF2-40B4-BE49-F238E27FC236}">
+                <a16:creationId xmlns:a16="http://schemas.microsoft.com/office/drawing/2014/main" id="{82D3C8FB-67B4-458E-AD97-22EED0383CBB}"/>
+              </a:ext>
+            </a:extLst>
+          </p:cNvPr>
+          <p:cNvPicPr>
+            <a:picLocks noGrp="1" noChangeAspect="1"/>
+          </p:cNvPicPr>
           <p:nvPr>
             <p:ph idx="1"/>
           </p:nvPr>
-        </p:nvSpPr>
-        <p:spPr/>
-        <p:txBody>
-          <a:bodyPr/>
-          <a:lstStyle/>
-          <a:p>
-            <a:pPr marL="0" marR="0">
-              <a:lnSpc>
-                <a:spcPct val="107000"/>
-              </a:lnSpc>
-              <a:spcBef>
-                <a:spcPts val="0"/>
-              </a:spcBef>
-              <a:spcAft>
-                <a:spcPts val="800"/>
-              </a:spcAft>
-            </a:pPr>
-            <a:r>
-              <a:rPr lang="en-US" sz="1800" dirty="0">
-                <a:effectLst/>
-                <a:latin typeface="Calibri" panose="020F0502020204030204" pitchFamily="34" charset="0"/>
-                <a:ea typeface="Calibri" panose="020F0502020204030204" pitchFamily="34" charset="0"/>
-                <a:cs typeface="Times New Roman" panose="02020603050405020304" pitchFamily="18" charset="0"/>
-              </a:rPr>
-              <a:t>Graduation rates and entry rates:</a:t>
-            </a:r>
-          </a:p>
-          <a:p>
-            <a:pPr marL="457200" lvl="1">
-              <a:lnSpc>
-                <a:spcPct val="107000"/>
-              </a:lnSpc>
-              <a:spcBef>
-                <a:spcPts val="0"/>
-              </a:spcBef>
-              <a:spcAft>
-                <a:spcPts val="800"/>
-              </a:spcAft>
-            </a:pPr>
-            <a:r>
-              <a:rPr lang="en-US" sz="1400" u="sng" dirty="0">
-                <a:solidFill>
-                  <a:srgbClr val="0563C1"/>
-                </a:solidFill>
-                <a:effectLst/>
-                <a:latin typeface="Calibri" panose="020F0502020204030204" pitchFamily="34" charset="0"/>
-                <a:ea typeface="Calibri" panose="020F0502020204030204" pitchFamily="34" charset="0"/>
-                <a:cs typeface="Times New Roman" panose="02020603050405020304" pitchFamily="18" charset="0"/>
-                <a:hlinkClick r:id="rId2"/>
-              </a:rPr>
-              <a:t>https://stats.oecd.org/Index.aspx?DataSetCode=EAG_GRAD_ENTR_RATES</a:t>
-            </a:r>
-            <a:endParaRPr lang="en-US" sz="1400" dirty="0">
-              <a:effectLst/>
-              <a:latin typeface="Calibri" panose="020F0502020204030204" pitchFamily="34" charset="0"/>
-              <a:ea typeface="Calibri" panose="020F0502020204030204" pitchFamily="34" charset="0"/>
-              <a:cs typeface="Times New Roman" panose="02020603050405020304" pitchFamily="18" charset="0"/>
-            </a:endParaRPr>
-          </a:p>
-          <a:p>
-            <a:pPr marL="0" marR="0">
-              <a:lnSpc>
-                <a:spcPct val="107000"/>
-              </a:lnSpc>
-              <a:spcBef>
-                <a:spcPts val="0"/>
-              </a:spcBef>
-              <a:spcAft>
-                <a:spcPts val="800"/>
-              </a:spcAft>
-            </a:pPr>
-            <a:r>
-              <a:rPr lang="en-US" sz="1800" dirty="0">
-                <a:effectLst/>
-                <a:latin typeface="Calibri" panose="020F0502020204030204" pitchFamily="34" charset="0"/>
-                <a:ea typeface="Calibri" panose="020F0502020204030204" pitchFamily="34" charset="0"/>
-                <a:cs typeface="Times New Roman" panose="02020603050405020304" pitchFamily="18" charset="0"/>
-              </a:rPr>
-              <a:t>Government expenditure on education (%of GDP):</a:t>
-            </a:r>
-          </a:p>
-          <a:p>
-            <a:pPr marL="457200" lvl="1">
-              <a:lnSpc>
-                <a:spcPct val="107000"/>
-              </a:lnSpc>
-              <a:spcBef>
-                <a:spcPts val="0"/>
-              </a:spcBef>
-              <a:spcAft>
-                <a:spcPts val="800"/>
-              </a:spcAft>
-            </a:pPr>
-            <a:r>
-              <a:rPr lang="en-US" sz="1400" u="sng" dirty="0">
-                <a:solidFill>
-                  <a:srgbClr val="0563C1"/>
-                </a:solidFill>
-                <a:effectLst/>
-                <a:latin typeface="Calibri" panose="020F0502020204030204" pitchFamily="34" charset="0"/>
-                <a:ea typeface="Calibri" panose="020F0502020204030204" pitchFamily="34" charset="0"/>
-                <a:cs typeface="Times New Roman" panose="02020603050405020304" pitchFamily="18" charset="0"/>
-                <a:hlinkClick r:id="rId3"/>
-              </a:rPr>
-              <a:t>https://ourworldindata.org/grapher/government-expenditure-on-education?time=2014</a:t>
-            </a:r>
-            <a:endParaRPr lang="en-US" sz="1400" dirty="0">
-              <a:effectLst/>
-              <a:latin typeface="Calibri" panose="020F0502020204030204" pitchFamily="34" charset="0"/>
-              <a:ea typeface="Calibri" panose="020F0502020204030204" pitchFamily="34" charset="0"/>
-              <a:cs typeface="Times New Roman" panose="02020603050405020304" pitchFamily="18" charset="0"/>
-            </a:endParaRPr>
-          </a:p>
-          <a:p>
-            <a:pPr marL="0" marR="0">
-              <a:lnSpc>
-                <a:spcPct val="107000"/>
-              </a:lnSpc>
-              <a:spcBef>
-                <a:spcPts val="0"/>
-              </a:spcBef>
-              <a:spcAft>
-                <a:spcPts val="800"/>
-              </a:spcAft>
-            </a:pPr>
-            <a:r>
-              <a:rPr lang="en-US" sz="1800" dirty="0">
-                <a:effectLst/>
-                <a:latin typeface="Calibri" panose="020F0502020204030204" pitchFamily="34" charset="0"/>
-                <a:ea typeface="Calibri" panose="020F0502020204030204" pitchFamily="34" charset="0"/>
-                <a:cs typeface="Times New Roman" panose="02020603050405020304" pitchFamily="18" charset="0"/>
-              </a:rPr>
-              <a:t>Persons held in prisons:</a:t>
-            </a:r>
-          </a:p>
-          <a:p>
-            <a:pPr marL="457200" lvl="1">
-              <a:lnSpc>
-                <a:spcPct val="107000"/>
-              </a:lnSpc>
-              <a:spcBef>
-                <a:spcPts val="0"/>
-              </a:spcBef>
-              <a:spcAft>
-                <a:spcPts val="800"/>
-              </a:spcAft>
-            </a:pPr>
-            <a:r>
-              <a:rPr lang="en-US" sz="1400" u="sng" dirty="0">
-                <a:solidFill>
-                  <a:srgbClr val="0563C1"/>
-                </a:solidFill>
-                <a:effectLst/>
-                <a:latin typeface="Calibri" panose="020F0502020204030204" pitchFamily="34" charset="0"/>
-                <a:ea typeface="Calibri" panose="020F0502020204030204" pitchFamily="34" charset="0"/>
-                <a:cs typeface="Times New Roman" panose="02020603050405020304" pitchFamily="18" charset="0"/>
-                <a:hlinkClick r:id="rId4"/>
-              </a:rPr>
-              <a:t>https://dataunodc.un.org/data/prison/persons%20held%20total</a:t>
-            </a:r>
-            <a:endParaRPr lang="en-US" sz="1400" dirty="0">
-              <a:effectLst/>
-              <a:latin typeface="Calibri" panose="020F0502020204030204" pitchFamily="34" charset="0"/>
-              <a:ea typeface="Calibri" panose="020F0502020204030204" pitchFamily="34" charset="0"/>
-              <a:cs typeface="Times New Roman" panose="02020603050405020304" pitchFamily="18" charset="0"/>
-            </a:endParaRPr>
-          </a:p>
-          <a:p>
-            <a:endParaRPr lang="en-US" dirty="0"/>
-          </a:p>
-        </p:txBody>
-      </p:sp>
+        </p:nvPicPr>
+        <p:blipFill>
+          <a:blip r:embed="rId2">
+            <a:extLst>
+              <a:ext uri="{28A0092B-C50C-407E-A947-70E740481C1C}">
+                <a14:useLocalDpi xmlns:a14="http://schemas.microsoft.com/office/drawing/2010/main" val="0"/>
+              </a:ext>
+            </a:extLst>
+          </a:blip>
+          <a:stretch>
+            <a:fillRect/>
+          </a:stretch>
+        </p:blipFill>
+        <p:spPr>
+          <a:xfrm>
+            <a:off x="2776849" y="2032040"/>
+            <a:ext cx="6638300" cy="4425533"/>
+          </a:xfrm>
+        </p:spPr>
+      </p:pic>
+      <p:pic>
+        <p:nvPicPr>
+          <p:cNvPr id="7" name="Picture 6">
+            <a:extLst>
+              <a:ext uri="{FF2B5EF4-FFF2-40B4-BE49-F238E27FC236}">
+                <a16:creationId xmlns:a16="http://schemas.microsoft.com/office/drawing/2014/main" id="{CCC326B8-19C9-434D-A508-CC70423EC063}"/>
+              </a:ext>
+            </a:extLst>
+          </p:cNvPr>
+          <p:cNvPicPr>
+            <a:picLocks noChangeAspect="1"/>
+          </p:cNvPicPr>
+          <p:nvPr/>
+        </p:nvPicPr>
+        <p:blipFill>
+          <a:blip r:embed="rId3"/>
+          <a:stretch>
+            <a:fillRect/>
+          </a:stretch>
+        </p:blipFill>
+        <p:spPr>
+          <a:xfrm>
+            <a:off x="2155277" y="190500"/>
+            <a:ext cx="7881445" cy="1991102"/>
+          </a:xfrm>
+          <a:prstGeom prst="rect">
+            <a:avLst/>
+          </a:prstGeom>
+        </p:spPr>
+      </p:pic>
     </p:spTree>
     <p:extLst>
       <p:ext uri="{BB962C8B-B14F-4D97-AF65-F5344CB8AC3E}">
-        <p14:creationId xmlns:p14="http://schemas.microsoft.com/office/powerpoint/2010/main" val="3523656184"/>
+        <p14:creationId xmlns:p14="http://schemas.microsoft.com/office/powerpoint/2010/main" val="1342303891"/>
       </p:ext>
     </p:extLst>
   </p:cSld>

</xml_diff>

<commit_message>
adding bottom 20 incarceration
</commit_message>
<xml_diff>
--- a/Presentation.pptx
+++ b/Presentation.pptx
@@ -5,7 +5,7 @@
     <p:sldMasterId id="2147483648" r:id="rId1"/>
   </p:sldMasterIdLst>
   <p:notesMasterIdLst>
-    <p:notesMasterId r:id="rId29"/>
+    <p:notesMasterId r:id="rId30"/>
   </p:notesMasterIdLst>
   <p:sldIdLst>
     <p:sldId id="256" r:id="rId2"/>
@@ -21,20 +21,21 @@
     <p:sldId id="265" r:id="rId12"/>
     <p:sldId id="266" r:id="rId13"/>
     <p:sldId id="279" r:id="rId14"/>
-    <p:sldId id="269" r:id="rId15"/>
-    <p:sldId id="274" r:id="rId16"/>
-    <p:sldId id="282" r:id="rId17"/>
-    <p:sldId id="283" r:id="rId18"/>
-    <p:sldId id="284" r:id="rId19"/>
-    <p:sldId id="268" r:id="rId20"/>
-    <p:sldId id="270" r:id="rId21"/>
-    <p:sldId id="271" r:id="rId22"/>
-    <p:sldId id="272" r:id="rId23"/>
-    <p:sldId id="273" r:id="rId24"/>
-    <p:sldId id="285" r:id="rId25"/>
-    <p:sldId id="287" r:id="rId26"/>
-    <p:sldId id="288" r:id="rId27"/>
-    <p:sldId id="262" r:id="rId28"/>
+    <p:sldId id="289" r:id="rId15"/>
+    <p:sldId id="269" r:id="rId16"/>
+    <p:sldId id="274" r:id="rId17"/>
+    <p:sldId id="282" r:id="rId18"/>
+    <p:sldId id="283" r:id="rId19"/>
+    <p:sldId id="284" r:id="rId20"/>
+    <p:sldId id="268" r:id="rId21"/>
+    <p:sldId id="270" r:id="rId22"/>
+    <p:sldId id="271" r:id="rId23"/>
+    <p:sldId id="272" r:id="rId24"/>
+    <p:sldId id="273" r:id="rId25"/>
+    <p:sldId id="285" r:id="rId26"/>
+    <p:sldId id="287" r:id="rId27"/>
+    <p:sldId id="288" r:id="rId28"/>
+    <p:sldId id="262" r:id="rId29"/>
   </p:sldIdLst>
   <p:sldSz cx="12192000" cy="6858000"/>
   <p:notesSz cx="6858000" cy="9144000"/>
@@ -144,7 +145,7 @@
 <file path=ppt/revisionInfo.xml><?xml version="1.0" encoding="utf-8"?>
 <p1510:revInfo xmlns:a="http://schemas.openxmlformats.org/drawingml/2006/main" xmlns:r="http://schemas.openxmlformats.org/officeDocument/2006/relationships" xmlns:p1510="http://schemas.microsoft.com/office/powerpoint/2015/10/main">
   <p1510:revLst>
-    <p1510:client id="{2039BAF4-23A1-4312-9CE0-DBE1F5B3E171}" v="76" dt="2021-02-11T20:54:31.147"/>
+    <p1510:client id="{2039BAF4-23A1-4312-9CE0-DBE1F5B3E171}" v="79" dt="2021-02-11T22:49:18.315"/>
   </p1510:revLst>
 </p1510:revInfo>
 </file>
@@ -397,7 +398,7 @@
   <pc:docChgLst>
     <pc:chgData name="pamela hinostroza" userId="c80913c5e854edc0" providerId="LiveId" clId="{2039BAF4-23A1-4312-9CE0-DBE1F5B3E171}"/>
     <pc:docChg chg="undo custSel addSld delSld modSld sldOrd">
-      <pc:chgData name="pamela hinostroza" userId="c80913c5e854edc0" providerId="LiveId" clId="{2039BAF4-23A1-4312-9CE0-DBE1F5B3E171}" dt="2021-02-11T21:29:54.398" v="6066" actId="20577"/>
+      <pc:chgData name="pamela hinostroza" userId="c80913c5e854edc0" providerId="LiveId" clId="{2039BAF4-23A1-4312-9CE0-DBE1F5B3E171}" dt="2021-02-11T22:55:23.568" v="6218" actId="20577"/>
       <pc:docMkLst>
         <pc:docMk/>
       </pc:docMkLst>
@@ -1181,7 +1182,7 @@
         </pc:picChg>
       </pc:sldChg>
       <pc:sldChg chg="addSp delSp modSp mod ord modNotesTx">
-        <pc:chgData name="pamela hinostroza" userId="c80913c5e854edc0" providerId="LiveId" clId="{2039BAF4-23A1-4312-9CE0-DBE1F5B3E171}" dt="2021-02-11T20:26:39.725" v="3893" actId="1076"/>
+        <pc:chgData name="pamela hinostroza" userId="c80913c5e854edc0" providerId="LiveId" clId="{2039BAF4-23A1-4312-9CE0-DBE1F5B3E171}" dt="2021-02-11T22:55:23.568" v="6218" actId="20577"/>
         <pc:sldMkLst>
           <pc:docMk/>
           <pc:sldMk cId="1342303891" sldId="269"/>
@@ -1203,7 +1204,7 @@
           </ac:picMkLst>
         </pc:picChg>
         <pc:picChg chg="add mod">
-          <ac:chgData name="pamela hinostroza" userId="c80913c5e854edc0" providerId="LiveId" clId="{2039BAF4-23A1-4312-9CE0-DBE1F5B3E171}" dt="2021-02-11T20:26:39.725" v="3893" actId="1076"/>
+          <ac:chgData name="pamela hinostroza" userId="c80913c5e854edc0" providerId="LiveId" clId="{2039BAF4-23A1-4312-9CE0-DBE1F5B3E171}" dt="2021-02-11T22:48:00.577" v="6070" actId="962"/>
           <ac:picMkLst>
             <pc:docMk/>
             <pc:sldMk cId="1342303891" sldId="269"/>
@@ -2358,6 +2359,77 @@
             <ac:spMk id="3" creationId="{94014E74-24FC-4CAE-9196-2DCDFBC343C6}"/>
           </ac:spMkLst>
         </pc:spChg>
+      </pc:sldChg>
+      <pc:sldChg chg="addSp delSp modSp new mod modNotesTx">
+        <pc:chgData name="pamela hinostroza" userId="c80913c5e854edc0" providerId="LiveId" clId="{2039BAF4-23A1-4312-9CE0-DBE1F5B3E171}" dt="2021-02-11T22:55:16.013" v="6214" actId="400"/>
+        <pc:sldMkLst>
+          <pc:docMk/>
+          <pc:sldMk cId="3465735675" sldId="289"/>
+        </pc:sldMkLst>
+        <pc:spChg chg="del">
+          <ac:chgData name="pamela hinostroza" userId="c80913c5e854edc0" providerId="LiveId" clId="{2039BAF4-23A1-4312-9CE0-DBE1F5B3E171}" dt="2021-02-11T22:48:08.600" v="6071" actId="478"/>
+          <ac:spMkLst>
+            <pc:docMk/>
+            <pc:sldMk cId="3465735675" sldId="289"/>
+            <ac:spMk id="2" creationId="{32FE059D-76C6-4830-AE09-C7E74E4FBD44}"/>
+          </ac:spMkLst>
+        </pc:spChg>
+        <pc:spChg chg="del">
+          <ac:chgData name="pamela hinostroza" userId="c80913c5e854edc0" providerId="LiveId" clId="{2039BAF4-23A1-4312-9CE0-DBE1F5B3E171}" dt="2021-02-11T22:47:58.489" v="6068" actId="931"/>
+          <ac:spMkLst>
+            <pc:docMk/>
+            <pc:sldMk cId="3465735675" sldId="289"/>
+            <ac:spMk id="3" creationId="{55C7DFE4-7B71-4A6F-B347-1F3352114FEB}"/>
+          </ac:spMkLst>
+        </pc:spChg>
+        <pc:spChg chg="add del mod">
+          <ac:chgData name="pamela hinostroza" userId="c80913c5e854edc0" providerId="LiveId" clId="{2039BAF4-23A1-4312-9CE0-DBE1F5B3E171}" dt="2021-02-11T22:48:37.889" v="6075" actId="931"/>
+          <ac:spMkLst>
+            <pc:docMk/>
+            <pc:sldMk cId="3465735675" sldId="289"/>
+            <ac:spMk id="7" creationId="{A24644C6-F0AC-4FAA-8B70-71C53A2864C9}"/>
+          </ac:spMkLst>
+        </pc:spChg>
+        <pc:spChg chg="add del mod">
+          <ac:chgData name="pamela hinostroza" userId="c80913c5e854edc0" providerId="LiveId" clId="{2039BAF4-23A1-4312-9CE0-DBE1F5B3E171}" dt="2021-02-11T22:49:11.005" v="6079" actId="478"/>
+          <ac:spMkLst>
+            <pc:docMk/>
+            <pc:sldMk cId="3465735675" sldId="289"/>
+            <ac:spMk id="11" creationId="{5784ADE4-14AB-4EAF-90D0-52734039E861}"/>
+          </ac:spMkLst>
+        </pc:spChg>
+        <pc:picChg chg="add del mod">
+          <ac:chgData name="pamela hinostroza" userId="c80913c5e854edc0" providerId="LiveId" clId="{2039BAF4-23A1-4312-9CE0-DBE1F5B3E171}" dt="2021-02-11T22:48:24.985" v="6074" actId="478"/>
+          <ac:picMkLst>
+            <pc:docMk/>
+            <pc:sldMk cId="3465735675" sldId="289"/>
+            <ac:picMk id="5" creationId="{659C53FC-9B45-47DA-B885-0311F5ED8D39}"/>
+          </ac:picMkLst>
+        </pc:picChg>
+        <pc:picChg chg="add del mod">
+          <ac:chgData name="pamela hinostroza" userId="c80913c5e854edc0" providerId="LiveId" clId="{2039BAF4-23A1-4312-9CE0-DBE1F5B3E171}" dt="2021-02-11T22:49:07.371" v="6078" actId="478"/>
+          <ac:picMkLst>
+            <pc:docMk/>
+            <pc:sldMk cId="3465735675" sldId="289"/>
+            <ac:picMk id="9" creationId="{7F0106FC-1451-4A6F-BF74-75EF9F5E446F}"/>
+          </ac:picMkLst>
+        </pc:picChg>
+        <pc:picChg chg="add del mod">
+          <ac:chgData name="pamela hinostroza" userId="c80913c5e854edc0" providerId="LiveId" clId="{2039BAF4-23A1-4312-9CE0-DBE1F5B3E171}" dt="2021-02-11T22:49:43.712" v="6085" actId="478"/>
+          <ac:picMkLst>
+            <pc:docMk/>
+            <pc:sldMk cId="3465735675" sldId="289"/>
+            <ac:picMk id="13" creationId="{56984F7F-7234-4BAA-9767-AF3DA3863F0A}"/>
+          </ac:picMkLst>
+        </pc:picChg>
+        <pc:picChg chg="add mod">
+          <ac:chgData name="pamela hinostroza" userId="c80913c5e854edc0" providerId="LiveId" clId="{2039BAF4-23A1-4312-9CE0-DBE1F5B3E171}" dt="2021-02-11T22:54:11.288" v="6091" actId="1076"/>
+          <ac:picMkLst>
+            <pc:docMk/>
+            <pc:sldMk cId="3465735675" sldId="289"/>
+            <ac:picMk id="15" creationId="{F5C82858-0F3D-416C-B953-21EB356240C2}"/>
+          </ac:picMkLst>
+        </pc:picChg>
       </pc:sldChg>
     </pc:docChg>
   </pc:docChgLst>
@@ -3150,20 +3222,31 @@
           <a:p>
             <a:r>
               <a:rPr lang="en-US" dirty="0"/>
-              <a:t>Most common denominator: tropical climate countries</a:t>
+              <a:t>Most common denominator: African and middle eastern countries</a:t>
             </a:r>
           </a:p>
           <a:p>
             <a:r>
               <a:rPr lang="en-US" dirty="0"/>
-              <a:t>Only two superpower country: USA, Russia</a:t>
+              <a:t>Only superpower country: Japan</a:t>
             </a:r>
           </a:p>
           <a:p>
             <a:r>
               <a:rPr lang="en-US" dirty="0"/>
-              <a:t>USA is highest</a:t>
-            </a:r>
+              <a:t>Lowest: </a:t>
+            </a:r>
+            <a:r>
+              <a:rPr lang="en-US" strike="sngStrike" dirty="0"/>
+              <a:t>San Marino</a:t>
+            </a:r>
+            <a:r>
+              <a:rPr lang="en-US" dirty="0"/>
+              <a:t>, Central African Republic</a:t>
+            </a:r>
+          </a:p>
+          <a:p>
+            <a:endParaRPr lang="en-US" dirty="0"/>
           </a:p>
         </p:txBody>
       </p:sp>
@@ -3193,7 +3276,7 @@
     </p:spTree>
     <p:extLst>
       <p:ext uri="{BB962C8B-B14F-4D97-AF65-F5344CB8AC3E}">
-        <p14:creationId xmlns:p14="http://schemas.microsoft.com/office/powerpoint/2010/main" val="4242577640"/>
+        <p14:creationId xmlns:p14="http://schemas.microsoft.com/office/powerpoint/2010/main" val="2733784274"/>
       </p:ext>
     </p:extLst>
   </p:cSld>
@@ -3249,13 +3332,19 @@
           <a:p>
             <a:r>
               <a:rPr lang="en-US" dirty="0"/>
-              <a:t>Most countries keep their persons held in prisons rate minimal</a:t>
+              <a:t>Most common denominator: tropical climate countries</a:t>
             </a:r>
           </a:p>
           <a:p>
             <a:r>
               <a:rPr lang="en-US" dirty="0"/>
-              <a:t>Gap between USA and the rest of the world</a:t>
+              <a:t>Only two superpower countries: USA, Russia</a:t>
+            </a:r>
+          </a:p>
+          <a:p>
+            <a:r>
+              <a:rPr lang="en-US" dirty="0"/>
+              <a:t>USA is highest</a:t>
             </a:r>
           </a:p>
         </p:txBody>
@@ -3286,7 +3375,7 @@
     </p:spTree>
     <p:extLst>
       <p:ext uri="{BB962C8B-B14F-4D97-AF65-F5344CB8AC3E}">
-        <p14:creationId xmlns:p14="http://schemas.microsoft.com/office/powerpoint/2010/main" val="3556509950"/>
+        <p14:creationId xmlns:p14="http://schemas.microsoft.com/office/powerpoint/2010/main" val="4242577640"/>
       </p:ext>
     </p:extLst>
   </p:cSld>
@@ -3340,7 +3429,16 @@
           <a:bodyPr/>
           <a:lstStyle/>
           <a:p>
-            <a:endParaRPr lang="en-US" dirty="0"/>
+            <a:r>
+              <a:rPr lang="en-US" dirty="0"/>
+              <a:t>Most countries keep their persons held in prisons rate minimal</a:t>
+            </a:r>
+          </a:p>
+          <a:p>
+            <a:r>
+              <a:rPr lang="en-US" dirty="0"/>
+              <a:t>Gap between USA and the rest of the world</a:t>
+            </a:r>
           </a:p>
         </p:txBody>
       </p:sp>
@@ -3370,7 +3468,7 @@
     </p:spTree>
     <p:extLst>
       <p:ext uri="{BB962C8B-B14F-4D97-AF65-F5344CB8AC3E}">
-        <p14:creationId xmlns:p14="http://schemas.microsoft.com/office/powerpoint/2010/main" val="3564045604"/>
+        <p14:creationId xmlns:p14="http://schemas.microsoft.com/office/powerpoint/2010/main" val="3556509950"/>
       </p:ext>
     </p:extLst>
   </p:cSld>
@@ -3424,46 +3522,6 @@
           <a:bodyPr/>
           <a:lstStyle/>
           <a:p>
-            <a:r>
-              <a:rPr lang="en-US" dirty="0"/>
-              <a:t>2012 and beyond only</a:t>
-            </a:r>
-          </a:p>
-          <a:p>
-            <a:r>
-              <a:rPr lang="en-US" strike="sngStrike" dirty="0"/>
-              <a:t>Columns that weren’t needed</a:t>
-            </a:r>
-          </a:p>
-          <a:p>
-            <a:r>
-              <a:rPr lang="en-US" strike="sngStrike" dirty="0" err="1"/>
-              <a:t>NaN</a:t>
-            </a:r>
-            <a:r>
-              <a:rPr lang="en-US" strike="sngStrike" dirty="0"/>
-              <a:t> values</a:t>
-            </a:r>
-          </a:p>
-          <a:p>
-            <a:r>
-              <a:rPr lang="en-US" dirty="0"/>
-              <a:t>Average over the years</a:t>
-            </a:r>
-          </a:p>
-          <a:p>
-            <a:r>
-              <a:rPr lang="en-US" dirty="0"/>
-              <a:t>Set up data frame for graphing</a:t>
-            </a:r>
-          </a:p>
-          <a:p>
-            <a:r>
-              <a:rPr lang="en-US" dirty="0"/>
-              <a:t>Played with bins and y ticks</a:t>
-            </a:r>
-          </a:p>
-          <a:p>
             <a:endParaRPr lang="en-US" dirty="0"/>
           </a:p>
         </p:txBody>
@@ -3494,7 +3552,7 @@
     </p:spTree>
     <p:extLst>
       <p:ext uri="{BB962C8B-B14F-4D97-AF65-F5344CB8AC3E}">
-        <p14:creationId xmlns:p14="http://schemas.microsoft.com/office/powerpoint/2010/main" val="40994161"/>
+        <p14:creationId xmlns:p14="http://schemas.microsoft.com/office/powerpoint/2010/main" val="3564045604"/>
       </p:ext>
     </p:extLst>
   </p:cSld>
@@ -3550,14 +3608,45 @@
           <a:p>
             <a:r>
               <a:rPr lang="en-US" dirty="0"/>
-              <a:t>Reorganized for top countries</a:t>
+              <a:t>2012 and beyond only</a:t>
+            </a:r>
+          </a:p>
+          <a:p>
+            <a:r>
+              <a:rPr lang="en-US" strike="sngStrike" dirty="0"/>
+              <a:t>Columns that weren’t needed</a:t>
+            </a:r>
+          </a:p>
+          <a:p>
+            <a:r>
+              <a:rPr lang="en-US" strike="sngStrike" dirty="0" err="1"/>
+              <a:t>NaN</a:t>
+            </a:r>
+            <a:r>
+              <a:rPr lang="en-US" strike="sngStrike" dirty="0"/>
+              <a:t> values</a:t>
             </a:r>
           </a:p>
           <a:p>
             <a:r>
               <a:rPr lang="en-US" dirty="0"/>
-              <a:t>Cropped first 20</a:t>
-            </a:r>
+              <a:t>Average over the years</a:t>
+            </a:r>
+          </a:p>
+          <a:p>
+            <a:r>
+              <a:rPr lang="en-US" dirty="0"/>
+              <a:t>Set up data frame for graphing</a:t>
+            </a:r>
+          </a:p>
+          <a:p>
+            <a:r>
+              <a:rPr lang="en-US" dirty="0"/>
+              <a:t>Played with bins and y ticks</a:t>
+            </a:r>
+          </a:p>
+          <a:p>
+            <a:endParaRPr lang="en-US" dirty="0"/>
           </a:p>
         </p:txBody>
       </p:sp>
@@ -3587,7 +3676,7 @@
     </p:spTree>
     <p:extLst>
       <p:ext uri="{BB962C8B-B14F-4D97-AF65-F5344CB8AC3E}">
-        <p14:creationId xmlns:p14="http://schemas.microsoft.com/office/powerpoint/2010/main" val="251955110"/>
+        <p14:creationId xmlns:p14="http://schemas.microsoft.com/office/powerpoint/2010/main" val="40994161"/>
       </p:ext>
     </p:extLst>
   </p:cSld>
@@ -3643,7 +3732,13 @@
           <a:p>
             <a:r>
               <a:rPr lang="en-US" dirty="0"/>
-              <a:t>Most countries’ incarceration rates are not affected by graduation rates</a:t>
+              <a:t>Reorganized for top countries</a:t>
+            </a:r>
+          </a:p>
+          <a:p>
+            <a:r>
+              <a:rPr lang="en-US" dirty="0"/>
+              <a:t>Cropped first 20</a:t>
             </a:r>
           </a:p>
         </p:txBody>
@@ -3674,7 +3769,7 @@
     </p:spTree>
     <p:extLst>
       <p:ext uri="{BB962C8B-B14F-4D97-AF65-F5344CB8AC3E}">
-        <p14:creationId xmlns:p14="http://schemas.microsoft.com/office/powerpoint/2010/main" val="3681647140"/>
+        <p14:creationId xmlns:p14="http://schemas.microsoft.com/office/powerpoint/2010/main" val="251955110"/>
       </p:ext>
     </p:extLst>
   </p:cSld>
@@ -3728,26 +3823,9 @@
           <a:bodyPr/>
           <a:lstStyle/>
           <a:p>
-            <a:pPr marL="0" marR="0" lvl="0" indent="0" algn="l" defTabSz="914400" rtl="0" eaLnBrk="1" fontAlgn="auto" latinLnBrk="0" hangingPunct="1">
-              <a:lnSpc>
-                <a:spcPct val="100000"/>
-              </a:lnSpc>
-              <a:spcBef>
-                <a:spcPts val="0"/>
-              </a:spcBef>
-              <a:spcAft>
-                <a:spcPts val="0"/>
-              </a:spcAft>
-              <a:buClrTx/>
-              <a:buSzTx/>
-              <a:buFontTx/>
-              <a:buNone/>
-              <a:tabLst/>
-              <a:defRPr/>
-            </a:pPr>
             <a:r>
               <a:rPr lang="en-US" dirty="0"/>
-              <a:t>Most countries’ incarceration rates are not affected by graduations at a bachelors level</a:t>
+              <a:t>Most countries’ incarceration rates are not affected by graduation rates</a:t>
             </a:r>
           </a:p>
         </p:txBody>
@@ -3778,7 +3856,7 @@
     </p:spTree>
     <p:extLst>
       <p:ext uri="{BB962C8B-B14F-4D97-AF65-F5344CB8AC3E}">
-        <p14:creationId xmlns:p14="http://schemas.microsoft.com/office/powerpoint/2010/main" val="321182905"/>
+        <p14:creationId xmlns:p14="http://schemas.microsoft.com/office/powerpoint/2010/main" val="3681647140"/>
       </p:ext>
     </p:extLst>
   </p:cSld>
@@ -3851,7 +3929,7 @@
             </a:pPr>
             <a:r>
               <a:rPr lang="en-US" dirty="0"/>
-              <a:t>Most countries’ incarceration rates are not affected by graduations at a masters level</a:t>
+              <a:t>Most countries’ incarceration rates are not affected by graduations at a bachelors level</a:t>
             </a:r>
           </a:p>
         </p:txBody>
@@ -3882,7 +3960,7 @@
     </p:spTree>
     <p:extLst>
       <p:ext uri="{BB962C8B-B14F-4D97-AF65-F5344CB8AC3E}">
-        <p14:creationId xmlns:p14="http://schemas.microsoft.com/office/powerpoint/2010/main" val="1152692555"/>
+        <p14:creationId xmlns:p14="http://schemas.microsoft.com/office/powerpoint/2010/main" val="321182905"/>
       </p:ext>
     </p:extLst>
   </p:cSld>
@@ -4055,11 +4133,8 @@
             </a:pPr>
             <a:r>
               <a:rPr lang="en-US" dirty="0"/>
-              <a:t>Most countries’ incarceration rates are not affected by graduations at a doctoral level</a:t>
-            </a:r>
-          </a:p>
-          <a:p>
-            <a:endParaRPr lang="en-US" dirty="0"/>
+              <a:t>Most countries’ incarceration rates are not affected by graduations at a masters level</a:t>
+            </a:r>
           </a:p>
         </p:txBody>
       </p:sp>
@@ -4089,7 +4164,7 @@
     </p:spTree>
     <p:extLst>
       <p:ext uri="{BB962C8B-B14F-4D97-AF65-F5344CB8AC3E}">
-        <p14:creationId xmlns:p14="http://schemas.microsoft.com/office/powerpoint/2010/main" val="1718986319"/>
+        <p14:creationId xmlns:p14="http://schemas.microsoft.com/office/powerpoint/2010/main" val="1152692555"/>
       </p:ext>
     </p:extLst>
   </p:cSld>
@@ -4143,10 +4218,30 @@
           <a:bodyPr/>
           <a:lstStyle/>
           <a:p>
+            <a:pPr marL="0" marR="0" lvl="0" indent="0" algn="l" defTabSz="914400" rtl="0" eaLnBrk="1" fontAlgn="auto" latinLnBrk="0" hangingPunct="1">
+              <a:lnSpc>
+                <a:spcPct val="100000"/>
+              </a:lnSpc>
+              <a:spcBef>
+                <a:spcPts val="0"/>
+              </a:spcBef>
+              <a:spcAft>
+                <a:spcPts val="0"/>
+              </a:spcAft>
+              <a:buClrTx/>
+              <a:buSzTx/>
+              <a:buFontTx/>
+              <a:buNone/>
+              <a:tabLst/>
+              <a:defRPr/>
+            </a:pPr>
             <a:r>
               <a:rPr lang="en-US" dirty="0"/>
-              <a:t>Countries’ incarceration rates are mostly not correlated by education expenditure, unless they’re higher than average</a:t>
-            </a:r>
+              <a:t>Most countries’ incarceration rates are not affected by graduations at a doctoral level</a:t>
+            </a:r>
+          </a:p>
+          <a:p>
+            <a:endParaRPr lang="en-US" dirty="0"/>
           </a:p>
         </p:txBody>
       </p:sp>
@@ -4176,7 +4271,7 @@
     </p:spTree>
     <p:extLst>
       <p:ext uri="{BB962C8B-B14F-4D97-AF65-F5344CB8AC3E}">
-        <p14:creationId xmlns:p14="http://schemas.microsoft.com/office/powerpoint/2010/main" val="779939236"/>
+        <p14:creationId xmlns:p14="http://schemas.microsoft.com/office/powerpoint/2010/main" val="1718986319"/>
       </p:ext>
     </p:extLst>
   </p:cSld>
@@ -4232,19 +4327,7 @@
           <a:p>
             <a:r>
               <a:rPr lang="en-US" dirty="0"/>
-              <a:t>Concatenated latest versions of each data frame</a:t>
-            </a:r>
-          </a:p>
-          <a:p>
-            <a:r>
-              <a:rPr lang="en-US" dirty="0"/>
-              <a:t>Tested data frame</a:t>
-            </a:r>
-          </a:p>
-          <a:p>
-            <a:r>
-              <a:rPr lang="en-US" dirty="0"/>
-              <a:t>Graphed each in comparison to incarceration rate</a:t>
+              <a:t>Countries’ incarceration rates are mostly not correlated by education expenditure, unless they’re higher than average</a:t>
             </a:r>
           </a:p>
         </p:txBody>
@@ -4275,7 +4358,7 @@
     </p:spTree>
     <p:extLst>
       <p:ext uri="{BB962C8B-B14F-4D97-AF65-F5344CB8AC3E}">
-        <p14:creationId xmlns:p14="http://schemas.microsoft.com/office/powerpoint/2010/main" val="1701816551"/>
+        <p14:creationId xmlns:p14="http://schemas.microsoft.com/office/powerpoint/2010/main" val="779939236"/>
       </p:ext>
     </p:extLst>
   </p:cSld>
@@ -4329,7 +4412,22 @@
           <a:bodyPr/>
           <a:lstStyle/>
           <a:p>
-            <a:endParaRPr lang="en-US" dirty="0"/>
+            <a:r>
+              <a:rPr lang="en-US" dirty="0"/>
+              <a:t>Concatenated latest versions of each data frame</a:t>
+            </a:r>
+          </a:p>
+          <a:p>
+            <a:r>
+              <a:rPr lang="en-US" dirty="0"/>
+              <a:t>Tested data frame</a:t>
+            </a:r>
+          </a:p>
+          <a:p>
+            <a:r>
+              <a:rPr lang="en-US" dirty="0"/>
+              <a:t>Graphed each in comparison to incarceration rate</a:t>
+            </a:r>
           </a:p>
         </p:txBody>
       </p:sp>
@@ -4351,6 +4449,90 @@
             <a:fld id="{B9122BD1-4087-48A7-BD72-C1CFA9C767DC}" type="slidenum">
               <a:rPr lang="en-US" smtClean="0"/>
               <a:t>25</a:t>
+            </a:fld>
+            <a:endParaRPr lang="en-US"/>
+          </a:p>
+        </p:txBody>
+      </p:sp>
+    </p:spTree>
+    <p:extLst>
+      <p:ext uri="{BB962C8B-B14F-4D97-AF65-F5344CB8AC3E}">
+        <p14:creationId xmlns:p14="http://schemas.microsoft.com/office/powerpoint/2010/main" val="1701816551"/>
+      </p:ext>
+    </p:extLst>
+  </p:cSld>
+  <p:clrMapOvr>
+    <a:masterClrMapping/>
+  </p:clrMapOvr>
+</p:notes>
+</file>
+
+<file path=ppt/notesSlides/notesSlide24.xml><?xml version="1.0" encoding="utf-8"?>
+<p:notes xmlns:a="http://schemas.openxmlformats.org/drawingml/2006/main" xmlns:r="http://schemas.openxmlformats.org/officeDocument/2006/relationships" xmlns:p="http://schemas.openxmlformats.org/presentationml/2006/main">
+  <p:cSld>
+    <p:spTree>
+      <p:nvGrpSpPr>
+        <p:cNvPr id="1" name=""/>
+        <p:cNvGrpSpPr/>
+        <p:nvPr/>
+      </p:nvGrpSpPr>
+      <p:grpSpPr>
+        <a:xfrm>
+          <a:off x="0" y="0"/>
+          <a:ext cx="0" cy="0"/>
+          <a:chOff x="0" y="0"/>
+          <a:chExt cx="0" cy="0"/>
+        </a:xfrm>
+      </p:grpSpPr>
+      <p:sp>
+        <p:nvSpPr>
+          <p:cNvPr id="2" name="Slide Image Placeholder 1"/>
+          <p:cNvSpPr>
+            <a:spLocks noGrp="1" noRot="1" noChangeAspect="1"/>
+          </p:cNvSpPr>
+          <p:nvPr>
+            <p:ph type="sldImg"/>
+          </p:nvPr>
+        </p:nvSpPr>
+        <p:spPr/>
+      </p:sp>
+      <p:sp>
+        <p:nvSpPr>
+          <p:cNvPr id="3" name="Notes Placeholder 2"/>
+          <p:cNvSpPr>
+            <a:spLocks noGrp="1"/>
+          </p:cNvSpPr>
+          <p:nvPr>
+            <p:ph type="body" idx="1"/>
+          </p:nvPr>
+        </p:nvSpPr>
+        <p:spPr/>
+        <p:txBody>
+          <a:bodyPr/>
+          <a:lstStyle/>
+          <a:p>
+            <a:endParaRPr lang="en-US" dirty="0"/>
+          </a:p>
+        </p:txBody>
+      </p:sp>
+      <p:sp>
+        <p:nvSpPr>
+          <p:cNvPr id="4" name="Slide Number Placeholder 3"/>
+          <p:cNvSpPr>
+            <a:spLocks noGrp="1"/>
+          </p:cNvSpPr>
+          <p:nvPr>
+            <p:ph type="sldNum" sz="quarter" idx="5"/>
+          </p:nvPr>
+        </p:nvSpPr>
+        <p:spPr/>
+        <p:txBody>
+          <a:bodyPr/>
+          <a:lstStyle/>
+          <a:p>
+            <a:fld id="{B9122BD1-4087-48A7-BD72-C1CFA9C767DC}" type="slidenum">
+              <a:rPr lang="en-US" smtClean="0"/>
+              <a:t>26</a:t>
             </a:fld>
             <a:endParaRPr lang="en-US"/>
           </a:p>
@@ -8764,6 +8946,66 @@
       </p:grpSpPr>
       <p:pic>
         <p:nvPicPr>
+          <p:cNvPr id="15" name="Picture 14">
+            <a:extLst>
+              <a:ext uri="{FF2B5EF4-FFF2-40B4-BE49-F238E27FC236}">
+                <a16:creationId xmlns:a16="http://schemas.microsoft.com/office/drawing/2014/main" id="{F5C82858-0F3D-416C-B953-21EB356240C2}"/>
+              </a:ext>
+            </a:extLst>
+          </p:cNvPr>
+          <p:cNvPicPr>
+            <a:picLocks noChangeAspect="1"/>
+          </p:cNvPicPr>
+          <p:nvPr/>
+        </p:nvPicPr>
+        <p:blipFill>
+          <a:blip r:embed="rId3"/>
+          <a:stretch>
+            <a:fillRect/>
+          </a:stretch>
+        </p:blipFill>
+        <p:spPr>
+          <a:xfrm>
+            <a:off x="2799588" y="204838"/>
+            <a:ext cx="6592824" cy="6448324"/>
+          </a:xfrm>
+          <a:prstGeom prst="rect">
+            <a:avLst/>
+          </a:prstGeom>
+        </p:spPr>
+      </p:pic>
+    </p:spTree>
+    <p:extLst>
+      <p:ext uri="{BB962C8B-B14F-4D97-AF65-F5344CB8AC3E}">
+        <p14:creationId xmlns:p14="http://schemas.microsoft.com/office/powerpoint/2010/main" val="3465735675"/>
+      </p:ext>
+    </p:extLst>
+  </p:cSld>
+  <p:clrMapOvr>
+    <a:masterClrMapping/>
+  </p:clrMapOvr>
+</p:sld>
+</file>
+
+<file path=ppt/slides/slide15.xml><?xml version="1.0" encoding="utf-8"?>
+<p:sld xmlns:a="http://schemas.openxmlformats.org/drawingml/2006/main" xmlns:r="http://schemas.openxmlformats.org/officeDocument/2006/relationships" xmlns:p="http://schemas.openxmlformats.org/presentationml/2006/main">
+  <p:cSld>
+    <p:spTree>
+      <p:nvGrpSpPr>
+        <p:cNvPr id="1" name=""/>
+        <p:cNvGrpSpPr/>
+        <p:nvPr/>
+      </p:nvGrpSpPr>
+      <p:grpSpPr>
+        <a:xfrm>
+          <a:off x="0" y="0"/>
+          <a:ext cx="0" cy="0"/>
+          <a:chOff x="0" y="0"/>
+          <a:chExt cx="0" cy="0"/>
+        </a:xfrm>
+      </p:grpSpPr>
+      <p:pic>
+        <p:nvPicPr>
           <p:cNvPr id="6" name="Picture 5">
             <a:extLst>
               <a:ext uri="{FF2B5EF4-FFF2-40B4-BE49-F238E27FC236}">
@@ -8805,7 +9047,7 @@
 </p:sld>
 </file>
 
-<file path=ppt/slides/slide15.xml><?xml version="1.0" encoding="utf-8"?>
+<file path=ppt/slides/slide16.xml><?xml version="1.0" encoding="utf-8"?>
 <p:sld xmlns:a="http://schemas.openxmlformats.org/drawingml/2006/main" xmlns:r="http://schemas.openxmlformats.org/officeDocument/2006/relationships" xmlns:p="http://schemas.openxmlformats.org/presentationml/2006/main">
   <p:cSld>
     <p:spTree>
@@ -8870,7 +9112,7 @@
 </p:sld>
 </file>
 
-<file path=ppt/slides/slide16.xml><?xml version="1.0" encoding="utf-8"?>
+<file path=ppt/slides/slide17.xml><?xml version="1.0" encoding="utf-8"?>
 <p:sld xmlns:a="http://schemas.openxmlformats.org/drawingml/2006/main" xmlns:r="http://schemas.openxmlformats.org/officeDocument/2006/relationships" xmlns:p="http://schemas.openxmlformats.org/presentationml/2006/main">
   <p:cSld>
     <p:spTree>
@@ -8965,7 +9207,7 @@
 </p:sld>
 </file>
 
-<file path=ppt/slides/slide17.xml><?xml version="1.0" encoding="utf-8"?>
+<file path=ppt/slides/slide18.xml><?xml version="1.0" encoding="utf-8"?>
 <p:sld xmlns:a="http://schemas.openxmlformats.org/drawingml/2006/main" xmlns:r="http://schemas.openxmlformats.org/officeDocument/2006/relationships" xmlns:p="http://schemas.openxmlformats.org/presentationml/2006/main">
   <p:cSld>
     <p:spTree>
@@ -9140,7 +9382,7 @@
 </p:sld>
 </file>
 
-<file path=ppt/slides/slide18.xml><?xml version="1.0" encoding="utf-8"?>
+<file path=ppt/slides/slide19.xml><?xml version="1.0" encoding="utf-8"?>
 <p:sld xmlns:a="http://schemas.openxmlformats.org/drawingml/2006/main" xmlns:r="http://schemas.openxmlformats.org/officeDocument/2006/relationships" xmlns:p="http://schemas.openxmlformats.org/presentationml/2006/main">
   <p:cSld>
     <p:spTree>
@@ -9284,71 +9526,6 @@
 </p:sld>
 </file>
 
-<file path=ppt/slides/slide19.xml><?xml version="1.0" encoding="utf-8"?>
-<p:sld xmlns:a="http://schemas.openxmlformats.org/drawingml/2006/main" xmlns:r="http://schemas.openxmlformats.org/officeDocument/2006/relationships" xmlns:p="http://schemas.openxmlformats.org/presentationml/2006/main">
-  <p:cSld>
-    <p:spTree>
-      <p:nvGrpSpPr>
-        <p:cNvPr id="1" name=""/>
-        <p:cNvGrpSpPr/>
-        <p:nvPr/>
-      </p:nvGrpSpPr>
-      <p:grpSpPr>
-        <a:xfrm>
-          <a:off x="0" y="0"/>
-          <a:ext cx="0" cy="0"/>
-          <a:chOff x="0" y="0"/>
-          <a:chExt cx="0" cy="0"/>
-        </a:xfrm>
-      </p:grpSpPr>
-      <p:pic>
-        <p:nvPicPr>
-          <p:cNvPr id="5" name="Content Placeholder 4" descr="Chart, scatter chart&#10;&#10;Description automatically generated">
-            <a:extLst>
-              <a:ext uri="{FF2B5EF4-FFF2-40B4-BE49-F238E27FC236}">
-                <a16:creationId xmlns:a16="http://schemas.microsoft.com/office/drawing/2014/main" id="{196754CC-62F3-459E-86D9-3F2E28FD1A7D}"/>
-              </a:ext>
-            </a:extLst>
-          </p:cNvPr>
-          <p:cNvPicPr>
-            <a:picLocks noGrp="1" noChangeAspect="1"/>
-          </p:cNvPicPr>
-          <p:nvPr>
-            <p:ph idx="1"/>
-          </p:nvPr>
-        </p:nvPicPr>
-        <p:blipFill>
-          <a:blip r:embed="rId3">
-            <a:extLst>
-              <a:ext uri="{28A0092B-C50C-407E-A947-70E740481C1C}">
-                <a14:useLocalDpi xmlns:a14="http://schemas.microsoft.com/office/drawing/2010/main" val="0"/>
-              </a:ext>
-            </a:extLst>
-          </a:blip>
-          <a:stretch>
-            <a:fillRect/>
-          </a:stretch>
-        </p:blipFill>
-        <p:spPr>
-          <a:xfrm>
-            <a:off x="1524000" y="381000"/>
-            <a:ext cx="9144000" cy="6096000"/>
-          </a:xfrm>
-        </p:spPr>
-      </p:pic>
-    </p:spTree>
-    <p:extLst>
-      <p:ext uri="{BB962C8B-B14F-4D97-AF65-F5344CB8AC3E}">
-        <p14:creationId xmlns:p14="http://schemas.microsoft.com/office/powerpoint/2010/main" val="3107796215"/>
-      </p:ext>
-    </p:extLst>
-  </p:cSld>
-  <p:clrMapOvr>
-    <a:masterClrMapping/>
-  </p:clrMapOvr>
-</p:sld>
-</file>
-
 <file path=ppt/slides/slide2.xml><?xml version="1.0" encoding="utf-8"?>
 <p:sld xmlns:a="http://schemas.openxmlformats.org/drawingml/2006/main" xmlns:r="http://schemas.openxmlformats.org/officeDocument/2006/relationships" xmlns:p="http://schemas.openxmlformats.org/presentationml/2006/main">
   <p:cSld>
@@ -9496,7 +9673,7 @@
           <p:cNvPr id="5" name="Content Placeholder 4" descr="Chart, scatter chart&#10;&#10;Description automatically generated">
             <a:extLst>
               <a:ext uri="{FF2B5EF4-FFF2-40B4-BE49-F238E27FC236}">
-                <a16:creationId xmlns:a16="http://schemas.microsoft.com/office/drawing/2014/main" id="{18230708-ECDE-4637-AB7D-E310A96DCE18}"/>
+                <a16:creationId xmlns:a16="http://schemas.microsoft.com/office/drawing/2014/main" id="{196754CC-62F3-459E-86D9-3F2E28FD1A7D}"/>
               </a:ext>
             </a:extLst>
           </p:cNvPr>
@@ -9522,14 +9699,14 @@
         <p:spPr>
           <a:xfrm>
             <a:off x="1524000" y="381000"/>
-            <a:ext cx="9144000" cy="6095999"/>
+            <a:ext cx="9144000" cy="6096000"/>
           </a:xfrm>
         </p:spPr>
       </p:pic>
     </p:spTree>
     <p:extLst>
       <p:ext uri="{BB962C8B-B14F-4D97-AF65-F5344CB8AC3E}">
-        <p14:creationId xmlns:p14="http://schemas.microsoft.com/office/powerpoint/2010/main" val="1318568891"/>
+        <p14:creationId xmlns:p14="http://schemas.microsoft.com/office/powerpoint/2010/main" val="3107796215"/>
       </p:ext>
     </p:extLst>
   </p:cSld>
@@ -9561,7 +9738,7 @@
           <p:cNvPr id="5" name="Content Placeholder 4" descr="Chart, scatter chart&#10;&#10;Description automatically generated">
             <a:extLst>
               <a:ext uri="{FF2B5EF4-FFF2-40B4-BE49-F238E27FC236}">
-                <a16:creationId xmlns:a16="http://schemas.microsoft.com/office/drawing/2014/main" id="{54BBCF21-37A4-4847-9DE0-8676685459D0}"/>
+                <a16:creationId xmlns:a16="http://schemas.microsoft.com/office/drawing/2014/main" id="{18230708-ECDE-4637-AB7D-E310A96DCE18}"/>
               </a:ext>
             </a:extLst>
           </p:cNvPr>
@@ -9594,7 +9771,7 @@
     </p:spTree>
     <p:extLst>
       <p:ext uri="{BB962C8B-B14F-4D97-AF65-F5344CB8AC3E}">
-        <p14:creationId xmlns:p14="http://schemas.microsoft.com/office/powerpoint/2010/main" val="2383399923"/>
+        <p14:creationId xmlns:p14="http://schemas.microsoft.com/office/powerpoint/2010/main" val="1318568891"/>
       </p:ext>
     </p:extLst>
   </p:cSld>
@@ -9626,7 +9803,7 @@
           <p:cNvPr id="5" name="Content Placeholder 4" descr="Chart, scatter chart&#10;&#10;Description automatically generated">
             <a:extLst>
               <a:ext uri="{FF2B5EF4-FFF2-40B4-BE49-F238E27FC236}">
-                <a16:creationId xmlns:a16="http://schemas.microsoft.com/office/drawing/2014/main" id="{6A27756A-83DA-43EB-B3F6-2903E84B18EC}"/>
+                <a16:creationId xmlns:a16="http://schemas.microsoft.com/office/drawing/2014/main" id="{54BBCF21-37A4-4847-9DE0-8676685459D0}"/>
               </a:ext>
             </a:extLst>
           </p:cNvPr>
@@ -9659,7 +9836,7 @@
     </p:spTree>
     <p:extLst>
       <p:ext uri="{BB962C8B-B14F-4D97-AF65-F5344CB8AC3E}">
-        <p14:creationId xmlns:p14="http://schemas.microsoft.com/office/powerpoint/2010/main" val="1380461838"/>
+        <p14:creationId xmlns:p14="http://schemas.microsoft.com/office/powerpoint/2010/main" val="2383399923"/>
       </p:ext>
     </p:extLst>
   </p:cSld>
@@ -9691,6 +9868,71 @@
           <p:cNvPr id="5" name="Content Placeholder 4" descr="Chart, scatter chart&#10;&#10;Description automatically generated">
             <a:extLst>
               <a:ext uri="{FF2B5EF4-FFF2-40B4-BE49-F238E27FC236}">
+                <a16:creationId xmlns:a16="http://schemas.microsoft.com/office/drawing/2014/main" id="{6A27756A-83DA-43EB-B3F6-2903E84B18EC}"/>
+              </a:ext>
+            </a:extLst>
+          </p:cNvPr>
+          <p:cNvPicPr>
+            <a:picLocks noGrp="1" noChangeAspect="1"/>
+          </p:cNvPicPr>
+          <p:nvPr>
+            <p:ph idx="1"/>
+          </p:nvPr>
+        </p:nvPicPr>
+        <p:blipFill>
+          <a:blip r:embed="rId3">
+            <a:extLst>
+              <a:ext uri="{28A0092B-C50C-407E-A947-70E740481C1C}">
+                <a14:useLocalDpi xmlns:a14="http://schemas.microsoft.com/office/drawing/2010/main" val="0"/>
+              </a:ext>
+            </a:extLst>
+          </a:blip>
+          <a:stretch>
+            <a:fillRect/>
+          </a:stretch>
+        </p:blipFill>
+        <p:spPr>
+          <a:xfrm>
+            <a:off x="1524000" y="381000"/>
+            <a:ext cx="9144000" cy="6095999"/>
+          </a:xfrm>
+        </p:spPr>
+      </p:pic>
+    </p:spTree>
+    <p:extLst>
+      <p:ext uri="{BB962C8B-B14F-4D97-AF65-F5344CB8AC3E}">
+        <p14:creationId xmlns:p14="http://schemas.microsoft.com/office/powerpoint/2010/main" val="1380461838"/>
+      </p:ext>
+    </p:extLst>
+  </p:cSld>
+  <p:clrMapOvr>
+    <a:masterClrMapping/>
+  </p:clrMapOvr>
+</p:sld>
+</file>
+
+<file path=ppt/slides/slide24.xml><?xml version="1.0" encoding="utf-8"?>
+<p:sld xmlns:a="http://schemas.openxmlformats.org/drawingml/2006/main" xmlns:r="http://schemas.openxmlformats.org/officeDocument/2006/relationships" xmlns:p="http://schemas.openxmlformats.org/presentationml/2006/main">
+  <p:cSld>
+    <p:spTree>
+      <p:nvGrpSpPr>
+        <p:cNvPr id="1" name=""/>
+        <p:cNvGrpSpPr/>
+        <p:nvPr/>
+      </p:nvGrpSpPr>
+      <p:grpSpPr>
+        <a:xfrm>
+          <a:off x="0" y="0"/>
+          <a:ext cx="0" cy="0"/>
+          <a:chOff x="0" y="0"/>
+          <a:chExt cx="0" cy="0"/>
+        </a:xfrm>
+      </p:grpSpPr>
+      <p:pic>
+        <p:nvPicPr>
+          <p:cNvPr id="5" name="Content Placeholder 4" descr="Chart, scatter chart&#10;&#10;Description automatically generated">
+            <a:extLst>
+              <a:ext uri="{FF2B5EF4-FFF2-40B4-BE49-F238E27FC236}">
                 <a16:creationId xmlns:a16="http://schemas.microsoft.com/office/drawing/2014/main" id="{16AFEACB-CE01-4046-B709-65EEF46D5E0C}"/>
               </a:ext>
             </a:extLst>
@@ -9734,7 +9976,7 @@
 </p:sld>
 </file>
 
-<file path=ppt/slides/slide24.xml><?xml version="1.0" encoding="utf-8"?>
+<file path=ppt/slides/slide25.xml><?xml version="1.0" encoding="utf-8"?>
 <p:sld xmlns:a="http://schemas.openxmlformats.org/drawingml/2006/main" xmlns:r="http://schemas.openxmlformats.org/officeDocument/2006/relationships" xmlns:p="http://schemas.openxmlformats.org/presentationml/2006/main">
   <p:cSld>
     <p:spTree>
@@ -9859,167 +10101,6 @@
 </p:sld>
 </file>
 
-<file path=ppt/slides/slide25.xml><?xml version="1.0" encoding="utf-8"?>
-<p:sld xmlns:a="http://schemas.openxmlformats.org/drawingml/2006/main" xmlns:r="http://schemas.openxmlformats.org/officeDocument/2006/relationships" xmlns:p="http://schemas.openxmlformats.org/presentationml/2006/main">
-  <p:cSld>
-    <p:spTree>
-      <p:nvGrpSpPr>
-        <p:cNvPr id="1" name=""/>
-        <p:cNvGrpSpPr/>
-        <p:nvPr/>
-      </p:nvGrpSpPr>
-      <p:grpSpPr>
-        <a:xfrm>
-          <a:off x="0" y="0"/>
-          <a:ext cx="0" cy="0"/>
-          <a:chOff x="0" y="0"/>
-          <a:chExt cx="0" cy="0"/>
-        </a:xfrm>
-      </p:grpSpPr>
-      <p:sp>
-        <p:nvSpPr>
-          <p:cNvPr id="2" name="Title 1">
-            <a:extLst>
-              <a:ext uri="{FF2B5EF4-FFF2-40B4-BE49-F238E27FC236}">
-                <a16:creationId xmlns:a16="http://schemas.microsoft.com/office/drawing/2014/main" id="{7C061E34-A5C7-46EE-9421-2CC44A33FE91}"/>
-              </a:ext>
-            </a:extLst>
-          </p:cNvPr>
-          <p:cNvSpPr>
-            <a:spLocks noGrp="1"/>
-          </p:cNvSpPr>
-          <p:nvPr>
-            <p:ph type="title"/>
-          </p:nvPr>
-        </p:nvSpPr>
-        <p:spPr/>
-        <p:txBody>
-          <a:bodyPr/>
-          <a:lstStyle/>
-          <a:p>
-            <a:r>
-              <a:rPr lang="en-US" dirty="0"/>
-              <a:t>Issues…</a:t>
-            </a:r>
-          </a:p>
-        </p:txBody>
-      </p:sp>
-      <p:sp>
-        <p:nvSpPr>
-          <p:cNvPr id="3" name="Content Placeholder 2">
-            <a:extLst>
-              <a:ext uri="{FF2B5EF4-FFF2-40B4-BE49-F238E27FC236}">
-                <a16:creationId xmlns:a16="http://schemas.microsoft.com/office/drawing/2014/main" id="{93C5F4C4-DB15-4C0C-96B6-D64065E7BF97}"/>
-              </a:ext>
-            </a:extLst>
-          </p:cNvPr>
-          <p:cNvSpPr>
-            <a:spLocks noGrp="1"/>
-          </p:cNvSpPr>
-          <p:nvPr>
-            <p:ph idx="1"/>
-          </p:nvPr>
-        </p:nvSpPr>
-        <p:spPr/>
-        <p:txBody>
-          <a:bodyPr/>
-          <a:lstStyle/>
-          <a:p>
-            <a:r>
-              <a:rPr lang="en-US" dirty="0"/>
-              <a:t>Values missing from CSV</a:t>
-            </a:r>
-          </a:p>
-          <a:p>
-            <a:pPr lvl="1"/>
-            <a:r>
-              <a:rPr lang="en-US" dirty="0"/>
-              <a:t>Years</a:t>
-            </a:r>
-          </a:p>
-          <a:p>
-            <a:pPr lvl="1"/>
-            <a:r>
-              <a:rPr lang="en-US" dirty="0" err="1"/>
-              <a:t>NaN</a:t>
-            </a:r>
-            <a:r>
-              <a:rPr lang="en-US" dirty="0"/>
-              <a:t> rates/counts</a:t>
-            </a:r>
-          </a:p>
-          <a:p>
-            <a:pPr marL="228600" lvl="1">
-              <a:spcBef>
-                <a:spcPts val="1000"/>
-              </a:spcBef>
-            </a:pPr>
-            <a:endParaRPr lang="en-US" sz="2800" dirty="0"/>
-          </a:p>
-          <a:p>
-            <a:pPr marL="228600" lvl="1">
-              <a:spcBef>
-                <a:spcPts val="1000"/>
-              </a:spcBef>
-            </a:pPr>
-            <a:r>
-              <a:rPr lang="en-US" sz="2800" dirty="0"/>
-              <a:t>Misleading CSV</a:t>
-            </a:r>
-          </a:p>
-          <a:p>
-            <a:pPr marL="685800" lvl="2">
-              <a:spcBef>
-                <a:spcPts val="1000"/>
-              </a:spcBef>
-            </a:pPr>
-            <a:r>
-              <a:rPr lang="en-US" sz="2400" dirty="0"/>
-              <a:t>Faulty sources (education expenditure)</a:t>
-            </a:r>
-          </a:p>
-          <a:p>
-            <a:pPr marL="685800" lvl="2">
-              <a:spcBef>
-                <a:spcPts val="1000"/>
-              </a:spcBef>
-            </a:pPr>
-            <a:r>
-              <a:rPr lang="en-US" sz="2400" dirty="0"/>
-              <a:t>Tiny details</a:t>
-            </a:r>
-            <a:r>
-              <a:rPr lang="en-US" sz="2200" dirty="0"/>
-              <a:t> (invisible spaces)</a:t>
-            </a:r>
-          </a:p>
-          <a:p>
-            <a:pPr marL="685800" lvl="2">
-              <a:spcBef>
-                <a:spcPts val="1000"/>
-              </a:spcBef>
-            </a:pPr>
-            <a:r>
-              <a:rPr lang="en-US" sz="2200" dirty="0"/>
-              <a:t>Merging data (countries names, Excel)</a:t>
-            </a:r>
-            <a:endParaRPr lang="en-US" sz="2400" dirty="0"/>
-          </a:p>
-        </p:txBody>
-      </p:sp>
-    </p:spTree>
-    <p:extLst>
-      <p:ext uri="{BB962C8B-B14F-4D97-AF65-F5344CB8AC3E}">
-        <p14:creationId xmlns:p14="http://schemas.microsoft.com/office/powerpoint/2010/main" val="3853745781"/>
-      </p:ext>
-    </p:extLst>
-  </p:cSld>
-  <p:clrMapOvr>
-    <a:masterClrMapping/>
-  </p:clrMapOvr>
-</p:sld>
-</file>
-
 <file path=ppt/slides/slide26.xml><?xml version="1.0" encoding="utf-8"?>
 <p:sld xmlns:a="http://schemas.openxmlformats.org/drawingml/2006/main" xmlns:r="http://schemas.openxmlformats.org/officeDocument/2006/relationships" xmlns:p="http://schemas.openxmlformats.org/presentationml/2006/main">
   <p:cSld>
@@ -10042,6 +10123,167 @@
           <p:cNvPr id="2" name="Title 1">
             <a:extLst>
               <a:ext uri="{FF2B5EF4-FFF2-40B4-BE49-F238E27FC236}">
+                <a16:creationId xmlns:a16="http://schemas.microsoft.com/office/drawing/2014/main" id="{7C061E34-A5C7-46EE-9421-2CC44A33FE91}"/>
+              </a:ext>
+            </a:extLst>
+          </p:cNvPr>
+          <p:cNvSpPr>
+            <a:spLocks noGrp="1"/>
+          </p:cNvSpPr>
+          <p:nvPr>
+            <p:ph type="title"/>
+          </p:nvPr>
+        </p:nvSpPr>
+        <p:spPr/>
+        <p:txBody>
+          <a:bodyPr/>
+          <a:lstStyle/>
+          <a:p>
+            <a:r>
+              <a:rPr lang="en-US" dirty="0"/>
+              <a:t>Issues…</a:t>
+            </a:r>
+          </a:p>
+        </p:txBody>
+      </p:sp>
+      <p:sp>
+        <p:nvSpPr>
+          <p:cNvPr id="3" name="Content Placeholder 2">
+            <a:extLst>
+              <a:ext uri="{FF2B5EF4-FFF2-40B4-BE49-F238E27FC236}">
+                <a16:creationId xmlns:a16="http://schemas.microsoft.com/office/drawing/2014/main" id="{93C5F4C4-DB15-4C0C-96B6-D64065E7BF97}"/>
+              </a:ext>
+            </a:extLst>
+          </p:cNvPr>
+          <p:cNvSpPr>
+            <a:spLocks noGrp="1"/>
+          </p:cNvSpPr>
+          <p:nvPr>
+            <p:ph idx="1"/>
+          </p:nvPr>
+        </p:nvSpPr>
+        <p:spPr/>
+        <p:txBody>
+          <a:bodyPr/>
+          <a:lstStyle/>
+          <a:p>
+            <a:r>
+              <a:rPr lang="en-US" dirty="0"/>
+              <a:t>Values missing from CSV</a:t>
+            </a:r>
+          </a:p>
+          <a:p>
+            <a:pPr lvl="1"/>
+            <a:r>
+              <a:rPr lang="en-US" dirty="0"/>
+              <a:t>Years</a:t>
+            </a:r>
+          </a:p>
+          <a:p>
+            <a:pPr lvl="1"/>
+            <a:r>
+              <a:rPr lang="en-US" dirty="0" err="1"/>
+              <a:t>NaN</a:t>
+            </a:r>
+            <a:r>
+              <a:rPr lang="en-US" dirty="0"/>
+              <a:t> rates/counts</a:t>
+            </a:r>
+          </a:p>
+          <a:p>
+            <a:pPr marL="228600" lvl="1">
+              <a:spcBef>
+                <a:spcPts val="1000"/>
+              </a:spcBef>
+            </a:pPr>
+            <a:endParaRPr lang="en-US" sz="2800" dirty="0"/>
+          </a:p>
+          <a:p>
+            <a:pPr marL="228600" lvl="1">
+              <a:spcBef>
+                <a:spcPts val="1000"/>
+              </a:spcBef>
+            </a:pPr>
+            <a:r>
+              <a:rPr lang="en-US" sz="2800" dirty="0"/>
+              <a:t>Misleading CSV</a:t>
+            </a:r>
+          </a:p>
+          <a:p>
+            <a:pPr marL="685800" lvl="2">
+              <a:spcBef>
+                <a:spcPts val="1000"/>
+              </a:spcBef>
+            </a:pPr>
+            <a:r>
+              <a:rPr lang="en-US" sz="2400" dirty="0"/>
+              <a:t>Faulty sources (education expenditure)</a:t>
+            </a:r>
+          </a:p>
+          <a:p>
+            <a:pPr marL="685800" lvl="2">
+              <a:spcBef>
+                <a:spcPts val="1000"/>
+              </a:spcBef>
+            </a:pPr>
+            <a:r>
+              <a:rPr lang="en-US" sz="2400" dirty="0"/>
+              <a:t>Tiny details</a:t>
+            </a:r>
+            <a:r>
+              <a:rPr lang="en-US" sz="2200" dirty="0"/>
+              <a:t> (invisible spaces)</a:t>
+            </a:r>
+          </a:p>
+          <a:p>
+            <a:pPr marL="685800" lvl="2">
+              <a:spcBef>
+                <a:spcPts val="1000"/>
+              </a:spcBef>
+            </a:pPr>
+            <a:r>
+              <a:rPr lang="en-US" sz="2200" dirty="0"/>
+              <a:t>Merging data (countries names, Excel)</a:t>
+            </a:r>
+            <a:endParaRPr lang="en-US" sz="2400" dirty="0"/>
+          </a:p>
+        </p:txBody>
+      </p:sp>
+    </p:spTree>
+    <p:extLst>
+      <p:ext uri="{BB962C8B-B14F-4D97-AF65-F5344CB8AC3E}">
+        <p14:creationId xmlns:p14="http://schemas.microsoft.com/office/powerpoint/2010/main" val="3853745781"/>
+      </p:ext>
+    </p:extLst>
+  </p:cSld>
+  <p:clrMapOvr>
+    <a:masterClrMapping/>
+  </p:clrMapOvr>
+</p:sld>
+</file>
+
+<file path=ppt/slides/slide27.xml><?xml version="1.0" encoding="utf-8"?>
+<p:sld xmlns:a="http://schemas.openxmlformats.org/drawingml/2006/main" xmlns:r="http://schemas.openxmlformats.org/officeDocument/2006/relationships" xmlns:p="http://schemas.openxmlformats.org/presentationml/2006/main">
+  <p:cSld>
+    <p:spTree>
+      <p:nvGrpSpPr>
+        <p:cNvPr id="1" name=""/>
+        <p:cNvGrpSpPr/>
+        <p:nvPr/>
+      </p:nvGrpSpPr>
+      <p:grpSpPr>
+        <a:xfrm>
+          <a:off x="0" y="0"/>
+          <a:ext cx="0" cy="0"/>
+          <a:chOff x="0" y="0"/>
+          <a:chExt cx="0" cy="0"/>
+        </a:xfrm>
+      </p:grpSpPr>
+      <p:sp>
+        <p:nvSpPr>
+          <p:cNvPr id="2" name="Title 1">
+            <a:extLst>
+              <a:ext uri="{FF2B5EF4-FFF2-40B4-BE49-F238E27FC236}">
                 <a16:creationId xmlns:a16="http://schemas.microsoft.com/office/drawing/2014/main" id="{6742F44A-26ED-4120-87A4-C3FFDD6A22A4}"/>
               </a:ext>
             </a:extLst>
@@ -10117,7 +10359,7 @@
 </p:sld>
 </file>
 
-<file path=ppt/slides/slide27.xml><?xml version="1.0" encoding="utf-8"?>
+<file path=ppt/slides/slide28.xml><?xml version="1.0" encoding="utf-8"?>
 <p:sld xmlns:a="http://schemas.openxmlformats.org/drawingml/2006/main" xmlns:r="http://schemas.openxmlformats.org/officeDocument/2006/relationships" xmlns:p="http://schemas.openxmlformats.org/presentationml/2006/main">
   <p:cSld>
     <p:spTree>

</xml_diff>